<commit_message>
Merging everything into the same solution
</commit_message>
<xml_diff>
--- a/WPF Validation.pptx
+++ b/WPF Validation.pptx
@@ -2,7 +2,7 @@
 <file path=ppt/presentation.xml><?xml version="1.0" encoding="utf-8"?>
 <p:presentation xmlns:a="http://schemas.openxmlformats.org/drawingml/2006/main" xmlns:r="http://schemas.openxmlformats.org/officeDocument/2006/relationships" xmlns:p="http://schemas.openxmlformats.org/presentationml/2006/main" saveSubsetFonts="1">
   <p:sldMasterIdLst>
-    <p:sldMasterId id="2147483768" r:id="rId1"/>
+    <p:sldMasterId id="2147483780" r:id="rId1"/>
   </p:sldMasterIdLst>
   <p:sldIdLst>
     <p:sldId id="256" r:id="rId2"/>
@@ -131,13 +131,8 @@
 </file>
 
 <file path=ppt/slideLayouts/slideLayout1.xml><?xml version="1.0" encoding="utf-8"?>
-<p:sldLayout xmlns:a="http://schemas.openxmlformats.org/drawingml/2006/main" xmlns:r="http://schemas.openxmlformats.org/officeDocument/2006/relationships" xmlns:p="http://schemas.openxmlformats.org/presentationml/2006/main" showMasterSp="0" type="title" preserve="1">
+<p:sldLayout xmlns:a="http://schemas.openxmlformats.org/drawingml/2006/main" xmlns:r="http://schemas.openxmlformats.org/officeDocument/2006/relationships" xmlns:p="http://schemas.openxmlformats.org/presentationml/2006/main" type="title" preserve="1">
   <p:cSld name="Title Slide">
-    <p:bg>
-      <p:bgRef idx="1002">
-        <a:schemeClr val="bg2"/>
-      </p:bgRef>
-    </p:bg>
     <p:spTree>
       <p:nvGrpSpPr>
         <p:cNvPr id="1" name=""/>
@@ -154,203 +149,7 @@
       </p:grpSpPr>
       <p:sp>
         <p:nvSpPr>
-          <p:cNvPr id="7" name="Freeform 6"/>
-          <p:cNvSpPr>
-            <a:spLocks/>
-          </p:cNvSpPr>
-          <p:nvPr/>
-        </p:nvSpPr>
-        <p:spPr bwMode="auto">
-          <a:xfrm>
-            <a:off x="0" y="4752126"/>
-            <a:ext cx="9144000" cy="2112962"/>
-          </a:xfrm>
-          <a:custGeom>
-            <a:avLst>
-              <a:gd name="A1" fmla="val 0"/>
-              <a:gd name="A2" fmla="val 0"/>
-              <a:gd name="A3" fmla="val 0"/>
-              <a:gd name="A4" fmla="val 0"/>
-              <a:gd name="A5" fmla="val 0"/>
-              <a:gd name="A6" fmla="val 0"/>
-              <a:gd name="A7" fmla="val 0"/>
-              <a:gd name="A8" fmla="val 0"/>
-            </a:avLst>
-            <a:gdLst/>
-            <a:ahLst/>
-            <a:cxnLst>
-              <a:cxn ang="0">
-                <a:pos x="0" y="1066"/>
-              </a:cxn>
-              <a:cxn ang="0">
-                <a:pos x="0" y="1331"/>
-              </a:cxn>
-              <a:cxn ang="0">
-                <a:pos x="5760" y="1331"/>
-              </a:cxn>
-              <a:cxn ang="0">
-                <a:pos x="5760" y="0"/>
-              </a:cxn>
-              <a:cxn ang="0">
-                <a:pos x="0" y="1066"/>
-              </a:cxn>
-            </a:cxnLst>
-            <a:rect l="0" t="0" r="0" b="0"/>
-            <a:pathLst>
-              <a:path w="5760" h="1331">
-                <a:moveTo>
-                  <a:pt x="0" y="1066"/>
-                </a:moveTo>
-                <a:lnTo>
-                  <a:pt x="0" y="1331"/>
-                </a:lnTo>
-                <a:lnTo>
-                  <a:pt x="5760" y="1331"/>
-                </a:lnTo>
-                <a:lnTo>
-                  <a:pt x="5760" y="0"/>
-                </a:lnTo>
-                <a:cubicBezTo>
-                  <a:pt x="3220" y="1206"/>
-                  <a:pt x="2250" y="1146"/>
-                  <a:pt x="0" y="1066"/>
-                </a:cubicBezTo>
-                <a:close/>
-              </a:path>
-            </a:pathLst>
-          </a:custGeom>
-          <a:solidFill>
-            <a:schemeClr val="bg1">
-              <a:tint val="80000"/>
-              <a:satMod val="200000"/>
-              <a:alpha val="45000"/>
-            </a:schemeClr>
-          </a:solidFill>
-          <a:ln w="9525" cap="flat" cmpd="sng" algn="ctr">
-            <a:noFill/>
-            <a:prstDash val="solid"/>
-            <a:round/>
-            <a:headEnd type="none" w="med" len="med"/>
-            <a:tailEnd type="none" w="med" len="med"/>
-          </a:ln>
-          <a:effectLst>
-            <a:outerShdw blurRad="50800" dist="44450" dir="16200000" algn="ctr" rotWithShape="0">
-              <a:prstClr val="black">
-                <a:alpha val="35000"/>
-              </a:prstClr>
-            </a:outerShdw>
-          </a:effectLst>
-        </p:spPr>
-        <p:txBody>
-          <a:bodyPr vert="horz" wrap="square" lIns="91440" tIns="45720" rIns="91440" bIns="45720" anchor="t" compatLnSpc="1"/>
-          <a:lstStyle/>
-          <a:p>
-            <a:endParaRPr kumimoji="0" lang="en-US"/>
-          </a:p>
-        </p:txBody>
-      </p:sp>
-      <p:sp>
-        <p:nvSpPr>
-          <p:cNvPr id="8" name="Freeform 7"/>
-          <p:cNvSpPr>
-            <a:spLocks/>
-          </p:cNvSpPr>
-          <p:nvPr/>
-        </p:nvSpPr>
-        <p:spPr bwMode="auto">
-          <a:xfrm>
-            <a:off x="6105525" y="0"/>
-            <a:ext cx="3038475" cy="6858000"/>
-          </a:xfrm>
-          <a:custGeom>
-            <a:avLst/>
-            <a:gdLst>
-              <a:gd name="connsiteX0" fmla="*/ 1914 w 1914"/>
-              <a:gd name="connsiteY0" fmla="*/ 9 h 4329"/>
-              <a:gd name="connsiteX1" fmla="*/ 1914 w 1914"/>
-              <a:gd name="connsiteY1" fmla="*/ 4329 h 4329"/>
-              <a:gd name="connsiteX2" fmla="*/ 204 w 1914"/>
-              <a:gd name="connsiteY2" fmla="*/ 4327 h 4329"/>
-              <a:gd name="connsiteX3" fmla="*/ 0 w 1914"/>
-              <a:gd name="connsiteY3" fmla="*/ 0 h 4329"/>
-              <a:gd name="connsiteX4" fmla="*/ 1914 w 1914"/>
-              <a:gd name="connsiteY4" fmla="*/ 9 h 4329"/>
-            </a:gdLst>
-            <a:ahLst/>
-            <a:cxnLst>
-              <a:cxn ang="0">
-                <a:pos x="connsiteX0" y="connsiteY0"/>
-              </a:cxn>
-              <a:cxn ang="0">
-                <a:pos x="connsiteX1" y="connsiteY1"/>
-              </a:cxn>
-              <a:cxn ang="0">
-                <a:pos x="connsiteX2" y="connsiteY2"/>
-              </a:cxn>
-              <a:cxn ang="0">
-                <a:pos x="connsiteX3" y="connsiteY3"/>
-              </a:cxn>
-              <a:cxn ang="0">
-                <a:pos x="connsiteX4" y="connsiteY4"/>
-              </a:cxn>
-            </a:cxnLst>
-            <a:rect l="l" t="t" r="r" b="b"/>
-            <a:pathLst>
-              <a:path w="1914" h="4329">
-                <a:moveTo>
-                  <a:pt x="1914" y="9"/>
-                </a:moveTo>
-                <a:lnTo>
-                  <a:pt x="1914" y="4329"/>
-                </a:lnTo>
-                <a:lnTo>
-                  <a:pt x="204" y="4327"/>
-                </a:lnTo>
-                <a:cubicBezTo>
-                  <a:pt x="1288" y="3574"/>
-                  <a:pt x="1608" y="1590"/>
-                  <a:pt x="0" y="0"/>
-                </a:cubicBezTo>
-                <a:lnTo>
-                  <a:pt x="1914" y="9"/>
-                </a:lnTo>
-                <a:close/>
-              </a:path>
-            </a:pathLst>
-          </a:custGeom>
-          <a:solidFill>
-            <a:schemeClr val="bg1">
-              <a:tint val="90000"/>
-              <a:satMod val="350000"/>
-              <a:alpha val="40000"/>
-            </a:schemeClr>
-          </a:solidFill>
-          <a:ln w="9525" cap="flat" cmpd="sng" algn="ctr">
-            <a:noFill/>
-            <a:prstDash val="solid"/>
-            <a:round/>
-            <a:headEnd type="none" w="med" len="med"/>
-            <a:tailEnd type="none" w="med" len="med"/>
-          </a:ln>
-          <a:effectLst>
-            <a:outerShdw blurRad="50800" dist="50800" dir="10800000" algn="ctr" rotWithShape="0">
-              <a:prstClr val="black">
-                <a:alpha val="45000"/>
-              </a:prstClr>
-            </a:outerShdw>
-          </a:effectLst>
-        </p:spPr>
-        <p:txBody>
-          <a:bodyPr vert="horz" wrap="square" lIns="91440" tIns="45720" rIns="91440" bIns="45720" anchor="t" compatLnSpc="1"/>
-          <a:lstStyle/>
-          <a:p>
-            <a:endParaRPr kumimoji="0" lang="en-US"/>
-          </a:p>
-        </p:txBody>
-      </p:sp>
-      <p:sp>
-        <p:nvSpPr>
-          <p:cNvPr id="9" name="Title 8"/>
+          <p:cNvPr id="2" name="Title 1"/>
           <p:cNvSpPr>
             <a:spLocks noGrp="1"/>
           </p:cNvSpPr>
@@ -360,82 +159,25 @@
         </p:nvSpPr>
         <p:spPr>
           <a:xfrm>
-            <a:off x="429064" y="3337560"/>
-            <a:ext cx="6480048" cy="2301240"/>
+            <a:off x="685800" y="2130425"/>
+            <a:ext cx="7772400" cy="1470025"/>
           </a:xfrm>
         </p:spPr>
         <p:txBody>
-          <a:bodyPr rIns="45720" anchor="t"/>
-          <a:lstStyle>
-            <a:lvl1pPr algn="r">
-              <a:defRPr lang="en-US" b="1" cap="all" baseline="0" dirty="0">
-                <a:ln w="5000" cmpd="sng">
-                  <a:solidFill>
-                    <a:schemeClr val="accent1">
-                      <a:tint val="80000"/>
-                      <a:shade val="99000"/>
-                      <a:satMod val="500000"/>
-                    </a:schemeClr>
-                  </a:solidFill>
-                  <a:prstDash val="solid"/>
-                </a:ln>
-                <a:gradFill>
-                  <a:gsLst>
-                    <a:gs pos="0">
-                      <a:schemeClr val="accent1">
-                        <a:tint val="63000"/>
-                        <a:satMod val="255000"/>
-                      </a:schemeClr>
-                    </a:gs>
-                    <a:gs pos="9000">
-                      <a:schemeClr val="accent1">
-                        <a:tint val="63000"/>
-                        <a:satMod val="255000"/>
-                      </a:schemeClr>
-                    </a:gs>
-                    <a:gs pos="53000">
-                      <a:schemeClr val="accent1">
-                        <a:shade val="60000"/>
-                        <a:satMod val="100000"/>
-                      </a:schemeClr>
-                    </a:gs>
-                    <a:gs pos="90000">
-                      <a:schemeClr val="accent1">
-                        <a:tint val="63000"/>
-                        <a:satMod val="255000"/>
-                      </a:schemeClr>
-                    </a:gs>
-                    <a:gs pos="100000">
-                      <a:schemeClr val="accent1">
-                        <a:tint val="63000"/>
-                        <a:satMod val="255000"/>
-                      </a:schemeClr>
-                    </a:gs>
-                  </a:gsLst>
-                  <a:lin ang="5400000"/>
-                </a:gradFill>
-                <a:effectLst>
-                  <a:outerShdw blurRad="50800" dist="38100" dir="5400000" algn="t" rotWithShape="0">
-                    <a:prstClr val="black">
-                      <a:alpha val="50000"/>
-                    </a:prstClr>
-                  </a:outerShdw>
-                </a:effectLst>
-              </a:defRPr>
-            </a:lvl1pPr>
-          </a:lstStyle>
-          <a:p>
-            <a:r>
-              <a:rPr kumimoji="0" lang="en-US" smtClean="0"/>
+          <a:bodyPr/>
+          <a:lstStyle/>
+          <a:p>
+            <a:r>
+              <a:rPr lang="en-US" smtClean="0"/>
               <a:t>Click to edit Master title style</a:t>
             </a:r>
-            <a:endParaRPr kumimoji="0" lang="en-US"/>
-          </a:p>
-        </p:txBody>
-      </p:sp>
-      <p:sp>
-        <p:nvSpPr>
-          <p:cNvPr id="17" name="Subtitle 16"/>
+            <a:endParaRPr lang="en-US"/>
+          </a:p>
+        </p:txBody>
+      </p:sp>
+      <p:sp>
+        <p:nvSpPr>
+          <p:cNvPr id="3" name="Subtitle 2"/>
           <p:cNvSpPr>
             <a:spLocks noGrp="1"/>
           </p:cNvSpPr>
@@ -445,61 +187,116 @@
         </p:nvSpPr>
         <p:spPr>
           <a:xfrm>
-            <a:off x="433050" y="1544812"/>
-            <a:ext cx="6480048" cy="1752600"/>
+            <a:off x="1371600" y="3886200"/>
+            <a:ext cx="6400800" cy="1752600"/>
           </a:xfrm>
         </p:spPr>
         <p:txBody>
-          <a:bodyPr tIns="0" rIns="45720" bIns="0" anchor="b">
-            <a:normAutofit/>
-          </a:bodyPr>
+          <a:bodyPr/>
           <a:lstStyle>
-            <a:lvl1pPr marL="0" indent="0" algn="r">
+            <a:lvl1pPr marL="0" indent="0" algn="ctr">
               <a:buNone/>
-              <a:defRPr sz="2000">
+              <a:defRPr>
                 <a:solidFill>
-                  <a:schemeClr val="tx1"/>
+                  <a:schemeClr val="tx1">
+                    <a:tint val="75000"/>
+                  </a:schemeClr>
                 </a:solidFill>
-                <a:effectLst/>
               </a:defRPr>
             </a:lvl1pPr>
             <a:lvl2pPr marL="457200" indent="0" algn="ctr">
               <a:buNone/>
+              <a:defRPr>
+                <a:solidFill>
+                  <a:schemeClr val="tx1">
+                    <a:tint val="75000"/>
+                  </a:schemeClr>
+                </a:solidFill>
+              </a:defRPr>
             </a:lvl2pPr>
             <a:lvl3pPr marL="914400" indent="0" algn="ctr">
               <a:buNone/>
+              <a:defRPr>
+                <a:solidFill>
+                  <a:schemeClr val="tx1">
+                    <a:tint val="75000"/>
+                  </a:schemeClr>
+                </a:solidFill>
+              </a:defRPr>
             </a:lvl3pPr>
             <a:lvl4pPr marL="1371600" indent="0" algn="ctr">
               <a:buNone/>
+              <a:defRPr>
+                <a:solidFill>
+                  <a:schemeClr val="tx1">
+                    <a:tint val="75000"/>
+                  </a:schemeClr>
+                </a:solidFill>
+              </a:defRPr>
             </a:lvl4pPr>
             <a:lvl5pPr marL="1828800" indent="0" algn="ctr">
               <a:buNone/>
+              <a:defRPr>
+                <a:solidFill>
+                  <a:schemeClr val="tx1">
+                    <a:tint val="75000"/>
+                  </a:schemeClr>
+                </a:solidFill>
+              </a:defRPr>
             </a:lvl5pPr>
             <a:lvl6pPr marL="2286000" indent="0" algn="ctr">
               <a:buNone/>
+              <a:defRPr>
+                <a:solidFill>
+                  <a:schemeClr val="tx1">
+                    <a:tint val="75000"/>
+                  </a:schemeClr>
+                </a:solidFill>
+              </a:defRPr>
             </a:lvl6pPr>
             <a:lvl7pPr marL="2743200" indent="0" algn="ctr">
               <a:buNone/>
+              <a:defRPr>
+                <a:solidFill>
+                  <a:schemeClr val="tx1">
+                    <a:tint val="75000"/>
+                  </a:schemeClr>
+                </a:solidFill>
+              </a:defRPr>
             </a:lvl7pPr>
             <a:lvl8pPr marL="3200400" indent="0" algn="ctr">
               <a:buNone/>
+              <a:defRPr>
+                <a:solidFill>
+                  <a:schemeClr val="tx1">
+                    <a:tint val="75000"/>
+                  </a:schemeClr>
+                </a:solidFill>
+              </a:defRPr>
             </a:lvl8pPr>
             <a:lvl9pPr marL="3657600" indent="0" algn="ctr">
               <a:buNone/>
+              <a:defRPr>
+                <a:solidFill>
+                  <a:schemeClr val="tx1">
+                    <a:tint val="75000"/>
+                  </a:schemeClr>
+                </a:solidFill>
+              </a:defRPr>
             </a:lvl9pPr>
           </a:lstStyle>
           <a:p>
             <a:r>
-              <a:rPr kumimoji="0" lang="en-US" smtClean="0"/>
+              <a:rPr lang="en-US" smtClean="0"/>
               <a:t>Click to edit Master subtitle style</a:t>
             </a:r>
-            <a:endParaRPr kumimoji="0" lang="en-US"/>
-          </a:p>
-        </p:txBody>
-      </p:sp>
-      <p:sp>
-        <p:nvSpPr>
-          <p:cNvPr id="30" name="Date Placeholder 29"/>
+            <a:endParaRPr lang="en-US"/>
+          </a:p>
+        </p:txBody>
+      </p:sp>
+      <p:sp>
+        <p:nvSpPr>
+          <p:cNvPr id="4" name="Date Placeholder 3"/>
           <p:cNvSpPr>
             <a:spLocks noGrp="1"/>
           </p:cNvSpPr>
@@ -515,7 +312,7 @@
             <a:fld id="{60029C98-5D54-43BD-B436-29F4C541DD0B}" type="datetimeFigureOut">
               <a:rPr lang="en-US" smtClean="0"/>
               <a:pPr/>
-              <a:t>9/19/2009</a:t>
+              <a:t>9/23/2009</a:t>
             </a:fld>
             <a:endParaRPr lang="en-US"/>
           </a:p>
@@ -523,7 +320,7 @@
       </p:sp>
       <p:sp>
         <p:nvSpPr>
-          <p:cNvPr id="19" name="Footer Placeholder 18"/>
+          <p:cNvPr id="5" name="Footer Placeholder 4"/>
           <p:cNvSpPr>
             <a:spLocks noGrp="1"/>
           </p:cNvSpPr>
@@ -542,7 +339,7 @@
       </p:sp>
       <p:sp>
         <p:nvSpPr>
-          <p:cNvPr id="27" name="Slide Number Placeholder 26"/>
+          <p:cNvPr id="6" name="Slide Number Placeholder 5"/>
           <p:cNvSpPr>
             <a:spLocks noGrp="1"/>
           </p:cNvSpPr>
@@ -567,7 +364,7 @@
     </p:spTree>
   </p:cSld>
   <p:clrMapOvr>
-    <a:overrideClrMapping bg1="dk1" tx1="lt1" bg2="dk2" tx2="lt2" accent1="accent1" accent2="accent2" accent3="accent3" accent4="accent4" accent5="accent5" accent6="accent6" hlink="hlink" folHlink="folHlink"/>
+    <a:masterClrMapping/>
   </p:clrMapOvr>
 </p:sldLayout>
 </file>
@@ -605,10 +402,10 @@
           <a:lstStyle/>
           <a:p>
             <a:r>
-              <a:rPr kumimoji="0" lang="en-US" smtClean="0"/>
+              <a:rPr lang="en-US" smtClean="0"/>
               <a:t>Click to edit Master title style</a:t>
             </a:r>
-            <a:endParaRPr kumimoji="0" lang="en-US"/>
+            <a:endParaRPr lang="en-US"/>
           </a:p>
         </p:txBody>
       </p:sp>
@@ -627,40 +424,40 @@
           <a:bodyPr vert="eaVert"/>
           <a:lstStyle/>
           <a:p>
-            <a:pPr lvl="0" eaLnBrk="1" latinLnBrk="0" hangingPunct="1"/>
+            <a:pPr lvl="0"/>
             <a:r>
               <a:rPr lang="en-US" smtClean="0"/>
               <a:t>Click to edit Master text styles</a:t>
             </a:r>
           </a:p>
           <a:p>
-            <a:pPr lvl="1" eaLnBrk="1" latinLnBrk="0" hangingPunct="1"/>
+            <a:pPr lvl="1"/>
             <a:r>
               <a:rPr lang="en-US" smtClean="0"/>
               <a:t>Second level</a:t>
             </a:r>
           </a:p>
           <a:p>
-            <a:pPr lvl="2" eaLnBrk="1" latinLnBrk="0" hangingPunct="1"/>
+            <a:pPr lvl="2"/>
             <a:r>
               <a:rPr lang="en-US" smtClean="0"/>
               <a:t>Third level</a:t>
             </a:r>
           </a:p>
           <a:p>
-            <a:pPr lvl="3" eaLnBrk="1" latinLnBrk="0" hangingPunct="1"/>
+            <a:pPr lvl="3"/>
             <a:r>
               <a:rPr lang="en-US" smtClean="0"/>
               <a:t>Fourth level</a:t>
             </a:r>
           </a:p>
           <a:p>
-            <a:pPr lvl="4" eaLnBrk="1" latinLnBrk="0" hangingPunct="1"/>
+            <a:pPr lvl="4"/>
             <a:r>
               <a:rPr lang="en-US" smtClean="0"/>
               <a:t>Fifth level</a:t>
             </a:r>
-            <a:endParaRPr kumimoji="0" lang="en-US"/>
+            <a:endParaRPr lang="en-US"/>
           </a:p>
         </p:txBody>
       </p:sp>
@@ -682,7 +479,7 @@
             <a:fld id="{60029C98-5D54-43BD-B436-29F4C541DD0B}" type="datetimeFigureOut">
               <a:rPr lang="en-US" smtClean="0"/>
               <a:pPr/>
-              <a:t>9/19/2009</a:t>
+              <a:t>9/23/2009</a:t>
             </a:fld>
             <a:endParaRPr lang="en-US"/>
           </a:p>
@@ -777,10 +574,10 @@
           <a:lstStyle/>
           <a:p>
             <a:r>
-              <a:rPr kumimoji="0" lang="en-US" smtClean="0"/>
+              <a:rPr lang="en-US" smtClean="0"/>
               <a:t>Click to edit Master title style</a:t>
             </a:r>
-            <a:endParaRPr kumimoji="0" lang="en-US"/>
+            <a:endParaRPr lang="en-US"/>
           </a:p>
         </p:txBody>
       </p:sp>
@@ -804,40 +601,40 @@
           <a:bodyPr vert="eaVert"/>
           <a:lstStyle/>
           <a:p>
-            <a:pPr lvl="0" eaLnBrk="1" latinLnBrk="0" hangingPunct="1"/>
+            <a:pPr lvl="0"/>
             <a:r>
               <a:rPr lang="en-US" smtClean="0"/>
               <a:t>Click to edit Master text styles</a:t>
             </a:r>
           </a:p>
           <a:p>
-            <a:pPr lvl="1" eaLnBrk="1" latinLnBrk="0" hangingPunct="1"/>
+            <a:pPr lvl="1"/>
             <a:r>
               <a:rPr lang="en-US" smtClean="0"/>
               <a:t>Second level</a:t>
             </a:r>
           </a:p>
           <a:p>
-            <a:pPr lvl="2" eaLnBrk="1" latinLnBrk="0" hangingPunct="1"/>
+            <a:pPr lvl="2"/>
             <a:r>
               <a:rPr lang="en-US" smtClean="0"/>
               <a:t>Third level</a:t>
             </a:r>
           </a:p>
           <a:p>
-            <a:pPr lvl="3" eaLnBrk="1" latinLnBrk="0" hangingPunct="1"/>
+            <a:pPr lvl="3"/>
             <a:r>
               <a:rPr lang="en-US" smtClean="0"/>
               <a:t>Fourth level</a:t>
             </a:r>
           </a:p>
           <a:p>
-            <a:pPr lvl="4" eaLnBrk="1" latinLnBrk="0" hangingPunct="1"/>
+            <a:pPr lvl="4"/>
             <a:r>
               <a:rPr lang="en-US" smtClean="0"/>
               <a:t>Fifth level</a:t>
             </a:r>
-            <a:endParaRPr kumimoji="0" lang="en-US"/>
+            <a:endParaRPr lang="en-US"/>
           </a:p>
         </p:txBody>
       </p:sp>
@@ -859,7 +656,7 @@
             <a:fld id="{60029C98-5D54-43BD-B436-29F4C541DD0B}" type="datetimeFigureOut">
               <a:rPr lang="en-US" smtClean="0"/>
               <a:pPr/>
-              <a:t>9/19/2009</a:t>
+              <a:t>9/23/2009</a:t>
             </a:fld>
             <a:endParaRPr lang="en-US"/>
           </a:p>
@@ -946,17 +743,13 @@
         <p:spPr/>
         <p:txBody>
           <a:bodyPr/>
-          <a:lstStyle>
-            <a:lvl1pPr algn="l">
-              <a:defRPr/>
-            </a:lvl1pPr>
-          </a:lstStyle>
-          <a:p>
-            <a:r>
-              <a:rPr kumimoji="0" lang="en-US" smtClean="0"/>
+          <a:lstStyle/>
+          <a:p>
+            <a:r>
+              <a:rPr lang="en-US" smtClean="0"/>
               <a:t>Click to edit Master title style</a:t>
             </a:r>
-            <a:endParaRPr kumimoji="0" lang="en-US"/>
+            <a:endParaRPr lang="en-US"/>
           </a:p>
         </p:txBody>
       </p:sp>
@@ -975,40 +768,40 @@
           <a:bodyPr/>
           <a:lstStyle/>
           <a:p>
-            <a:pPr lvl="0" eaLnBrk="1" latinLnBrk="0" hangingPunct="1"/>
+            <a:pPr lvl="0"/>
             <a:r>
               <a:rPr lang="en-US" smtClean="0"/>
               <a:t>Click to edit Master text styles</a:t>
             </a:r>
           </a:p>
           <a:p>
-            <a:pPr lvl="1" eaLnBrk="1" latinLnBrk="0" hangingPunct="1"/>
+            <a:pPr lvl="1"/>
             <a:r>
               <a:rPr lang="en-US" smtClean="0"/>
               <a:t>Second level</a:t>
             </a:r>
           </a:p>
           <a:p>
-            <a:pPr lvl="2" eaLnBrk="1" latinLnBrk="0" hangingPunct="1"/>
+            <a:pPr lvl="2"/>
             <a:r>
               <a:rPr lang="en-US" smtClean="0"/>
               <a:t>Third level</a:t>
             </a:r>
           </a:p>
           <a:p>
-            <a:pPr lvl="3" eaLnBrk="1" latinLnBrk="0" hangingPunct="1"/>
+            <a:pPr lvl="3"/>
             <a:r>
               <a:rPr lang="en-US" smtClean="0"/>
               <a:t>Fourth level</a:t>
             </a:r>
           </a:p>
           <a:p>
-            <a:pPr lvl="4" eaLnBrk="1" latinLnBrk="0" hangingPunct="1"/>
+            <a:pPr lvl="4"/>
             <a:r>
               <a:rPr lang="en-US" smtClean="0"/>
               <a:t>Fifth level</a:t>
             </a:r>
-            <a:endParaRPr kumimoji="0" lang="en-US"/>
+            <a:endParaRPr lang="en-US"/>
           </a:p>
         </p:txBody>
       </p:sp>
@@ -1030,7 +823,7 @@
             <a:fld id="{60029C98-5D54-43BD-B436-29F4C541DD0B}" type="datetimeFigureOut">
               <a:rPr lang="en-US" smtClean="0"/>
               <a:pPr/>
-              <a:t>9/19/2009</a:t>
+              <a:t>9/23/2009</a:t>
             </a:fld>
             <a:endParaRPr lang="en-US"/>
           </a:p>
@@ -1088,13 +881,8 @@
 </file>
 
 <file path=ppt/slideLayouts/slideLayout3.xml><?xml version="1.0" encoding="utf-8"?>
-<p:sldLayout xmlns:a="http://schemas.openxmlformats.org/drawingml/2006/main" xmlns:r="http://schemas.openxmlformats.org/officeDocument/2006/relationships" xmlns:p="http://schemas.openxmlformats.org/presentationml/2006/main" showMasterSp="0" type="secHead" preserve="1">
+<p:sldLayout xmlns:a="http://schemas.openxmlformats.org/drawingml/2006/main" xmlns:r="http://schemas.openxmlformats.org/officeDocument/2006/relationships" xmlns:p="http://schemas.openxmlformats.org/presentationml/2006/main" type="secHead" preserve="1">
   <p:cSld name="Section Header">
-    <p:bg>
-      <p:bgRef idx="1002">
-        <a:schemeClr val="bg2"/>
-      </p:bgRef>
-    </p:bg>
     <p:spTree>
       <p:nvGrpSpPr>
         <p:cNvPr id="1" name=""/>
@@ -1111,202 +899,6 @@
       </p:grpSpPr>
       <p:sp>
         <p:nvSpPr>
-          <p:cNvPr id="7" name="Freeform 6"/>
-          <p:cNvSpPr>
-            <a:spLocks/>
-          </p:cNvSpPr>
-          <p:nvPr/>
-        </p:nvSpPr>
-        <p:spPr bwMode="auto">
-          <a:xfrm>
-            <a:off x="0" y="4752126"/>
-            <a:ext cx="9144000" cy="2112962"/>
-          </a:xfrm>
-          <a:custGeom>
-            <a:avLst>
-              <a:gd name="A1" fmla="val 0"/>
-              <a:gd name="A2" fmla="val 0"/>
-              <a:gd name="A3" fmla="val 0"/>
-              <a:gd name="A4" fmla="val 0"/>
-              <a:gd name="A5" fmla="val 0"/>
-              <a:gd name="A6" fmla="val 0"/>
-              <a:gd name="A7" fmla="val 0"/>
-              <a:gd name="A8" fmla="val 0"/>
-            </a:avLst>
-            <a:gdLst/>
-            <a:ahLst/>
-            <a:cxnLst>
-              <a:cxn ang="0">
-                <a:pos x="0" y="1066"/>
-              </a:cxn>
-              <a:cxn ang="0">
-                <a:pos x="0" y="1331"/>
-              </a:cxn>
-              <a:cxn ang="0">
-                <a:pos x="5760" y="1331"/>
-              </a:cxn>
-              <a:cxn ang="0">
-                <a:pos x="5760" y="0"/>
-              </a:cxn>
-              <a:cxn ang="0">
-                <a:pos x="0" y="1066"/>
-              </a:cxn>
-            </a:cxnLst>
-            <a:rect l="0" t="0" r="0" b="0"/>
-            <a:pathLst>
-              <a:path w="5760" h="1331">
-                <a:moveTo>
-                  <a:pt x="0" y="1066"/>
-                </a:moveTo>
-                <a:lnTo>
-                  <a:pt x="0" y="1331"/>
-                </a:lnTo>
-                <a:lnTo>
-                  <a:pt x="5760" y="1331"/>
-                </a:lnTo>
-                <a:lnTo>
-                  <a:pt x="5760" y="0"/>
-                </a:lnTo>
-                <a:cubicBezTo>
-                  <a:pt x="3220" y="1206"/>
-                  <a:pt x="2250" y="1146"/>
-                  <a:pt x="0" y="1066"/>
-                </a:cubicBezTo>
-                <a:close/>
-              </a:path>
-            </a:pathLst>
-          </a:custGeom>
-          <a:solidFill>
-            <a:schemeClr val="bg1">
-              <a:tint val="80000"/>
-              <a:satMod val="200000"/>
-              <a:alpha val="45000"/>
-            </a:schemeClr>
-          </a:solidFill>
-          <a:ln w="9525" cap="flat" cmpd="sng" algn="ctr">
-            <a:noFill/>
-            <a:prstDash val="solid"/>
-            <a:round/>
-            <a:headEnd type="none" w="med" len="med"/>
-            <a:tailEnd type="none" w="med" len="med"/>
-          </a:ln>
-          <a:effectLst>
-            <a:outerShdw blurRad="50800" dist="44450" dir="16200000" algn="ctr" rotWithShape="0">
-              <a:prstClr val="black">
-                <a:alpha val="35000"/>
-              </a:prstClr>
-            </a:outerShdw>
-          </a:effectLst>
-        </p:spPr>
-        <p:txBody>
-          <a:bodyPr vert="horz" wrap="square" lIns="91440" tIns="45720" rIns="91440" bIns="45720" anchor="t" compatLnSpc="1"/>
-          <a:lstStyle/>
-          <a:p>
-            <a:endParaRPr kumimoji="0" lang="en-US"/>
-          </a:p>
-        </p:txBody>
-      </p:sp>
-      <p:sp>
-        <p:nvSpPr>
-          <p:cNvPr id="9" name="Freeform 8"/>
-          <p:cNvSpPr>
-            <a:spLocks/>
-          </p:cNvSpPr>
-          <p:nvPr/>
-        </p:nvSpPr>
-        <p:spPr bwMode="auto">
-          <a:xfrm>
-            <a:off x="6105525" y="0"/>
-            <a:ext cx="3038475" cy="6858000"/>
-          </a:xfrm>
-          <a:custGeom>
-            <a:avLst/>
-            <a:gdLst>
-              <a:gd name="connsiteX0" fmla="*/ 1914 w 1914"/>
-              <a:gd name="connsiteY0" fmla="*/ 9 h 4329"/>
-              <a:gd name="connsiteX1" fmla="*/ 1914 w 1914"/>
-              <a:gd name="connsiteY1" fmla="*/ 4329 h 4329"/>
-              <a:gd name="connsiteX2" fmla="*/ 204 w 1914"/>
-              <a:gd name="connsiteY2" fmla="*/ 4327 h 4329"/>
-              <a:gd name="connsiteX3" fmla="*/ 0 w 1914"/>
-              <a:gd name="connsiteY3" fmla="*/ 0 h 4329"/>
-              <a:gd name="connsiteX4" fmla="*/ 1914 w 1914"/>
-              <a:gd name="connsiteY4" fmla="*/ 9 h 4329"/>
-            </a:gdLst>
-            <a:ahLst/>
-            <a:cxnLst>
-              <a:cxn ang="0">
-                <a:pos x="connsiteX0" y="connsiteY0"/>
-              </a:cxn>
-              <a:cxn ang="0">
-                <a:pos x="connsiteX1" y="connsiteY1"/>
-              </a:cxn>
-              <a:cxn ang="0">
-                <a:pos x="connsiteX2" y="connsiteY2"/>
-              </a:cxn>
-              <a:cxn ang="0">
-                <a:pos x="connsiteX3" y="connsiteY3"/>
-              </a:cxn>
-              <a:cxn ang="0">
-                <a:pos x="connsiteX4" y="connsiteY4"/>
-              </a:cxn>
-            </a:cxnLst>
-            <a:rect l="l" t="t" r="r" b="b"/>
-            <a:pathLst>
-              <a:path w="1914" h="4329">
-                <a:moveTo>
-                  <a:pt x="1914" y="9"/>
-                </a:moveTo>
-                <a:lnTo>
-                  <a:pt x="1914" y="4329"/>
-                </a:lnTo>
-                <a:lnTo>
-                  <a:pt x="204" y="4327"/>
-                </a:lnTo>
-                <a:cubicBezTo>
-                  <a:pt x="1288" y="3574"/>
-                  <a:pt x="1608" y="1590"/>
-                  <a:pt x="0" y="0"/>
-                </a:cubicBezTo>
-                <a:lnTo>
-                  <a:pt x="1914" y="9"/>
-                </a:lnTo>
-                <a:close/>
-              </a:path>
-            </a:pathLst>
-          </a:custGeom>
-          <a:solidFill>
-            <a:schemeClr val="bg1">
-              <a:tint val="90000"/>
-              <a:satMod val="350000"/>
-              <a:alpha val="40000"/>
-            </a:schemeClr>
-          </a:solidFill>
-          <a:ln w="9525" cap="flat" cmpd="sng" algn="ctr">
-            <a:noFill/>
-            <a:prstDash val="solid"/>
-            <a:round/>
-            <a:headEnd type="none" w="med" len="med"/>
-            <a:tailEnd type="none" w="med" len="med"/>
-          </a:ln>
-          <a:effectLst>
-            <a:outerShdw blurRad="50800" dist="50800" dir="10800000" algn="ctr" rotWithShape="0">
-              <a:prstClr val="black">
-                <a:alpha val="45000"/>
-              </a:prstClr>
-            </a:outerShdw>
-          </a:effectLst>
-        </p:spPr>
-        <p:txBody>
-          <a:bodyPr vert="horz" wrap="square" lIns="91440" tIns="45720" rIns="91440" bIns="45720" anchor="t" compatLnSpc="1"/>
-          <a:lstStyle/>
-          <a:p>
-            <a:endParaRPr kumimoji="0" lang="en-US"/>
-          </a:p>
-        </p:txBody>
-      </p:sp>
-      <p:sp>
-        <p:nvSpPr>
           <p:cNvPr id="2" name="Title 1"/>
           <p:cNvSpPr>
             <a:spLocks noGrp="1"/>
@@ -1317,77 +909,23 @@
         </p:nvSpPr>
         <p:spPr>
           <a:xfrm>
-            <a:off x="685800" y="3583837"/>
-            <a:ext cx="6629400" cy="1826363"/>
+            <a:off x="722313" y="4406900"/>
+            <a:ext cx="7772400" cy="1362075"/>
           </a:xfrm>
         </p:spPr>
         <p:txBody>
-          <a:bodyPr tIns="0" bIns="0" anchor="t"/>
+          <a:bodyPr anchor="t"/>
           <a:lstStyle>
             <a:lvl1pPr algn="l">
-              <a:buNone/>
-              <a:defRPr sz="4200" b="1" cap="none" baseline="0">
-                <a:ln w="5000" cmpd="sng">
-                  <a:solidFill>
-                    <a:schemeClr val="accent1">
-                      <a:tint val="80000"/>
-                      <a:shade val="99000"/>
-                      <a:satMod val="500000"/>
-                    </a:schemeClr>
-                  </a:solidFill>
-                  <a:prstDash val="solid"/>
-                </a:ln>
-                <a:gradFill>
-                  <a:gsLst>
-                    <a:gs pos="0">
-                      <a:schemeClr val="accent1">
-                        <a:tint val="63000"/>
-                        <a:satMod val="255000"/>
-                      </a:schemeClr>
-                    </a:gs>
-                    <a:gs pos="9000">
-                      <a:schemeClr val="accent1">
-                        <a:tint val="63000"/>
-                        <a:satMod val="255000"/>
-                      </a:schemeClr>
-                    </a:gs>
-                    <a:gs pos="53000">
-                      <a:schemeClr val="accent1">
-                        <a:shade val="60000"/>
-                        <a:satMod val="100000"/>
-                      </a:schemeClr>
-                    </a:gs>
-                    <a:gs pos="90000">
-                      <a:schemeClr val="accent1">
-                        <a:tint val="63000"/>
-                        <a:satMod val="255000"/>
-                      </a:schemeClr>
-                    </a:gs>
-                    <a:gs pos="100000">
-                      <a:schemeClr val="accent1">
-                        <a:tint val="63000"/>
-                        <a:satMod val="255000"/>
-                      </a:schemeClr>
-                    </a:gs>
-                  </a:gsLst>
-                  <a:lin ang="5400000"/>
-                </a:gradFill>
-                <a:effectLst>
-                  <a:outerShdw blurRad="50800" dist="38100" dir="5400000" algn="t" rotWithShape="0">
-                    <a:prstClr val="black">
-                      <a:alpha val="50000"/>
-                    </a:prstClr>
-                  </a:outerShdw>
-                </a:effectLst>
-              </a:defRPr>
+              <a:defRPr sz="4000" b="1" cap="all"/>
             </a:lvl1pPr>
           </a:lstStyle>
           <a:p>
             <a:r>
-              <a:rPr kumimoji="0" lang="en-US" smtClean="0"/>
+              <a:rPr lang="en-US" smtClean="0"/>
               <a:t>Click to edit Master title style</a:t>
             </a:r>
-            <a:endParaRPr kumimoji="0" lang="en-US"/>
+            <a:endParaRPr lang="en-US"/>
           </a:p>
         </p:txBody>
       </p:sp>
@@ -1403,23 +941,24 @@
         </p:nvSpPr>
         <p:spPr>
           <a:xfrm>
-            <a:off x="685800" y="2485800"/>
-            <a:ext cx="6629400" cy="1066688"/>
+            <a:off x="722313" y="2906713"/>
+            <a:ext cx="7772400" cy="1500187"/>
           </a:xfrm>
         </p:spPr>
         <p:txBody>
-          <a:bodyPr lIns="45720" tIns="0" rIns="45720" bIns="0" anchor="b"/>
+          <a:bodyPr anchor="b"/>
           <a:lstStyle>
-            <a:lvl1pPr marL="0" indent="0" algn="l">
+            <a:lvl1pPr marL="0" indent="0">
               <a:buNone/>
               <a:defRPr sz="2000">
                 <a:solidFill>
-                  <a:schemeClr val="tx1"/>
+                  <a:schemeClr val="tx1">
+                    <a:tint val="75000"/>
+                  </a:schemeClr>
                 </a:solidFill>
-                <a:effectLst/>
               </a:defRPr>
             </a:lvl1pPr>
-            <a:lvl2pPr>
+            <a:lvl2pPr marL="457200" indent="0">
               <a:buNone/>
               <a:defRPr sz="1800">
                 <a:solidFill>
@@ -1429,7 +968,7 @@
                 </a:solidFill>
               </a:defRPr>
             </a:lvl2pPr>
-            <a:lvl3pPr>
+            <a:lvl3pPr marL="914400" indent="0">
               <a:buNone/>
               <a:defRPr sz="1600">
                 <a:solidFill>
@@ -1439,7 +978,7 @@
                 </a:solidFill>
               </a:defRPr>
             </a:lvl3pPr>
-            <a:lvl4pPr>
+            <a:lvl4pPr marL="1371600" indent="0">
               <a:buNone/>
               <a:defRPr sz="1400">
                 <a:solidFill>
@@ -1449,7 +988,7 @@
                 </a:solidFill>
               </a:defRPr>
             </a:lvl4pPr>
-            <a:lvl5pPr>
+            <a:lvl5pPr marL="1828800" indent="0">
               <a:buNone/>
               <a:defRPr sz="1400">
                 <a:solidFill>
@@ -1459,11 +998,51 @@
                 </a:solidFill>
               </a:defRPr>
             </a:lvl5pPr>
+            <a:lvl6pPr marL="2286000" indent="0">
+              <a:buNone/>
+              <a:defRPr sz="1400">
+                <a:solidFill>
+                  <a:schemeClr val="tx1">
+                    <a:tint val="75000"/>
+                  </a:schemeClr>
+                </a:solidFill>
+              </a:defRPr>
+            </a:lvl6pPr>
+            <a:lvl7pPr marL="2743200" indent="0">
+              <a:buNone/>
+              <a:defRPr sz="1400">
+                <a:solidFill>
+                  <a:schemeClr val="tx1">
+                    <a:tint val="75000"/>
+                  </a:schemeClr>
+                </a:solidFill>
+              </a:defRPr>
+            </a:lvl7pPr>
+            <a:lvl8pPr marL="3200400" indent="0">
+              <a:buNone/>
+              <a:defRPr sz="1400">
+                <a:solidFill>
+                  <a:schemeClr val="tx1">
+                    <a:tint val="75000"/>
+                  </a:schemeClr>
+                </a:solidFill>
+              </a:defRPr>
+            </a:lvl8pPr>
+            <a:lvl9pPr marL="3657600" indent="0">
+              <a:buNone/>
+              <a:defRPr sz="1400">
+                <a:solidFill>
+                  <a:schemeClr val="tx1">
+                    <a:tint val="75000"/>
+                  </a:schemeClr>
+                </a:solidFill>
+              </a:defRPr>
+            </a:lvl9pPr>
           </a:lstStyle>
           <a:p>
-            <a:pPr lvl="0" eaLnBrk="1" latinLnBrk="0" hangingPunct="1"/>
-            <a:r>
-              <a:rPr kumimoji="0" lang="en-US" smtClean="0"/>
+            <a:pPr lvl="0"/>
+            <a:r>
+              <a:rPr lang="en-US" smtClean="0"/>
               <a:t>Click to edit Master text styles</a:t>
             </a:r>
           </a:p>
@@ -1487,7 +1066,7 @@
             <a:fld id="{60029C98-5D54-43BD-B436-29F4C541DD0B}" type="datetimeFigureOut">
               <a:rPr lang="en-US" smtClean="0"/>
               <a:pPr/>
-              <a:t>9/19/2009</a:t>
+              <a:t>9/23/2009</a:t>
             </a:fld>
             <a:endParaRPr lang="en-US"/>
           </a:p>
@@ -1539,7 +1118,7 @@
     </p:spTree>
   </p:cSld>
   <p:clrMapOvr>
-    <a:overrideClrMapping bg1="dk1" tx1="lt1" bg2="dk2" tx2="lt2" accent1="accent1" accent2="accent2" accent3="accent3" accent4="accent4" accent5="accent5" accent6="accent6" hlink="hlink" folHlink="folHlink"/>
+    <a:masterClrMapping/>
   </p:clrMapOvr>
 </p:sldLayout>
 </file>
@@ -1571,21 +1150,16 @@
             <p:ph type="title"/>
           </p:nvPr>
         </p:nvSpPr>
-        <p:spPr>
-          <a:xfrm>
-            <a:off x="457200" y="274638"/>
-            <a:ext cx="7467600" cy="1143000"/>
-          </a:xfrm>
-        </p:spPr>
-        <p:txBody>
-          <a:bodyPr/>
-          <a:lstStyle/>
-          <a:p>
-            <a:r>
-              <a:rPr kumimoji="0" lang="en-US" smtClean="0"/>
+        <p:spPr/>
+        <p:txBody>
+          <a:bodyPr/>
+          <a:lstStyle/>
+          <a:p>
+            <a:r>
+              <a:rPr lang="en-US" smtClean="0"/>
               <a:t>Click to edit Master title style</a:t>
             </a:r>
-            <a:endParaRPr kumimoji="0" lang="en-US"/>
+            <a:endParaRPr lang="en-US"/>
           </a:p>
         </p:txBody>
       </p:sp>
@@ -1602,17 +1176,17 @@
         <p:spPr>
           <a:xfrm>
             <a:off x="457200" y="1600200"/>
-            <a:ext cx="3657600" cy="4525963"/>
+            <a:ext cx="4038600" cy="4525963"/>
           </a:xfrm>
         </p:spPr>
         <p:txBody>
           <a:bodyPr/>
           <a:lstStyle>
             <a:lvl1pPr>
-              <a:defRPr sz="2600"/>
+              <a:defRPr sz="2800"/>
             </a:lvl1pPr>
             <a:lvl2pPr>
-              <a:defRPr sz="2200"/>
+              <a:defRPr sz="2400"/>
             </a:lvl2pPr>
             <a:lvl3pPr>
               <a:defRPr sz="2000"/>
@@ -1623,42 +1197,54 @@
             <a:lvl5pPr>
               <a:defRPr sz="1800"/>
             </a:lvl5pPr>
+            <a:lvl6pPr>
+              <a:defRPr sz="1800"/>
+            </a:lvl6pPr>
+            <a:lvl7pPr>
+              <a:defRPr sz="1800"/>
+            </a:lvl7pPr>
+            <a:lvl8pPr>
+              <a:defRPr sz="1800"/>
+            </a:lvl8pPr>
+            <a:lvl9pPr>
+              <a:defRPr sz="1800"/>
+            </a:lvl9pPr>
           </a:lstStyle>
           <a:p>
-            <a:pPr lvl="0" eaLnBrk="1" latinLnBrk="0" hangingPunct="1"/>
+            <a:pPr lvl="0"/>
             <a:r>
               <a:rPr lang="en-US" smtClean="0"/>
               <a:t>Click to edit Master text styles</a:t>
             </a:r>
           </a:p>
           <a:p>
-            <a:pPr lvl="1" eaLnBrk="1" latinLnBrk="0" hangingPunct="1"/>
+            <a:pPr lvl="1"/>
             <a:r>
               <a:rPr lang="en-US" smtClean="0"/>
               <a:t>Second level</a:t>
             </a:r>
           </a:p>
           <a:p>
-            <a:pPr lvl="2" eaLnBrk="1" latinLnBrk="0" hangingPunct="1"/>
+            <a:pPr lvl="2"/>
             <a:r>
               <a:rPr lang="en-US" smtClean="0"/>
               <a:t>Third level</a:t>
             </a:r>
           </a:p>
           <a:p>
-            <a:pPr lvl="3" eaLnBrk="1" latinLnBrk="0" hangingPunct="1"/>
+            <a:pPr lvl="3"/>
             <a:r>
               <a:rPr lang="en-US" smtClean="0"/>
               <a:t>Fourth level</a:t>
             </a:r>
           </a:p>
           <a:p>
-            <a:pPr lvl="4" eaLnBrk="1" latinLnBrk="0" hangingPunct="1"/>
+            <a:pPr lvl="4"/>
             <a:r>
               <a:rPr lang="en-US" smtClean="0"/>
               <a:t>Fifth level</a:t>
             </a:r>
-            <a:endParaRPr kumimoji="0" lang="en-US"/>
+            <a:endParaRPr lang="en-US"/>
           </a:p>
         </p:txBody>
       </p:sp>
@@ -1674,18 +1260,18 @@
         </p:nvSpPr>
         <p:spPr>
           <a:xfrm>
-            <a:off x="4267200" y="1600200"/>
-            <a:ext cx="3657600" cy="4525963"/>
+            <a:off x="4648200" y="1600200"/>
+            <a:ext cx="4038600" cy="4525963"/>
           </a:xfrm>
         </p:spPr>
         <p:txBody>
           <a:bodyPr/>
           <a:lstStyle>
             <a:lvl1pPr>
-              <a:defRPr sz="2600"/>
+              <a:defRPr sz="2800"/>
             </a:lvl1pPr>
             <a:lvl2pPr>
-              <a:defRPr sz="2200"/>
+              <a:defRPr sz="2400"/>
             </a:lvl2pPr>
             <a:lvl3pPr>
               <a:defRPr sz="2000"/>
@@ -1696,42 +1282,54 @@
             <a:lvl5pPr>
               <a:defRPr sz="1800"/>
             </a:lvl5pPr>
+            <a:lvl6pPr>
+              <a:defRPr sz="1800"/>
+            </a:lvl6pPr>
+            <a:lvl7pPr>
+              <a:defRPr sz="1800"/>
+            </a:lvl7pPr>
+            <a:lvl8pPr>
+              <a:defRPr sz="1800"/>
+            </a:lvl8pPr>
+            <a:lvl9pPr>
+              <a:defRPr sz="1800"/>
+            </a:lvl9pPr>
           </a:lstStyle>
           <a:p>
-            <a:pPr lvl="0" eaLnBrk="1" latinLnBrk="0" hangingPunct="1"/>
+            <a:pPr lvl="0"/>
             <a:r>
               <a:rPr lang="en-US" smtClean="0"/>
               <a:t>Click to edit Master text styles</a:t>
             </a:r>
           </a:p>
           <a:p>
-            <a:pPr lvl="1" eaLnBrk="1" latinLnBrk="0" hangingPunct="1"/>
+            <a:pPr lvl="1"/>
             <a:r>
               <a:rPr lang="en-US" smtClean="0"/>
               <a:t>Second level</a:t>
             </a:r>
           </a:p>
           <a:p>
-            <a:pPr lvl="2" eaLnBrk="1" latinLnBrk="0" hangingPunct="1"/>
+            <a:pPr lvl="2"/>
             <a:r>
               <a:rPr lang="en-US" smtClean="0"/>
               <a:t>Third level</a:t>
             </a:r>
           </a:p>
           <a:p>
-            <a:pPr lvl="3" eaLnBrk="1" latinLnBrk="0" hangingPunct="1"/>
+            <a:pPr lvl="3"/>
             <a:r>
               <a:rPr lang="en-US" smtClean="0"/>
               <a:t>Fourth level</a:t>
             </a:r>
           </a:p>
           <a:p>
-            <a:pPr lvl="4" eaLnBrk="1" latinLnBrk="0" hangingPunct="1"/>
+            <a:pPr lvl="4"/>
             <a:r>
               <a:rPr lang="en-US" smtClean="0"/>
               <a:t>Fifth level</a:t>
             </a:r>
-            <a:endParaRPr kumimoji="0" lang="en-US"/>
+            <a:endParaRPr lang="en-US"/>
           </a:p>
         </p:txBody>
       </p:sp>
@@ -1753,7 +1351,7 @@
             <a:fld id="{60029C98-5D54-43BD-B436-29F4C541DD0B}" type="datetimeFigureOut">
               <a:rPr lang="en-US" smtClean="0"/>
               <a:pPr/>
-              <a:t>9/19/2009</a:t>
+              <a:t>9/23/2009</a:t>
             </a:fld>
             <a:endParaRPr lang="en-US"/>
           </a:p>
@@ -1811,7 +1409,7 @@
 </file>
 
 <file path=ppt/slideLayouts/slideLayout5.xml><?xml version="1.0" encoding="utf-8"?>
-<p:sldLayout xmlns:a="http://schemas.openxmlformats.org/drawingml/2006/main" xmlns:r="http://schemas.openxmlformats.org/officeDocument/2006/relationships" xmlns:p="http://schemas.openxmlformats.org/presentationml/2006/main" showMasterSp="0" type="twoTxTwoObj" preserve="1">
+<p:sldLayout xmlns:a="http://schemas.openxmlformats.org/drawingml/2006/main" xmlns:r="http://schemas.openxmlformats.org/officeDocument/2006/relationships" xmlns:p="http://schemas.openxmlformats.org/presentationml/2006/main" type="twoTxTwoObj" preserve="1">
   <p:cSld name="Comparison">
     <p:spTree>
       <p:nvGrpSpPr>
@@ -1837,14 +1435,9 @@
             <p:ph type="title"/>
           </p:nvPr>
         </p:nvSpPr>
-        <p:spPr>
-          <a:xfrm>
-            <a:off x="457200" y="273050"/>
-            <a:ext cx="8229600" cy="1143000"/>
-          </a:xfrm>
-        </p:spPr>
-        <p:txBody>
-          <a:bodyPr anchor="ctr"/>
+        <p:spPr/>
+        <p:txBody>
+          <a:bodyPr/>
           <a:lstStyle>
             <a:lvl1pPr>
               <a:defRPr/>
@@ -1852,10 +1445,10 @@
           </a:lstStyle>
           <a:p>
             <a:r>
-              <a:rPr kumimoji="0" lang="en-US" smtClean="0"/>
+              <a:rPr lang="en-US" smtClean="0"/>
               <a:t>Click to edit Master title style</a:t>
             </a:r>
-            <a:endParaRPr kumimoji="0" lang="en-US"/>
+            <a:endParaRPr lang="en-US"/>
           </a:p>
         </p:txBody>
       </p:sp>
@@ -1871,42 +1464,54 @@
         </p:nvSpPr>
         <p:spPr>
           <a:xfrm>
-            <a:off x="457200" y="5486400"/>
-            <a:ext cx="4040188" cy="838200"/>
+            <a:off x="457200" y="1535113"/>
+            <a:ext cx="4040188" cy="639762"/>
           </a:xfrm>
         </p:spPr>
         <p:txBody>
-          <a:bodyPr anchor="t"/>
+          <a:bodyPr anchor="b"/>
           <a:lstStyle>
             <a:lvl1pPr marL="0" indent="0">
               <a:buNone/>
-              <a:defRPr sz="2400" b="1">
-                <a:solidFill>
-                  <a:schemeClr val="accent1"/>
-                </a:solidFill>
-              </a:defRPr>
+              <a:defRPr sz="2400" b="1"/>
             </a:lvl1pPr>
-            <a:lvl2pPr>
+            <a:lvl2pPr marL="457200" indent="0">
               <a:buNone/>
               <a:defRPr sz="2000" b="1"/>
             </a:lvl2pPr>
-            <a:lvl3pPr>
+            <a:lvl3pPr marL="914400" indent="0">
               <a:buNone/>
               <a:defRPr sz="1800" b="1"/>
             </a:lvl3pPr>
-            <a:lvl4pPr>
+            <a:lvl4pPr marL="1371600" indent="0">
               <a:buNone/>
               <a:defRPr sz="1600" b="1"/>
             </a:lvl4pPr>
-            <a:lvl5pPr>
+            <a:lvl5pPr marL="1828800" indent="0">
               <a:buNone/>
               <a:defRPr sz="1600" b="1"/>
             </a:lvl5pPr>
+            <a:lvl6pPr marL="2286000" indent="0">
+              <a:buNone/>
+              <a:defRPr sz="1600" b="1"/>
+            </a:lvl6pPr>
+            <a:lvl7pPr marL="2743200" indent="0">
+              <a:buNone/>
+              <a:defRPr sz="1600" b="1"/>
+            </a:lvl7pPr>
+            <a:lvl8pPr marL="3200400" indent="0">
+              <a:buNone/>
+              <a:defRPr sz="1600" b="1"/>
+            </a:lvl8pPr>
+            <a:lvl9pPr marL="3657600" indent="0">
+              <a:buNone/>
+              <a:defRPr sz="1600" b="1"/>
+            </a:lvl9pPr>
           </a:lstStyle>
           <a:p>
-            <a:pPr lvl="0" eaLnBrk="1" latinLnBrk="0" hangingPunct="1"/>
-            <a:r>
-              <a:rPr kumimoji="0" lang="en-US" smtClean="0"/>
+            <a:pPr lvl="0"/>
+            <a:r>
+              <a:rPr lang="en-US" smtClean="0"/>
               <a:t>Click to edit Master text styles</a:t>
             </a:r>
           </a:p>
@@ -1914,71 +1519,18 @@
       </p:sp>
       <p:sp>
         <p:nvSpPr>
-          <p:cNvPr id="4" name="Text Placeholder 3"/>
-          <p:cNvSpPr>
-            <a:spLocks noGrp="1"/>
-          </p:cNvSpPr>
-          <p:nvPr>
-            <p:ph type="body" sz="half" idx="3"/>
+          <p:cNvPr id="4" name="Content Placeholder 3"/>
+          <p:cNvSpPr>
+            <a:spLocks noGrp="1"/>
+          </p:cNvSpPr>
+          <p:nvPr>
+            <p:ph sz="half" idx="2"/>
           </p:nvPr>
         </p:nvSpPr>
         <p:spPr>
           <a:xfrm>
-            <a:off x="4645025" y="5486400"/>
-            <a:ext cx="4041775" cy="838200"/>
-          </a:xfrm>
-        </p:spPr>
-        <p:txBody>
-          <a:bodyPr anchor="t"/>
-          <a:lstStyle>
-            <a:lvl1pPr marL="0" indent="0">
-              <a:buNone/>
-              <a:defRPr sz="2400" b="1">
-                <a:solidFill>
-                  <a:schemeClr val="accent1"/>
-                </a:solidFill>
-              </a:defRPr>
-            </a:lvl1pPr>
-            <a:lvl2pPr>
-              <a:buNone/>
-              <a:defRPr sz="2000" b="1"/>
-            </a:lvl2pPr>
-            <a:lvl3pPr>
-              <a:buNone/>
-              <a:defRPr sz="1800" b="1"/>
-            </a:lvl3pPr>
-            <a:lvl4pPr>
-              <a:buNone/>
-              <a:defRPr sz="1600" b="1"/>
-            </a:lvl4pPr>
-            <a:lvl5pPr>
-              <a:buNone/>
-              <a:defRPr sz="1600" b="1"/>
-            </a:lvl5pPr>
-          </a:lstStyle>
-          <a:p>
-            <a:pPr lvl="0" eaLnBrk="1" latinLnBrk="0" hangingPunct="1"/>
-            <a:r>
-              <a:rPr kumimoji="0" lang="en-US" smtClean="0"/>
-              <a:t>Click to edit Master text styles</a:t>
-            </a:r>
-          </a:p>
-        </p:txBody>
-      </p:sp>
-      <p:sp>
-        <p:nvSpPr>
-          <p:cNvPr id="5" name="Content Placeholder 4"/>
-          <p:cNvSpPr>
-            <a:spLocks noGrp="1"/>
-          </p:cNvSpPr>
-          <p:nvPr>
-            <p:ph sz="quarter" idx="2"/>
-          </p:nvPr>
-        </p:nvSpPr>
-        <p:spPr>
-          <a:xfrm>
-            <a:off x="457200" y="1516912"/>
-            <a:ext cx="4040188" cy="3941763"/>
+            <a:off x="457200" y="2174875"/>
+            <a:ext cx="4040188" cy="3951288"/>
           </a:xfrm>
         </p:spPr>
         <p:txBody>
@@ -1999,59 +1551,136 @@
             <a:lvl5pPr>
               <a:defRPr sz="1600"/>
             </a:lvl5pPr>
+            <a:lvl6pPr>
+              <a:defRPr sz="1600"/>
+            </a:lvl6pPr>
+            <a:lvl7pPr>
+              <a:defRPr sz="1600"/>
+            </a:lvl7pPr>
+            <a:lvl8pPr>
+              <a:defRPr sz="1600"/>
+            </a:lvl8pPr>
+            <a:lvl9pPr>
+              <a:defRPr sz="1600"/>
+            </a:lvl9pPr>
           </a:lstStyle>
           <a:p>
-            <a:pPr lvl="0" eaLnBrk="1" latinLnBrk="0" hangingPunct="1"/>
+            <a:pPr lvl="0"/>
             <a:r>
               <a:rPr lang="en-US" smtClean="0"/>
               <a:t>Click to edit Master text styles</a:t>
             </a:r>
           </a:p>
           <a:p>
-            <a:pPr lvl="1" eaLnBrk="1" latinLnBrk="0" hangingPunct="1"/>
+            <a:pPr lvl="1"/>
             <a:r>
               <a:rPr lang="en-US" smtClean="0"/>
               <a:t>Second level</a:t>
             </a:r>
           </a:p>
           <a:p>
-            <a:pPr lvl="2" eaLnBrk="1" latinLnBrk="0" hangingPunct="1"/>
+            <a:pPr lvl="2"/>
             <a:r>
               <a:rPr lang="en-US" smtClean="0"/>
               <a:t>Third level</a:t>
             </a:r>
           </a:p>
           <a:p>
-            <a:pPr lvl="3" eaLnBrk="1" latinLnBrk="0" hangingPunct="1"/>
+            <a:pPr lvl="3"/>
             <a:r>
               <a:rPr lang="en-US" smtClean="0"/>
               <a:t>Fourth level</a:t>
             </a:r>
           </a:p>
           <a:p>
-            <a:pPr lvl="4" eaLnBrk="1" latinLnBrk="0" hangingPunct="1"/>
+            <a:pPr lvl="4"/>
             <a:r>
               <a:rPr lang="en-US" smtClean="0"/>
               <a:t>Fifth level</a:t>
             </a:r>
-            <a:endParaRPr kumimoji="0" lang="en-US"/>
-          </a:p>
-        </p:txBody>
-      </p:sp>
-      <p:sp>
-        <p:nvSpPr>
-          <p:cNvPr id="6" name="Content Placeholder 5"/>
-          <p:cNvSpPr>
-            <a:spLocks noGrp="1"/>
-          </p:cNvSpPr>
-          <p:nvPr>
-            <p:ph sz="quarter" idx="4"/>
+            <a:endParaRPr lang="en-US"/>
+          </a:p>
+        </p:txBody>
+      </p:sp>
+      <p:sp>
+        <p:nvSpPr>
+          <p:cNvPr id="5" name="Text Placeholder 4"/>
+          <p:cNvSpPr>
+            <a:spLocks noGrp="1"/>
+          </p:cNvSpPr>
+          <p:nvPr>
+            <p:ph type="body" sz="quarter" idx="3"/>
           </p:nvPr>
         </p:nvSpPr>
         <p:spPr>
           <a:xfrm>
-            <a:off x="4645025" y="1516912"/>
-            <a:ext cx="4041775" cy="3941763"/>
+            <a:off x="4645025" y="1535113"/>
+            <a:ext cx="4041775" cy="639762"/>
+          </a:xfrm>
+        </p:spPr>
+        <p:txBody>
+          <a:bodyPr anchor="b"/>
+          <a:lstStyle>
+            <a:lvl1pPr marL="0" indent="0">
+              <a:buNone/>
+              <a:defRPr sz="2400" b="1"/>
+            </a:lvl1pPr>
+            <a:lvl2pPr marL="457200" indent="0">
+              <a:buNone/>
+              <a:defRPr sz="2000" b="1"/>
+            </a:lvl2pPr>
+            <a:lvl3pPr marL="914400" indent="0">
+              <a:buNone/>
+              <a:defRPr sz="1800" b="1"/>
+            </a:lvl3pPr>
+            <a:lvl4pPr marL="1371600" indent="0">
+              <a:buNone/>
+              <a:defRPr sz="1600" b="1"/>
+            </a:lvl4pPr>
+            <a:lvl5pPr marL="1828800" indent="0">
+              <a:buNone/>
+              <a:defRPr sz="1600" b="1"/>
+            </a:lvl5pPr>
+            <a:lvl6pPr marL="2286000" indent="0">
+              <a:buNone/>
+              <a:defRPr sz="1600" b="1"/>
+            </a:lvl6pPr>
+            <a:lvl7pPr marL="2743200" indent="0">
+              <a:buNone/>
+              <a:defRPr sz="1600" b="1"/>
+            </a:lvl7pPr>
+            <a:lvl8pPr marL="3200400" indent="0">
+              <a:buNone/>
+              <a:defRPr sz="1600" b="1"/>
+            </a:lvl8pPr>
+            <a:lvl9pPr marL="3657600" indent="0">
+              <a:buNone/>
+              <a:defRPr sz="1600" b="1"/>
+            </a:lvl9pPr>
+          </a:lstStyle>
+          <a:p>
+            <a:pPr lvl="0"/>
+            <a:r>
+              <a:rPr lang="en-US" smtClean="0"/>
+              <a:t>Click to edit Master text styles</a:t>
+            </a:r>
+          </a:p>
+        </p:txBody>
+      </p:sp>
+      <p:sp>
+        <p:nvSpPr>
+          <p:cNvPr id="6" name="Content Placeholder 5"/>
+          <p:cNvSpPr>
+            <a:spLocks noGrp="1"/>
+          </p:cNvSpPr>
+          <p:nvPr>
+            <p:ph sz="quarter" idx="4"/>
+          </p:nvPr>
+        </p:nvSpPr>
+        <p:spPr>
+          <a:xfrm>
+            <a:off x="4645025" y="2174875"/>
+            <a:ext cx="4041775" cy="3951288"/>
           </a:xfrm>
         </p:spPr>
         <p:txBody>
@@ -2072,42 +1701,54 @@
             <a:lvl5pPr>
               <a:defRPr sz="1600"/>
             </a:lvl5pPr>
+            <a:lvl6pPr>
+              <a:defRPr sz="1600"/>
+            </a:lvl6pPr>
+            <a:lvl7pPr>
+              <a:defRPr sz="1600"/>
+            </a:lvl7pPr>
+            <a:lvl8pPr>
+              <a:defRPr sz="1600"/>
+            </a:lvl8pPr>
+            <a:lvl9pPr>
+              <a:defRPr sz="1600"/>
+            </a:lvl9pPr>
           </a:lstStyle>
           <a:p>
-            <a:pPr lvl="0" eaLnBrk="1" latinLnBrk="0" hangingPunct="1"/>
+            <a:pPr lvl="0"/>
             <a:r>
               <a:rPr lang="en-US" smtClean="0"/>
               <a:t>Click to edit Master text styles</a:t>
             </a:r>
           </a:p>
           <a:p>
-            <a:pPr lvl="1" eaLnBrk="1" latinLnBrk="0" hangingPunct="1"/>
+            <a:pPr lvl="1"/>
             <a:r>
               <a:rPr lang="en-US" smtClean="0"/>
               <a:t>Second level</a:t>
             </a:r>
           </a:p>
           <a:p>
-            <a:pPr lvl="2" eaLnBrk="1" latinLnBrk="0" hangingPunct="1"/>
+            <a:pPr lvl="2"/>
             <a:r>
               <a:rPr lang="en-US" smtClean="0"/>
               <a:t>Third level</a:t>
             </a:r>
           </a:p>
           <a:p>
-            <a:pPr lvl="3" eaLnBrk="1" latinLnBrk="0" hangingPunct="1"/>
+            <a:pPr lvl="3"/>
             <a:r>
               <a:rPr lang="en-US" smtClean="0"/>
               <a:t>Fourth level</a:t>
             </a:r>
           </a:p>
           <a:p>
-            <a:pPr lvl="4" eaLnBrk="1" latinLnBrk="0" hangingPunct="1"/>
+            <a:pPr lvl="4"/>
             <a:r>
               <a:rPr lang="en-US" smtClean="0"/>
               <a:t>Fifth level</a:t>
             </a:r>
-            <a:endParaRPr kumimoji="0" lang="en-US"/>
+            <a:endParaRPr lang="en-US"/>
           </a:p>
         </p:txBody>
       </p:sp>
@@ -2129,7 +1770,7 @@
             <a:fld id="{60029C98-5D54-43BD-B436-29F4C541DD0B}" type="datetimeFigureOut">
               <a:rPr lang="en-US" smtClean="0"/>
               <a:pPr/>
-              <a:t>9/19/2009</a:t>
+              <a:t>9/23/2009</a:t>
             </a:fld>
             <a:endParaRPr lang="en-US"/>
           </a:p>
@@ -2213,31 +1854,22 @@
             <p:ph type="title"/>
           </p:nvPr>
         </p:nvSpPr>
-        <p:spPr>
-          <a:xfrm>
-            <a:off x="457200" y="274320"/>
-            <a:ext cx="7470648" cy="1143000"/>
-          </a:xfrm>
-        </p:spPr>
-        <p:txBody>
-          <a:bodyPr anchor="ctr"/>
-          <a:lstStyle>
-            <a:lvl1pPr algn="l">
-              <a:defRPr sz="4600"/>
-            </a:lvl1pPr>
-          </a:lstStyle>
-          <a:p>
-            <a:r>
-              <a:rPr kumimoji="0" lang="en-US" smtClean="0"/>
+        <p:spPr/>
+        <p:txBody>
+          <a:bodyPr/>
+          <a:lstStyle/>
+          <a:p>
+            <a:r>
+              <a:rPr lang="en-US" smtClean="0"/>
               <a:t>Click to edit Master title style</a:t>
             </a:r>
-            <a:endParaRPr kumimoji="0" lang="en-US"/>
-          </a:p>
-        </p:txBody>
-      </p:sp>
-      <p:sp>
-        <p:nvSpPr>
-          <p:cNvPr id="7" name="Date Placeholder 6"/>
+            <a:endParaRPr lang="en-US"/>
+          </a:p>
+        </p:txBody>
+      </p:sp>
+      <p:sp>
+        <p:nvSpPr>
+          <p:cNvPr id="3" name="Date Placeholder 2"/>
           <p:cNvSpPr>
             <a:spLocks noGrp="1"/>
           </p:cNvSpPr>
@@ -2253,7 +1885,7 @@
             <a:fld id="{60029C98-5D54-43BD-B436-29F4C541DD0B}" type="datetimeFigureOut">
               <a:rPr lang="en-US" smtClean="0"/>
               <a:pPr/>
-              <a:t>9/19/2009</a:t>
+              <a:t>9/23/2009</a:t>
             </a:fld>
             <a:endParaRPr lang="en-US"/>
           </a:p>
@@ -2261,12 +1893,31 @@
       </p:sp>
       <p:sp>
         <p:nvSpPr>
-          <p:cNvPr id="8" name="Slide Number Placeholder 7"/>
-          <p:cNvSpPr>
-            <a:spLocks noGrp="1"/>
-          </p:cNvSpPr>
-          <p:nvPr>
-            <p:ph type="sldNum" sz="quarter" idx="11"/>
+          <p:cNvPr id="4" name="Footer Placeholder 3"/>
+          <p:cNvSpPr>
+            <a:spLocks noGrp="1"/>
+          </p:cNvSpPr>
+          <p:nvPr>
+            <p:ph type="ftr" sz="quarter" idx="11"/>
+          </p:nvPr>
+        </p:nvSpPr>
+        <p:spPr/>
+        <p:txBody>
+          <a:bodyPr/>
+          <a:lstStyle/>
+          <a:p>
+            <a:endParaRPr lang="en-US"/>
+          </a:p>
+        </p:txBody>
+      </p:sp>
+      <p:sp>
+        <p:nvSpPr>
+          <p:cNvPr id="5" name="Slide Number Placeholder 4"/>
+          <p:cNvSpPr>
+            <a:spLocks noGrp="1"/>
+          </p:cNvSpPr>
+          <p:nvPr>
+            <p:ph type="sldNum" sz="quarter" idx="12"/>
           </p:nvPr>
         </p:nvSpPr>
         <p:spPr/>
@@ -2279,25 +1930,6 @@
               <a:pPr/>
               <a:t>‹#›</a:t>
             </a:fld>
-            <a:endParaRPr lang="en-US"/>
-          </a:p>
-        </p:txBody>
-      </p:sp>
-      <p:sp>
-        <p:nvSpPr>
-          <p:cNvPr id="9" name="Footer Placeholder 8"/>
-          <p:cNvSpPr>
-            <a:spLocks noGrp="1"/>
-          </p:cNvSpPr>
-          <p:nvPr>
-            <p:ph type="ftr" sz="quarter" idx="12"/>
-          </p:nvPr>
-        </p:nvSpPr>
-        <p:spPr/>
-        <p:txBody>
-          <a:bodyPr/>
-          <a:lstStyle/>
-          <a:p>
             <a:endParaRPr lang="en-US"/>
           </a:p>
         </p:txBody>
@@ -2345,7 +1977,7 @@
             <a:fld id="{60029C98-5D54-43BD-B436-29F4C541DD0B}" type="datetimeFigureOut">
               <a:rPr lang="en-US" smtClean="0"/>
               <a:pPr/>
-              <a:t>9/19/2009</a:t>
+              <a:t>9/23/2009</a:t>
             </a:fld>
             <a:endParaRPr lang="en-US"/>
           </a:p>
@@ -2431,107 +2063,53 @@
         </p:nvSpPr>
         <p:spPr>
           <a:xfrm>
-            <a:off x="457200" y="1185528"/>
-            <a:ext cx="3200400" cy="730250"/>
+            <a:off x="457200" y="273050"/>
+            <a:ext cx="3008313" cy="1162050"/>
           </a:xfrm>
         </p:spPr>
         <p:txBody>
-          <a:bodyPr tIns="0" bIns="0" anchor="t"/>
+          <a:bodyPr anchor="b"/>
           <a:lstStyle>
             <a:lvl1pPr algn="l">
-              <a:buNone/>
-              <a:defRPr sz="1800" b="1">
-                <a:solidFill>
-                  <a:schemeClr val="accent1"/>
-                </a:solidFill>
-              </a:defRPr>
+              <a:defRPr sz="2000" b="1"/>
             </a:lvl1pPr>
           </a:lstStyle>
           <a:p>
             <a:r>
-              <a:rPr kumimoji="0" lang="en-US" smtClean="0"/>
+              <a:rPr lang="en-US" smtClean="0"/>
               <a:t>Click to edit Master title style</a:t>
             </a:r>
-            <a:endParaRPr kumimoji="0" lang="en-US"/>
-          </a:p>
-        </p:txBody>
-      </p:sp>
-      <p:sp>
-        <p:nvSpPr>
-          <p:cNvPr id="3" name="Text Placeholder 2"/>
-          <p:cNvSpPr>
-            <a:spLocks noGrp="1"/>
-          </p:cNvSpPr>
-          <p:nvPr>
-            <p:ph type="body" idx="2"/>
+            <a:endParaRPr lang="en-US"/>
+          </a:p>
+        </p:txBody>
+      </p:sp>
+      <p:sp>
+        <p:nvSpPr>
+          <p:cNvPr id="3" name="Content Placeholder 2"/>
+          <p:cNvSpPr>
+            <a:spLocks noGrp="1"/>
+          </p:cNvSpPr>
+          <p:nvPr>
+            <p:ph idx="1"/>
           </p:nvPr>
         </p:nvSpPr>
         <p:spPr>
           <a:xfrm>
-            <a:off x="457200" y="214424"/>
-            <a:ext cx="2743200" cy="914400"/>
+            <a:off x="3575050" y="273050"/>
+            <a:ext cx="5111750" cy="5853113"/>
           </a:xfrm>
         </p:spPr>
         <p:txBody>
-          <a:bodyPr lIns="45720" tIns="0" rIns="45720" bIns="0" anchor="b"/>
+          <a:bodyPr/>
           <a:lstStyle>
-            <a:lvl1pPr marL="0" indent="0" algn="l">
-              <a:buNone/>
-              <a:defRPr sz="1400"/>
+            <a:lvl1pPr>
+              <a:defRPr sz="3200"/>
             </a:lvl1pPr>
             <a:lvl2pPr>
-              <a:buNone/>
-              <a:defRPr sz="1200"/>
+              <a:defRPr sz="2800"/>
             </a:lvl2pPr>
             <a:lvl3pPr>
-              <a:buNone/>
-              <a:defRPr sz="1000"/>
-            </a:lvl3pPr>
-            <a:lvl4pPr>
-              <a:buNone/>
-              <a:defRPr sz="900"/>
-            </a:lvl4pPr>
-            <a:lvl5pPr>
-              <a:buNone/>
-              <a:defRPr sz="900"/>
-            </a:lvl5pPr>
-          </a:lstStyle>
-          <a:p>
-            <a:pPr lvl="0" eaLnBrk="1" latinLnBrk="0" hangingPunct="1"/>
-            <a:r>
-              <a:rPr kumimoji="0" lang="en-US" smtClean="0"/>
-              <a:t>Click to edit Master text styles</a:t>
-            </a:r>
-          </a:p>
-        </p:txBody>
-      </p:sp>
-      <p:sp>
-        <p:nvSpPr>
-          <p:cNvPr id="4" name="Content Placeholder 3"/>
-          <p:cNvSpPr>
-            <a:spLocks noGrp="1"/>
-          </p:cNvSpPr>
-          <p:nvPr>
-            <p:ph sz="half" idx="1"/>
-          </p:nvPr>
-        </p:nvSpPr>
-        <p:spPr>
-          <a:xfrm>
-            <a:off x="457200" y="1981200"/>
-            <a:ext cx="7086600" cy="3810000"/>
-          </a:xfrm>
-        </p:spPr>
-        <p:txBody>
-          <a:bodyPr/>
-          <a:lstStyle>
-            <a:lvl1pPr>
-              <a:defRPr sz="2800"/>
-            </a:lvl1pPr>
-            <a:lvl2pPr>
               <a:defRPr sz="2400"/>
-            </a:lvl2pPr>
-            <a:lvl3pPr>
-              <a:defRPr sz="2200"/>
             </a:lvl3pPr>
             <a:lvl4pPr>
               <a:defRPr sz="2000"/>
@@ -2539,104 +2117,176 @@
             <a:lvl5pPr>
               <a:defRPr sz="2000"/>
             </a:lvl5pPr>
+            <a:lvl6pPr>
+              <a:defRPr sz="2000"/>
+            </a:lvl6pPr>
+            <a:lvl7pPr>
+              <a:defRPr sz="2000"/>
+            </a:lvl7pPr>
+            <a:lvl8pPr>
+              <a:defRPr sz="2000"/>
+            </a:lvl8pPr>
+            <a:lvl9pPr>
+              <a:defRPr sz="2000"/>
+            </a:lvl9pPr>
           </a:lstStyle>
           <a:p>
-            <a:pPr lvl="0" eaLnBrk="1" latinLnBrk="0" hangingPunct="1"/>
+            <a:pPr lvl="0"/>
             <a:r>
               <a:rPr lang="en-US" smtClean="0"/>
               <a:t>Click to edit Master text styles</a:t>
             </a:r>
           </a:p>
           <a:p>
-            <a:pPr lvl="1" eaLnBrk="1" latinLnBrk="0" hangingPunct="1"/>
+            <a:pPr lvl="1"/>
             <a:r>
               <a:rPr lang="en-US" smtClean="0"/>
               <a:t>Second level</a:t>
             </a:r>
           </a:p>
           <a:p>
-            <a:pPr lvl="2" eaLnBrk="1" latinLnBrk="0" hangingPunct="1"/>
+            <a:pPr lvl="2"/>
             <a:r>
               <a:rPr lang="en-US" smtClean="0"/>
               <a:t>Third level</a:t>
             </a:r>
           </a:p>
           <a:p>
-            <a:pPr lvl="3" eaLnBrk="1" latinLnBrk="0" hangingPunct="1"/>
+            <a:pPr lvl="3"/>
             <a:r>
               <a:rPr lang="en-US" smtClean="0"/>
               <a:t>Fourth level</a:t>
             </a:r>
           </a:p>
           <a:p>
-            <a:pPr lvl="4" eaLnBrk="1" latinLnBrk="0" hangingPunct="1"/>
+            <a:pPr lvl="4"/>
             <a:r>
               <a:rPr lang="en-US" smtClean="0"/>
               <a:t>Fifth level</a:t>
             </a:r>
-            <a:endParaRPr kumimoji="0" lang="en-US"/>
-          </a:p>
-        </p:txBody>
-      </p:sp>
-      <p:sp>
-        <p:nvSpPr>
-          <p:cNvPr id="5" name="Date Placeholder 4"/>
-          <p:cNvSpPr>
-            <a:spLocks noGrp="1"/>
-          </p:cNvSpPr>
-          <p:nvPr>
-            <p:ph type="dt" sz="half" idx="10"/>
-          </p:nvPr>
-        </p:nvSpPr>
-        <p:spPr/>
-        <p:txBody>
-          <a:bodyPr/>
-          <a:lstStyle/>
-          <a:p>
-            <a:fld id="{60029C98-5D54-43BD-B436-29F4C541DD0B}" type="datetimeFigureOut">
-              <a:rPr lang="en-US" smtClean="0"/>
-              <a:pPr/>
-              <a:t>9/19/2009</a:t>
-            </a:fld>
-            <a:endParaRPr lang="en-US"/>
-          </a:p>
-        </p:txBody>
-      </p:sp>
-      <p:sp>
-        <p:nvSpPr>
-          <p:cNvPr id="6" name="Footer Placeholder 5"/>
-          <p:cNvSpPr>
-            <a:spLocks noGrp="1"/>
-          </p:cNvSpPr>
-          <p:nvPr>
-            <p:ph type="ftr" sz="quarter" idx="11"/>
-          </p:nvPr>
-        </p:nvSpPr>
-        <p:spPr/>
-        <p:txBody>
-          <a:bodyPr/>
-          <a:lstStyle/>
-          <a:p>
-            <a:endParaRPr lang="en-US"/>
-          </a:p>
-        </p:txBody>
-      </p:sp>
-      <p:sp>
-        <p:nvSpPr>
-          <p:cNvPr id="7" name="Slide Number Placeholder 6"/>
-          <p:cNvSpPr>
-            <a:spLocks noGrp="1"/>
-          </p:cNvSpPr>
-          <p:nvPr>
-            <p:ph type="sldNum" sz="quarter" idx="12"/>
+            <a:endParaRPr lang="en-US"/>
+          </a:p>
+        </p:txBody>
+      </p:sp>
+      <p:sp>
+        <p:nvSpPr>
+          <p:cNvPr id="4" name="Text Placeholder 3"/>
+          <p:cNvSpPr>
+            <a:spLocks noGrp="1"/>
+          </p:cNvSpPr>
+          <p:nvPr>
+            <p:ph type="body" sz="half" idx="2"/>
           </p:nvPr>
         </p:nvSpPr>
         <p:spPr>
           <a:xfrm>
-            <a:off x="8156448" y="6422064"/>
-            <a:ext cx="762000" cy="365125"/>
+            <a:off x="457200" y="1435100"/>
+            <a:ext cx="3008313" cy="4691063"/>
           </a:xfrm>
         </p:spPr>
+        <p:txBody>
+          <a:bodyPr/>
+          <a:lstStyle>
+            <a:lvl1pPr marL="0" indent="0">
+              <a:buNone/>
+              <a:defRPr sz="1400"/>
+            </a:lvl1pPr>
+            <a:lvl2pPr marL="457200" indent="0">
+              <a:buNone/>
+              <a:defRPr sz="1200"/>
+            </a:lvl2pPr>
+            <a:lvl3pPr marL="914400" indent="0">
+              <a:buNone/>
+              <a:defRPr sz="1000"/>
+            </a:lvl3pPr>
+            <a:lvl4pPr marL="1371600" indent="0">
+              <a:buNone/>
+              <a:defRPr sz="900"/>
+            </a:lvl4pPr>
+            <a:lvl5pPr marL="1828800" indent="0">
+              <a:buNone/>
+              <a:defRPr sz="900"/>
+            </a:lvl5pPr>
+            <a:lvl6pPr marL="2286000" indent="0">
+              <a:buNone/>
+              <a:defRPr sz="900"/>
+            </a:lvl6pPr>
+            <a:lvl7pPr marL="2743200" indent="0">
+              <a:buNone/>
+              <a:defRPr sz="900"/>
+            </a:lvl7pPr>
+            <a:lvl8pPr marL="3200400" indent="0">
+              <a:buNone/>
+              <a:defRPr sz="900"/>
+            </a:lvl8pPr>
+            <a:lvl9pPr marL="3657600" indent="0">
+              <a:buNone/>
+              <a:defRPr sz="900"/>
+            </a:lvl9pPr>
+          </a:lstStyle>
+          <a:p>
+            <a:pPr lvl="0"/>
+            <a:r>
+              <a:rPr lang="en-US" smtClean="0"/>
+              <a:t>Click to edit Master text styles</a:t>
+            </a:r>
+          </a:p>
+        </p:txBody>
+      </p:sp>
+      <p:sp>
+        <p:nvSpPr>
+          <p:cNvPr id="5" name="Date Placeholder 4"/>
+          <p:cNvSpPr>
+            <a:spLocks noGrp="1"/>
+          </p:cNvSpPr>
+          <p:nvPr>
+            <p:ph type="dt" sz="half" idx="10"/>
+          </p:nvPr>
+        </p:nvSpPr>
+        <p:spPr/>
+        <p:txBody>
+          <a:bodyPr/>
+          <a:lstStyle/>
+          <a:p>
+            <a:fld id="{60029C98-5D54-43BD-B436-29F4C541DD0B}" type="datetimeFigureOut">
+              <a:rPr lang="en-US" smtClean="0"/>
+              <a:pPr/>
+              <a:t>9/23/2009</a:t>
+            </a:fld>
+            <a:endParaRPr lang="en-US"/>
+          </a:p>
+        </p:txBody>
+      </p:sp>
+      <p:sp>
+        <p:nvSpPr>
+          <p:cNvPr id="6" name="Footer Placeholder 5"/>
+          <p:cNvSpPr>
+            <a:spLocks noGrp="1"/>
+          </p:cNvSpPr>
+          <p:nvPr>
+            <p:ph type="ftr" sz="quarter" idx="11"/>
+          </p:nvPr>
+        </p:nvSpPr>
+        <p:spPr/>
+        <p:txBody>
+          <a:bodyPr/>
+          <a:lstStyle/>
+          <a:p>
+            <a:endParaRPr lang="en-US"/>
+          </a:p>
+        </p:txBody>
+      </p:sp>
+      <p:sp>
+        <p:nvSpPr>
+          <p:cNvPr id="7" name="Slide Number Placeholder 6"/>
+          <p:cNvSpPr>
+            <a:spLocks noGrp="1"/>
+          </p:cNvSpPr>
+          <p:nvPr>
+            <p:ph type="sldNum" sz="quarter" idx="12"/>
+          </p:nvPr>
+        </p:nvSpPr>
+        <p:spPr/>
         <p:txBody>
           <a:bodyPr/>
           <a:lstStyle/>
@@ -2659,7 +2309,7 @@
 </file>
 
 <file path=ppt/slideLayouts/slideLayout9.xml><?xml version="1.0" encoding="utf-8"?>
-<p:sldLayout xmlns:a="http://schemas.openxmlformats.org/drawingml/2006/main" xmlns:r="http://schemas.openxmlformats.org/officeDocument/2006/relationships" xmlns:p="http://schemas.openxmlformats.org/presentationml/2006/main" showMasterSp="0" type="picTx" preserve="1">
+<p:sldLayout xmlns:a="http://schemas.openxmlformats.org/drawingml/2006/main" xmlns:r="http://schemas.openxmlformats.org/officeDocument/2006/relationships" xmlns:p="http://schemas.openxmlformats.org/presentationml/2006/main" type="picTx" preserve="1">
   <p:cSld name="Picture with Caption">
     <p:spTree>
       <p:nvGrpSpPr>
@@ -2687,28 +2337,23 @@
         </p:nvSpPr>
         <p:spPr>
           <a:xfrm>
-            <a:off x="5556732" y="1705709"/>
-            <a:ext cx="3053868" cy="1253808"/>
+            <a:off x="1792288" y="4800600"/>
+            <a:ext cx="5486400" cy="566738"/>
           </a:xfrm>
         </p:spPr>
         <p:txBody>
           <a:bodyPr anchor="b"/>
           <a:lstStyle>
             <a:lvl1pPr algn="l">
-              <a:buNone/>
-              <a:defRPr sz="2200" b="1">
-                <a:solidFill>
-                  <a:schemeClr val="accent1"/>
-                </a:solidFill>
-              </a:defRPr>
+              <a:defRPr sz="2000" b="1"/>
             </a:lvl1pPr>
           </a:lstStyle>
           <a:p>
             <a:r>
-              <a:rPr kumimoji="0" lang="en-US" smtClean="0"/>
+              <a:rPr lang="en-US" smtClean="0"/>
               <a:t>Click to edit Master title style</a:t>
             </a:r>
-            <a:endParaRPr kumimoji="0" lang="en-US"/>
+            <a:endParaRPr lang="en-US"/>
           </a:p>
         </p:txBody>
       </p:sp>
@@ -2724,44 +2369,9 @@
         </p:nvSpPr>
         <p:spPr>
           <a:xfrm>
-            <a:off x="1065628" y="1019907"/>
-            <a:ext cx="4114800" cy="4114800"/>
+            <a:off x="1792288" y="612775"/>
+            <a:ext cx="5486400" cy="4114800"/>
           </a:xfrm>
-          <a:prstGeom prst="ellipse">
-            <a:avLst/>
-          </a:prstGeom>
-          <a:solidFill>
-            <a:schemeClr val="bg2">
-              <a:shade val="50000"/>
-            </a:schemeClr>
-          </a:solidFill>
-          <a:ln w="50800" cap="flat">
-            <a:solidFill>
-              <a:schemeClr val="bg2"/>
-            </a:solidFill>
-            <a:miter lim="800000"/>
-          </a:ln>
-          <a:effectLst>
-            <a:outerShdw blurRad="152000" dist="345000" dir="5400000" sx="-80000" sy="-18000" rotWithShape="0">
-              <a:srgbClr val="000000">
-                <a:alpha val="25000"/>
-              </a:srgbClr>
-            </a:outerShdw>
-          </a:effectLst>
-          <a:scene3d>
-            <a:camera prst="orthographicFront"/>
-            <a:lightRig rig="contrasting" dir="t">
-              <a:rot lat="0" lon="0" rev="2400000"/>
-            </a:lightRig>
-          </a:scene3d>
-          <a:sp3d contourW="7620">
-            <a:bevelT w="63500" h="63500"/>
-            <a:contourClr>
-              <a:schemeClr val="bg2">
-                <a:shade val="50000"/>
-              </a:schemeClr>
-            </a:contourClr>
-          </a:sp3d>
         </p:spPr>
         <p:txBody>
           <a:bodyPr/>
@@ -2770,13 +2380,45 @@
               <a:buNone/>
               <a:defRPr sz="3200"/>
             </a:lvl1pPr>
+            <a:lvl2pPr marL="457200" indent="0">
+              <a:buNone/>
+              <a:defRPr sz="2800"/>
+            </a:lvl2pPr>
+            <a:lvl3pPr marL="914400" indent="0">
+              <a:buNone/>
+              <a:defRPr sz="2400"/>
+            </a:lvl3pPr>
+            <a:lvl4pPr marL="1371600" indent="0">
+              <a:buNone/>
+              <a:defRPr sz="2000"/>
+            </a:lvl4pPr>
+            <a:lvl5pPr marL="1828800" indent="0">
+              <a:buNone/>
+              <a:defRPr sz="2000"/>
+            </a:lvl5pPr>
+            <a:lvl6pPr marL="2286000" indent="0">
+              <a:buNone/>
+              <a:defRPr sz="2000"/>
+            </a:lvl6pPr>
+            <a:lvl7pPr marL="2743200" indent="0">
+              <a:buNone/>
+              <a:defRPr sz="2000"/>
+            </a:lvl7pPr>
+            <a:lvl8pPr marL="3200400" indent="0">
+              <a:buNone/>
+              <a:defRPr sz="2000"/>
+            </a:lvl8pPr>
+            <a:lvl9pPr marL="3657600" indent="0">
+              <a:buNone/>
+              <a:defRPr sz="2000"/>
+            </a:lvl9pPr>
           </a:lstStyle>
           <a:p>
             <a:r>
-              <a:rPr kumimoji="0" lang="en-US" smtClean="0"/>
+              <a:rPr lang="en-US" smtClean="0"/>
               <a:t>Click icon to add picture</a:t>
             </a:r>
-            <a:endParaRPr kumimoji="0" lang="en-US" dirty="0"/>
+            <a:endParaRPr lang="en-US"/>
           </a:p>
         </p:txBody>
       </p:sp>
@@ -2792,43 +2434,54 @@
         </p:nvSpPr>
         <p:spPr>
           <a:xfrm>
-            <a:off x="5556734" y="2998765"/>
-            <a:ext cx="3053866" cy="2663482"/>
+            <a:off x="1792288" y="5367338"/>
+            <a:ext cx="5486400" cy="804862"/>
           </a:xfrm>
         </p:spPr>
         <p:txBody>
-          <a:bodyPr lIns="45720" rIns="45720"/>
+          <a:bodyPr/>
           <a:lstStyle>
             <a:lvl1pPr marL="0" indent="0">
-              <a:buFontTx/>
               <a:buNone/>
-              <a:defRPr sz="1200"/>
+              <a:defRPr sz="1400"/>
             </a:lvl1pPr>
-            <a:lvl2pPr>
-              <a:buFontTx/>
+            <a:lvl2pPr marL="457200" indent="0">
               <a:buNone/>
               <a:defRPr sz="1200"/>
             </a:lvl2pPr>
-            <a:lvl3pPr>
-              <a:buFontTx/>
+            <a:lvl3pPr marL="914400" indent="0">
               <a:buNone/>
               <a:defRPr sz="1000"/>
             </a:lvl3pPr>
-            <a:lvl4pPr>
-              <a:buFontTx/>
+            <a:lvl4pPr marL="1371600" indent="0">
               <a:buNone/>
               <a:defRPr sz="900"/>
             </a:lvl4pPr>
-            <a:lvl5pPr>
-              <a:buFontTx/>
+            <a:lvl5pPr marL="1828800" indent="0">
               <a:buNone/>
               <a:defRPr sz="900"/>
             </a:lvl5pPr>
+            <a:lvl6pPr marL="2286000" indent="0">
+              <a:buNone/>
+              <a:defRPr sz="900"/>
+            </a:lvl6pPr>
+            <a:lvl7pPr marL="2743200" indent="0">
+              <a:buNone/>
+              <a:defRPr sz="900"/>
+            </a:lvl7pPr>
+            <a:lvl8pPr marL="3200400" indent="0">
+              <a:buNone/>
+              <a:defRPr sz="900"/>
+            </a:lvl8pPr>
+            <a:lvl9pPr marL="3657600" indent="0">
+              <a:buNone/>
+              <a:defRPr sz="900"/>
+            </a:lvl9pPr>
           </a:lstStyle>
           <a:p>
-            <a:pPr lvl="0" eaLnBrk="1" latinLnBrk="0" hangingPunct="1"/>
-            <a:r>
-              <a:rPr kumimoji="0" lang="en-US" smtClean="0"/>
+            <a:pPr lvl="0"/>
+            <a:r>
+              <a:rPr lang="en-US" smtClean="0"/>
               <a:t>Click to edit Master text styles</a:t>
             </a:r>
           </a:p>
@@ -2844,12 +2497,7 @@
             <p:ph type="dt" sz="half" idx="10"/>
           </p:nvPr>
         </p:nvSpPr>
-        <p:spPr>
-          <a:xfrm>
-            <a:off x="457200" y="6422064"/>
-            <a:ext cx="2133600" cy="365125"/>
-          </a:xfrm>
-        </p:spPr>
+        <p:spPr/>
         <p:txBody>
           <a:bodyPr/>
           <a:lstStyle/>
@@ -2857,7 +2505,7 @@
             <a:fld id="{60029C98-5D54-43BD-B436-29F4C541DD0B}" type="datetimeFigureOut">
               <a:rPr lang="en-US" smtClean="0"/>
               <a:pPr/>
-              <a:t>9/19/2009</a:t>
+              <a:t>9/23/2009</a:t>
             </a:fld>
             <a:endParaRPr lang="en-US"/>
           </a:p>
@@ -2918,9 +2566,26 @@
 <p:sldMaster xmlns:a="http://schemas.openxmlformats.org/drawingml/2006/main" xmlns:r="http://schemas.openxmlformats.org/officeDocument/2006/relationships" xmlns:p="http://schemas.openxmlformats.org/presentationml/2006/main">
   <p:cSld>
     <p:bg>
-      <p:bgRef idx="1001">
-        <a:schemeClr val="bg2"/>
-      </p:bgRef>
+      <p:bgPr>
+        <a:gradFill flip="none" rotWithShape="1">
+          <a:gsLst>
+            <a:gs pos="0">
+              <a:schemeClr val="bg1">
+                <a:lumMod val="75000"/>
+                <a:lumOff val="25000"/>
+              </a:schemeClr>
+            </a:gs>
+            <a:gs pos="100000">
+              <a:schemeClr val="bg1"/>
+            </a:gs>
+          </a:gsLst>
+          <a:path path="circle">
+            <a:fillToRect l="50000" t="50000" r="50000" b="50000"/>
+          </a:path>
+          <a:tileRect/>
+        </a:gradFill>
+        <a:effectLst/>
+      </p:bgPr>
     </p:bg>
     <p:spTree>
       <p:nvGrpSpPr>
@@ -2938,203 +2603,7 @@
       </p:grpSpPr>
       <p:sp>
         <p:nvSpPr>
-          <p:cNvPr id="12" name="Freeform 11"/>
-          <p:cNvSpPr>
-            <a:spLocks/>
-          </p:cNvSpPr>
-          <p:nvPr/>
-        </p:nvSpPr>
-        <p:spPr bwMode="auto">
-          <a:xfrm>
-            <a:off x="0" y="4752126"/>
-            <a:ext cx="9144000" cy="2112962"/>
-          </a:xfrm>
-          <a:custGeom>
-            <a:avLst>
-              <a:gd name="A1" fmla="val 0"/>
-              <a:gd name="A2" fmla="val 0"/>
-              <a:gd name="A3" fmla="val 0"/>
-              <a:gd name="A4" fmla="val 0"/>
-              <a:gd name="A5" fmla="val 0"/>
-              <a:gd name="A6" fmla="val 0"/>
-              <a:gd name="A7" fmla="val 0"/>
-              <a:gd name="A8" fmla="val 0"/>
-            </a:avLst>
-            <a:gdLst/>
-            <a:ahLst/>
-            <a:cxnLst>
-              <a:cxn ang="0">
-                <a:pos x="0" y="1066"/>
-              </a:cxn>
-              <a:cxn ang="0">
-                <a:pos x="0" y="1331"/>
-              </a:cxn>
-              <a:cxn ang="0">
-                <a:pos x="5760" y="1331"/>
-              </a:cxn>
-              <a:cxn ang="0">
-                <a:pos x="5760" y="0"/>
-              </a:cxn>
-              <a:cxn ang="0">
-                <a:pos x="0" y="1066"/>
-              </a:cxn>
-            </a:cxnLst>
-            <a:rect l="0" t="0" r="0" b="0"/>
-            <a:pathLst>
-              <a:path w="5760" h="1331">
-                <a:moveTo>
-                  <a:pt x="0" y="1066"/>
-                </a:moveTo>
-                <a:lnTo>
-                  <a:pt x="0" y="1331"/>
-                </a:lnTo>
-                <a:lnTo>
-                  <a:pt x="5760" y="1331"/>
-                </a:lnTo>
-                <a:lnTo>
-                  <a:pt x="5760" y="0"/>
-                </a:lnTo>
-                <a:cubicBezTo>
-                  <a:pt x="3220" y="1206"/>
-                  <a:pt x="2250" y="1146"/>
-                  <a:pt x="0" y="1066"/>
-                </a:cubicBezTo>
-                <a:close/>
-              </a:path>
-            </a:pathLst>
-          </a:custGeom>
-          <a:solidFill>
-            <a:schemeClr val="bg1">
-              <a:tint val="80000"/>
-              <a:satMod val="200000"/>
-              <a:alpha val="45000"/>
-            </a:schemeClr>
-          </a:solidFill>
-          <a:ln w="9525" cap="flat" cmpd="sng" algn="ctr">
-            <a:noFill/>
-            <a:prstDash val="solid"/>
-            <a:round/>
-            <a:headEnd type="none" w="med" len="med"/>
-            <a:tailEnd type="none" w="med" len="med"/>
-          </a:ln>
-          <a:effectLst>
-            <a:outerShdw blurRad="50800" dist="44450" dir="16200000" algn="ctr" rotWithShape="0">
-              <a:prstClr val="black">
-                <a:alpha val="35000"/>
-              </a:prstClr>
-            </a:outerShdw>
-          </a:effectLst>
-        </p:spPr>
-        <p:txBody>
-          <a:bodyPr vert="horz" wrap="square" lIns="91440" tIns="45720" rIns="91440" bIns="45720" anchor="t" compatLnSpc="1"/>
-          <a:lstStyle/>
-          <a:p>
-            <a:endParaRPr kumimoji="0" lang="en-US"/>
-          </a:p>
-        </p:txBody>
-      </p:sp>
-      <p:sp>
-        <p:nvSpPr>
-          <p:cNvPr id="16" name="Freeform 15"/>
-          <p:cNvSpPr>
-            <a:spLocks/>
-          </p:cNvSpPr>
-          <p:nvPr/>
-        </p:nvSpPr>
-        <p:spPr bwMode="auto">
-          <a:xfrm>
-            <a:off x="7315200" y="0"/>
-            <a:ext cx="1828800" cy="6858000"/>
-          </a:xfrm>
-          <a:custGeom>
-            <a:avLst/>
-            <a:gdLst>
-              <a:gd name="connsiteX0" fmla="*/ 1914 w 1914"/>
-              <a:gd name="connsiteY0" fmla="*/ 9 h 4329"/>
-              <a:gd name="connsiteX1" fmla="*/ 1914 w 1914"/>
-              <a:gd name="connsiteY1" fmla="*/ 4329 h 4329"/>
-              <a:gd name="connsiteX2" fmla="*/ 204 w 1914"/>
-              <a:gd name="connsiteY2" fmla="*/ 4327 h 4329"/>
-              <a:gd name="connsiteX3" fmla="*/ 0 w 1914"/>
-              <a:gd name="connsiteY3" fmla="*/ 0 h 4329"/>
-              <a:gd name="connsiteX4" fmla="*/ 1914 w 1914"/>
-              <a:gd name="connsiteY4" fmla="*/ 9 h 4329"/>
-            </a:gdLst>
-            <a:ahLst/>
-            <a:cxnLst>
-              <a:cxn ang="0">
-                <a:pos x="connsiteX0" y="connsiteY0"/>
-              </a:cxn>
-              <a:cxn ang="0">
-                <a:pos x="connsiteX1" y="connsiteY1"/>
-              </a:cxn>
-              <a:cxn ang="0">
-                <a:pos x="connsiteX2" y="connsiteY2"/>
-              </a:cxn>
-              <a:cxn ang="0">
-                <a:pos x="connsiteX3" y="connsiteY3"/>
-              </a:cxn>
-              <a:cxn ang="0">
-                <a:pos x="connsiteX4" y="connsiteY4"/>
-              </a:cxn>
-            </a:cxnLst>
-            <a:rect l="l" t="t" r="r" b="b"/>
-            <a:pathLst>
-              <a:path w="1914" h="4329">
-                <a:moveTo>
-                  <a:pt x="1914" y="9"/>
-                </a:moveTo>
-                <a:lnTo>
-                  <a:pt x="1914" y="4329"/>
-                </a:lnTo>
-                <a:lnTo>
-                  <a:pt x="204" y="4327"/>
-                </a:lnTo>
-                <a:cubicBezTo>
-                  <a:pt x="1288" y="3574"/>
-                  <a:pt x="2082" y="1734"/>
-                  <a:pt x="0" y="0"/>
-                </a:cubicBezTo>
-                <a:lnTo>
-                  <a:pt x="1914" y="9"/>
-                </a:lnTo>
-                <a:close/>
-              </a:path>
-            </a:pathLst>
-          </a:custGeom>
-          <a:solidFill>
-            <a:schemeClr val="bg1">
-              <a:tint val="90000"/>
-              <a:satMod val="350000"/>
-              <a:alpha val="40000"/>
-            </a:schemeClr>
-          </a:solidFill>
-          <a:ln w="9525" cap="flat" cmpd="sng" algn="ctr">
-            <a:noFill/>
-            <a:prstDash val="solid"/>
-            <a:round/>
-            <a:headEnd type="none" w="med" len="med"/>
-            <a:tailEnd type="none" w="med" len="med"/>
-          </a:ln>
-          <a:effectLst>
-            <a:outerShdw blurRad="50800" dist="50800" dir="10800000" algn="ctr" rotWithShape="0">
-              <a:prstClr val="black">
-                <a:alpha val="45000"/>
-              </a:prstClr>
-            </a:outerShdw>
-          </a:effectLst>
-        </p:spPr>
-        <p:txBody>
-          <a:bodyPr vert="horz" wrap="square" lIns="91440" tIns="45720" rIns="91440" bIns="45720" anchor="t" compatLnSpc="1"/>
-          <a:lstStyle/>
-          <a:p>
-            <a:endParaRPr kumimoji="0" lang="en-US"/>
-          </a:p>
-        </p:txBody>
-      </p:sp>
-      <p:sp>
-        <p:nvSpPr>
-          <p:cNvPr id="9" name="Title Placeholder 8"/>
+          <p:cNvPr id="2" name="Title Placeholder 1"/>
           <p:cNvSpPr>
             <a:spLocks noGrp="1"/>
           </p:cNvSpPr>
@@ -3145,29 +2614,29 @@
         <p:spPr>
           <a:xfrm>
             <a:off x="457200" y="274638"/>
-            <a:ext cx="7467600" cy="1143000"/>
+            <a:ext cx="8229600" cy="1143000"/>
           </a:xfrm>
           <a:prstGeom prst="rect">
             <a:avLst/>
           </a:prstGeom>
         </p:spPr>
         <p:txBody>
-          <a:bodyPr vert="horz" lIns="45720" rIns="45720" anchor="ctr">
+          <a:bodyPr vert="horz" lIns="91440" tIns="45720" rIns="91440" bIns="45720" rtlCol="0" anchor="ctr">
             <a:normAutofit/>
           </a:bodyPr>
           <a:lstStyle/>
           <a:p>
             <a:r>
-              <a:rPr kumimoji="0" lang="en-US" smtClean="0"/>
+              <a:rPr lang="en-US" smtClean="0"/>
               <a:t>Click to edit Master title style</a:t>
             </a:r>
-            <a:endParaRPr kumimoji="0" lang="en-US"/>
-          </a:p>
-        </p:txBody>
-      </p:sp>
-      <p:sp>
-        <p:nvSpPr>
-          <p:cNvPr id="30" name="Text Placeholder 29"/>
+            <a:endParaRPr lang="en-US"/>
+          </a:p>
+        </p:txBody>
+      </p:sp>
+      <p:sp>
+        <p:nvSpPr>
+          <p:cNvPr id="3" name="Text Placeholder 2"/>
           <p:cNvSpPr>
             <a:spLocks noGrp="1"/>
           </p:cNvSpPr>
@@ -3178,58 +2647,58 @@
         <p:spPr>
           <a:xfrm>
             <a:off x="457200" y="1600200"/>
-            <a:ext cx="7467600" cy="4525963"/>
+            <a:ext cx="8229600" cy="4525963"/>
           </a:xfrm>
           <a:prstGeom prst="rect">
             <a:avLst/>
           </a:prstGeom>
         </p:spPr>
         <p:txBody>
-          <a:bodyPr vert="horz">
+          <a:bodyPr vert="horz" lIns="91440" tIns="45720" rIns="91440" bIns="45720" rtlCol="0">
             <a:normAutofit/>
           </a:bodyPr>
           <a:lstStyle/>
           <a:p>
-            <a:pPr lvl="0" eaLnBrk="1" latinLnBrk="0" hangingPunct="1"/>
-            <a:r>
-              <a:rPr kumimoji="0" lang="en-US" smtClean="0"/>
+            <a:pPr lvl="0"/>
+            <a:r>
+              <a:rPr lang="en-US" smtClean="0"/>
               <a:t>Click to edit Master text styles</a:t>
             </a:r>
           </a:p>
           <a:p>
-            <a:pPr lvl="1" eaLnBrk="1" latinLnBrk="0" hangingPunct="1"/>
-            <a:r>
-              <a:rPr kumimoji="0" lang="en-US" smtClean="0"/>
+            <a:pPr lvl="1"/>
+            <a:r>
+              <a:rPr lang="en-US" smtClean="0"/>
               <a:t>Second level</a:t>
             </a:r>
           </a:p>
           <a:p>
-            <a:pPr lvl="2" eaLnBrk="1" latinLnBrk="0" hangingPunct="1"/>
-            <a:r>
-              <a:rPr kumimoji="0" lang="en-US" smtClean="0"/>
+            <a:pPr lvl="2"/>
+            <a:r>
+              <a:rPr lang="en-US" smtClean="0"/>
               <a:t>Third level</a:t>
             </a:r>
           </a:p>
           <a:p>
-            <a:pPr lvl="3" eaLnBrk="1" latinLnBrk="0" hangingPunct="1"/>
-            <a:r>
-              <a:rPr kumimoji="0" lang="en-US" smtClean="0"/>
+            <a:pPr lvl="3"/>
+            <a:r>
+              <a:rPr lang="en-US" smtClean="0"/>
               <a:t>Fourth level</a:t>
             </a:r>
           </a:p>
           <a:p>
-            <a:pPr lvl="4" eaLnBrk="1" latinLnBrk="0" hangingPunct="1"/>
-            <a:r>
-              <a:rPr kumimoji="0" lang="en-US" smtClean="0"/>
+            <a:pPr lvl="4"/>
+            <a:r>
+              <a:rPr lang="en-US" smtClean="0"/>
               <a:t>Fifth level</a:t>
             </a:r>
-            <a:endParaRPr kumimoji="0" lang="en-US"/>
-          </a:p>
-        </p:txBody>
-      </p:sp>
-      <p:sp>
-        <p:nvSpPr>
-          <p:cNvPr id="10" name="Date Placeholder 9"/>
+            <a:endParaRPr lang="en-US"/>
+          </a:p>
+        </p:txBody>
+      </p:sp>
+      <p:sp>
+        <p:nvSpPr>
+          <p:cNvPr id="4" name="Date Placeholder 3"/>
           <p:cNvSpPr>
             <a:spLocks noGrp="1"/>
           </p:cNvSpPr>
@@ -3239,7 +2708,7 @@
         </p:nvSpPr>
         <p:spPr>
           <a:xfrm>
-            <a:off x="457200" y="6422064"/>
+            <a:off x="457200" y="6356350"/>
             <a:ext cx="2133600" cy="365125"/>
           </a:xfrm>
           <a:prstGeom prst="rect">
@@ -3247,13 +2716,13 @@
           </a:prstGeom>
         </p:spPr>
         <p:txBody>
-          <a:bodyPr vert="horz" bIns="0" anchor="b"/>
+          <a:bodyPr vert="horz" lIns="91440" tIns="45720" rIns="91440" bIns="45720" rtlCol="0" anchor="ctr"/>
           <a:lstStyle>
-            <a:lvl1pPr algn="l" eaLnBrk="1" latinLnBrk="0" hangingPunct="1">
-              <a:defRPr kumimoji="0" sz="1000">
+            <a:lvl1pPr algn="l">
+              <a:defRPr sz="1200">
                 <a:solidFill>
-                  <a:schemeClr val="tx2">
-                    <a:shade val="50000"/>
+                  <a:schemeClr val="tx1">
+                    <a:tint val="75000"/>
                   </a:schemeClr>
                 </a:solidFill>
               </a:defRPr>
@@ -3263,7 +2732,7 @@
             <a:fld id="{60029C98-5D54-43BD-B436-29F4C541DD0B}" type="datetimeFigureOut">
               <a:rPr lang="en-US" smtClean="0"/>
               <a:pPr/>
-              <a:t>9/19/2009</a:t>
+              <a:t>9/23/2009</a:t>
             </a:fld>
             <a:endParaRPr lang="en-US"/>
           </a:p>
@@ -3271,7 +2740,7 @@
       </p:sp>
       <p:sp>
         <p:nvSpPr>
-          <p:cNvPr id="22" name="Footer Placeholder 21"/>
+          <p:cNvPr id="5" name="Footer Placeholder 4"/>
           <p:cNvSpPr>
             <a:spLocks noGrp="1"/>
           </p:cNvSpPr>
@@ -3281,7 +2750,7 @@
         </p:nvSpPr>
         <p:spPr>
           <a:xfrm>
-            <a:off x="3124200" y="6422064"/>
+            <a:off x="3124200" y="6356350"/>
             <a:ext cx="2895600" cy="365125"/>
           </a:xfrm>
           <a:prstGeom prst="rect">
@@ -3289,13 +2758,13 @@
           </a:prstGeom>
         </p:spPr>
         <p:txBody>
-          <a:bodyPr vert="horz" lIns="0" rIns="0" bIns="0" anchor="b"/>
+          <a:bodyPr vert="horz" lIns="91440" tIns="45720" rIns="91440" bIns="45720" rtlCol="0" anchor="ctr"/>
           <a:lstStyle>
-            <a:lvl1pPr algn="ctr" eaLnBrk="1" latinLnBrk="0" hangingPunct="1">
-              <a:defRPr kumimoji="0" sz="1000">
+            <a:lvl1pPr algn="ctr">
+              <a:defRPr sz="1200">
                 <a:solidFill>
-                  <a:schemeClr val="tx2">
-                    <a:shade val="50000"/>
+                  <a:schemeClr val="tx1">
+                    <a:tint val="75000"/>
                   </a:schemeClr>
                 </a:solidFill>
               </a:defRPr>
@@ -3308,7 +2777,7 @@
       </p:sp>
       <p:sp>
         <p:nvSpPr>
-          <p:cNvPr id="18" name="Slide Number Placeholder 17"/>
+          <p:cNvPr id="6" name="Slide Number Placeholder 5"/>
           <p:cNvSpPr>
             <a:spLocks noGrp="1"/>
           </p:cNvSpPr>
@@ -3318,21 +2787,21 @@
         </p:nvSpPr>
         <p:spPr>
           <a:xfrm>
-            <a:off x="8153400" y="6422064"/>
-            <a:ext cx="762000" cy="365125"/>
+            <a:off x="6553200" y="6356350"/>
+            <a:ext cx="2133600" cy="365125"/>
           </a:xfrm>
           <a:prstGeom prst="rect">
             <a:avLst/>
           </a:prstGeom>
         </p:spPr>
         <p:txBody>
-          <a:bodyPr vert="horz" lIns="0" tIns="0" rIns="0" bIns="0" anchor="b"/>
+          <a:bodyPr vert="horz" lIns="91440" tIns="45720" rIns="91440" bIns="45720" rtlCol="0" anchor="ctr"/>
           <a:lstStyle>
-            <a:lvl1pPr algn="r" eaLnBrk="1" latinLnBrk="0" hangingPunct="1">
-              <a:defRPr kumimoji="0" sz="1000">
+            <a:lvl1pPr algn="r">
+              <a:defRPr sz="1200">
                 <a:solidFill>
-                  <a:schemeClr val="tx2">
-                    <a:shade val="50000"/>
+                  <a:schemeClr val="tx1">
+                    <a:tint val="75000"/>
                   </a:schemeClr>
                 </a:solidFill>
               </a:defRPr>
@@ -3352,26 +2821,26 @@
   </p:cSld>
   <p:clrMap bg1="dk1" tx1="lt1" bg2="dk2" tx2="lt2" accent1="accent1" accent2="accent2" accent3="accent3" accent4="accent4" accent5="accent5" accent6="accent6" hlink="hlink" folHlink="folHlink"/>
   <p:sldLayoutIdLst>
-    <p:sldLayoutId id="2147483769" r:id="rId1"/>
-    <p:sldLayoutId id="2147483770" r:id="rId2"/>
-    <p:sldLayoutId id="2147483771" r:id="rId3"/>
-    <p:sldLayoutId id="2147483772" r:id="rId4"/>
-    <p:sldLayoutId id="2147483773" r:id="rId5"/>
-    <p:sldLayoutId id="2147483774" r:id="rId6"/>
-    <p:sldLayoutId id="2147483775" r:id="rId7"/>
-    <p:sldLayoutId id="2147483776" r:id="rId8"/>
-    <p:sldLayoutId id="2147483777" r:id="rId9"/>
-    <p:sldLayoutId id="2147483778" r:id="rId10"/>
-    <p:sldLayoutId id="2147483779" r:id="rId11"/>
+    <p:sldLayoutId id="2147483781" r:id="rId1"/>
+    <p:sldLayoutId id="2147483782" r:id="rId2"/>
+    <p:sldLayoutId id="2147483783" r:id="rId3"/>
+    <p:sldLayoutId id="2147483784" r:id="rId4"/>
+    <p:sldLayoutId id="2147483785" r:id="rId5"/>
+    <p:sldLayoutId id="2147483786" r:id="rId6"/>
+    <p:sldLayoutId id="2147483787" r:id="rId7"/>
+    <p:sldLayoutId id="2147483788" r:id="rId8"/>
+    <p:sldLayoutId id="2147483789" r:id="rId9"/>
+    <p:sldLayoutId id="2147483790" r:id="rId10"/>
+    <p:sldLayoutId id="2147483791" r:id="rId11"/>
   </p:sldLayoutIdLst>
   <p:txStyles>
     <p:titleStyle>
-      <a:lvl1pPr algn="l" rtl="0" eaLnBrk="1" latinLnBrk="0" hangingPunct="1">
+      <a:lvl1pPr algn="ctr" defTabSz="914400" rtl="0" eaLnBrk="1" latinLnBrk="0" hangingPunct="1">
         <a:spcBef>
           <a:spcPct val="0"/>
         </a:spcBef>
         <a:buNone/>
-        <a:defRPr kumimoji="0" sz="4600" kern="1200">
+        <a:defRPr sz="4400" kern="1200">
           <a:solidFill>
             <a:schemeClr val="tx1"/>
           </a:solidFill>
@@ -3382,17 +2851,13 @@
       </a:lvl1pPr>
     </p:titleStyle>
     <p:bodyStyle>
-      <a:lvl1pPr marL="420624" indent="-384048" algn="l" rtl="0" eaLnBrk="1" latinLnBrk="0" hangingPunct="1">
+      <a:lvl1pPr marL="342900" indent="-342900" algn="l" defTabSz="914400" rtl="0" eaLnBrk="1" latinLnBrk="0" hangingPunct="1">
         <a:spcBef>
           <a:spcPct val="20000"/>
         </a:spcBef>
-        <a:buClr>
-          <a:schemeClr val="accent1"/>
-        </a:buClr>
-        <a:buSzPct val="80000"/>
-        <a:buFont typeface="Wingdings 2"/>
-        <a:buChar char=""/>
-        <a:defRPr kumimoji="0" sz="3000" kern="1200">
+        <a:buFont typeface="Arial" pitchFamily="34" charset="0"/>
+        <a:buChar char="•"/>
+        <a:defRPr sz="3200" kern="1200">
           <a:solidFill>
             <a:schemeClr val="tx1"/>
           </a:solidFill>
@@ -3401,17 +2866,13 @@
           <a:cs typeface="+mn-cs"/>
         </a:defRPr>
       </a:lvl1pPr>
-      <a:lvl2pPr marL="722376" indent="-274320" algn="l" rtl="0" eaLnBrk="1" latinLnBrk="0" hangingPunct="1">
+      <a:lvl2pPr marL="742950" indent="-285750" algn="l" defTabSz="914400" rtl="0" eaLnBrk="1" latinLnBrk="0" hangingPunct="1">
         <a:spcBef>
           <a:spcPct val="20000"/>
         </a:spcBef>
-        <a:buClr>
-          <a:schemeClr val="accent1"/>
-        </a:buClr>
-        <a:buSzPct val="90000"/>
-        <a:buFont typeface="Wingdings 2"/>
-        <a:buChar char=""/>
-        <a:defRPr kumimoji="0" sz="2600" kern="1200">
+        <a:buFont typeface="Arial" pitchFamily="34" charset="0"/>
+        <a:buChar char="–"/>
+        <a:defRPr sz="2800" kern="1200">
           <a:solidFill>
             <a:schemeClr val="tx1"/>
           </a:solidFill>
@@ -3420,17 +2881,13 @@
           <a:cs typeface="+mn-cs"/>
         </a:defRPr>
       </a:lvl2pPr>
-      <a:lvl3pPr marL="1005840" indent="-256032" algn="l" rtl="0" eaLnBrk="1" latinLnBrk="0" hangingPunct="1">
+      <a:lvl3pPr marL="1143000" indent="-228600" algn="l" defTabSz="914400" rtl="0" eaLnBrk="1" latinLnBrk="0" hangingPunct="1">
         <a:spcBef>
           <a:spcPct val="20000"/>
         </a:spcBef>
-        <a:buClr>
-          <a:schemeClr val="accent2"/>
-        </a:buClr>
-        <a:buSzPct val="85000"/>
-        <a:buFont typeface="Arial"/>
-        <a:buChar char="○"/>
-        <a:defRPr kumimoji="0" sz="2400" kern="1200">
+        <a:buFont typeface="Arial" pitchFamily="34" charset="0"/>
+        <a:buChar char="•"/>
+        <a:defRPr sz="2400" kern="1200">
           <a:solidFill>
             <a:schemeClr val="tx1"/>
           </a:solidFill>
@@ -3439,17 +2896,13 @@
           <a:cs typeface="+mn-cs"/>
         </a:defRPr>
       </a:lvl3pPr>
-      <a:lvl4pPr marL="1280160" indent="-237744" algn="l" rtl="0" eaLnBrk="1" latinLnBrk="0" hangingPunct="1">
+      <a:lvl4pPr marL="1600200" indent="-228600" algn="l" defTabSz="914400" rtl="0" eaLnBrk="1" latinLnBrk="0" hangingPunct="1">
         <a:spcBef>
           <a:spcPct val="20000"/>
         </a:spcBef>
-        <a:buClr>
-          <a:schemeClr val="accent3"/>
-        </a:buClr>
-        <a:buSzPct val="90000"/>
-        <a:buFont typeface="Wingdings 2"/>
-        <a:buChar char=""/>
-        <a:defRPr kumimoji="0" sz="2000" kern="1200">
+        <a:buFont typeface="Arial" pitchFamily="34" charset="0"/>
+        <a:buChar char="–"/>
+        <a:defRPr sz="2000" kern="1200">
           <a:solidFill>
             <a:schemeClr val="tx1"/>
           </a:solidFill>
@@ -3458,17 +2911,13 @@
           <a:cs typeface="+mn-cs"/>
         </a:defRPr>
       </a:lvl4pPr>
-      <a:lvl5pPr marL="1490472" indent="-182880" algn="l" rtl="0" eaLnBrk="1" latinLnBrk="0" hangingPunct="1">
+      <a:lvl5pPr marL="2057400" indent="-228600" algn="l" defTabSz="914400" rtl="0" eaLnBrk="1" latinLnBrk="0" hangingPunct="1">
         <a:spcBef>
           <a:spcPct val="20000"/>
         </a:spcBef>
-        <a:buClr>
-          <a:schemeClr val="accent4"/>
-        </a:buClr>
-        <a:buSzPct val="100000"/>
-        <a:buFont typeface="Arial"/>
-        <a:buChar char="-"/>
-        <a:defRPr kumimoji="0" sz="2000" kern="1200">
+        <a:buFont typeface="Arial" pitchFamily="34" charset="0"/>
+        <a:buChar char="»"/>
+        <a:defRPr sz="2000" kern="1200">
           <a:solidFill>
             <a:schemeClr val="tx1"/>
           </a:solidFill>
@@ -3477,16 +2926,13 @@
           <a:cs typeface="+mn-cs"/>
         </a:defRPr>
       </a:lvl5pPr>
-      <a:lvl6pPr marL="1700784" indent="-182880" algn="l" rtl="0" eaLnBrk="1" latinLnBrk="0" hangingPunct="1">
+      <a:lvl6pPr marL="2514600" indent="-228600" algn="l" defTabSz="914400" rtl="0" eaLnBrk="1" latinLnBrk="0" hangingPunct="1">
         <a:spcBef>
           <a:spcPct val="20000"/>
         </a:spcBef>
-        <a:buClr>
-          <a:schemeClr val="accent5"/>
-        </a:buClr>
-        <a:buFont typeface="Arial"/>
-        <a:buChar char="-"/>
-        <a:defRPr kumimoji="0" sz="2000" kern="1200" baseline="0">
+        <a:buFont typeface="Arial" pitchFamily="34" charset="0"/>
+        <a:buChar char="•"/>
+        <a:defRPr sz="2000" kern="1200">
           <a:solidFill>
             <a:schemeClr val="tx1"/>
           </a:solidFill>
@@ -3495,17 +2941,13 @@
           <a:cs typeface="+mn-cs"/>
         </a:defRPr>
       </a:lvl6pPr>
-      <a:lvl7pPr marL="1920240" indent="-182880" algn="l" rtl="0" eaLnBrk="1" latinLnBrk="0" hangingPunct="1">
+      <a:lvl7pPr marL="2971800" indent="-228600" algn="l" defTabSz="914400" rtl="0" eaLnBrk="1" latinLnBrk="0" hangingPunct="1">
         <a:spcBef>
           <a:spcPct val="20000"/>
         </a:spcBef>
-        <a:buClr>
-          <a:schemeClr val="accent6"/>
-        </a:buClr>
-        <a:buSzPct val="100000"/>
-        <a:buFont typeface="Arial"/>
+        <a:buFont typeface="Arial" pitchFamily="34" charset="0"/>
         <a:buChar char="•"/>
-        <a:defRPr kumimoji="0" sz="1800" kern="1200" baseline="0">
+        <a:defRPr sz="2000" kern="1200">
           <a:solidFill>
             <a:schemeClr val="tx1"/>
           </a:solidFill>
@@ -3514,16 +2956,13 @@
           <a:cs typeface="+mn-cs"/>
         </a:defRPr>
       </a:lvl7pPr>
-      <a:lvl8pPr marL="2139696" indent="-182880" algn="l" rtl="0" eaLnBrk="1" latinLnBrk="0" hangingPunct="1">
+      <a:lvl8pPr marL="3429000" indent="-228600" algn="l" defTabSz="914400" rtl="0" eaLnBrk="1" latinLnBrk="0" hangingPunct="1">
         <a:spcBef>
           <a:spcPct val="20000"/>
         </a:spcBef>
-        <a:buClr>
-          <a:schemeClr val="accent6"/>
-        </a:buClr>
-        <a:buFont typeface="Arial"/>
-        <a:buChar char="▪"/>
-        <a:defRPr kumimoji="0" sz="1600" kern="1200">
+        <a:buFont typeface="Arial" pitchFamily="34" charset="0"/>
+        <a:buChar char="•"/>
+        <a:defRPr sz="2000" kern="1200">
           <a:solidFill>
             <a:schemeClr val="tx1"/>
           </a:solidFill>
@@ -3532,16 +2971,13 @@
           <a:cs typeface="+mn-cs"/>
         </a:defRPr>
       </a:lvl8pPr>
-      <a:lvl9pPr marL="2331720" indent="-182880" algn="l" rtl="0" eaLnBrk="1" latinLnBrk="0" hangingPunct="1">
+      <a:lvl9pPr marL="3886200" indent="-228600" algn="l" defTabSz="914400" rtl="0" eaLnBrk="1" latinLnBrk="0" hangingPunct="1">
         <a:spcBef>
           <a:spcPct val="20000"/>
         </a:spcBef>
-        <a:buClr>
-          <a:schemeClr val="accent6"/>
-        </a:buClr>
-        <a:buFont typeface="Arial"/>
+        <a:buFont typeface="Arial" pitchFamily="34" charset="0"/>
         <a:buChar char="•"/>
-        <a:defRPr kumimoji="0" sz="1600" kern="1200">
+        <a:defRPr sz="2000" kern="1200">
           <a:solidFill>
             <a:schemeClr val="tx1"/>
           </a:solidFill>
@@ -3552,8 +2988,11 @@
       </a:lvl9pPr>
     </p:bodyStyle>
     <p:otherStyle>
-      <a:lvl1pPr marL="0" algn="l" rtl="0" eaLnBrk="1" latinLnBrk="0" hangingPunct="1">
-        <a:defRPr kumimoji="0" kern="1200">
+      <a:defPPr>
+        <a:defRPr lang="en-US"/>
+      </a:defPPr>
+      <a:lvl1pPr marL="0" algn="l" defTabSz="914400" rtl="0" eaLnBrk="1" latinLnBrk="0" hangingPunct="1">
+        <a:defRPr sz="1800" kern="1200">
           <a:solidFill>
             <a:schemeClr val="tx1"/>
           </a:solidFill>
@@ -3562,8 +3001,8 @@
           <a:cs typeface="+mn-cs"/>
         </a:defRPr>
       </a:lvl1pPr>
-      <a:lvl2pPr marL="457200" algn="l" rtl="0" eaLnBrk="1" latinLnBrk="0" hangingPunct="1">
-        <a:defRPr kumimoji="0" kern="1200">
+      <a:lvl2pPr marL="457200" algn="l" defTabSz="914400" rtl="0" eaLnBrk="1" latinLnBrk="0" hangingPunct="1">
+        <a:defRPr sz="1800" kern="1200">
           <a:solidFill>
             <a:schemeClr val="tx1"/>
           </a:solidFill>
@@ -3572,8 +3011,8 @@
           <a:cs typeface="+mn-cs"/>
         </a:defRPr>
       </a:lvl2pPr>
-      <a:lvl3pPr marL="914400" algn="l" rtl="0" eaLnBrk="1" latinLnBrk="0" hangingPunct="1">
-        <a:defRPr kumimoji="0" kern="1200">
+      <a:lvl3pPr marL="914400" algn="l" defTabSz="914400" rtl="0" eaLnBrk="1" latinLnBrk="0" hangingPunct="1">
+        <a:defRPr sz="1800" kern="1200">
           <a:solidFill>
             <a:schemeClr val="tx1"/>
           </a:solidFill>
@@ -3582,8 +3021,8 @@
           <a:cs typeface="+mn-cs"/>
         </a:defRPr>
       </a:lvl3pPr>
-      <a:lvl4pPr marL="1371600" algn="l" rtl="0" eaLnBrk="1" latinLnBrk="0" hangingPunct="1">
-        <a:defRPr kumimoji="0" kern="1200">
+      <a:lvl4pPr marL="1371600" algn="l" defTabSz="914400" rtl="0" eaLnBrk="1" latinLnBrk="0" hangingPunct="1">
+        <a:defRPr sz="1800" kern="1200">
           <a:solidFill>
             <a:schemeClr val="tx1"/>
           </a:solidFill>
@@ -3592,8 +3031,8 @@
           <a:cs typeface="+mn-cs"/>
         </a:defRPr>
       </a:lvl4pPr>
-      <a:lvl5pPr marL="1828800" algn="l" rtl="0" eaLnBrk="1" latinLnBrk="0" hangingPunct="1">
-        <a:defRPr kumimoji="0" kern="1200">
+      <a:lvl5pPr marL="1828800" algn="l" defTabSz="914400" rtl="0" eaLnBrk="1" latinLnBrk="0" hangingPunct="1">
+        <a:defRPr sz="1800" kern="1200">
           <a:solidFill>
             <a:schemeClr val="tx1"/>
           </a:solidFill>
@@ -3602,8 +3041,8 @@
           <a:cs typeface="+mn-cs"/>
         </a:defRPr>
       </a:lvl5pPr>
-      <a:lvl6pPr marL="2286000" algn="l" rtl="0" eaLnBrk="1" latinLnBrk="0" hangingPunct="1">
-        <a:defRPr kumimoji="0" kern="1200">
+      <a:lvl6pPr marL="2286000" algn="l" defTabSz="914400" rtl="0" eaLnBrk="1" latinLnBrk="0" hangingPunct="1">
+        <a:defRPr sz="1800" kern="1200">
           <a:solidFill>
             <a:schemeClr val="tx1"/>
           </a:solidFill>
@@ -3612,8 +3051,8 @@
           <a:cs typeface="+mn-cs"/>
         </a:defRPr>
       </a:lvl6pPr>
-      <a:lvl7pPr marL="2743200" algn="l" rtl="0" eaLnBrk="1" latinLnBrk="0" hangingPunct="1">
-        <a:defRPr kumimoji="0" kern="1200">
+      <a:lvl7pPr marL="2743200" algn="l" defTabSz="914400" rtl="0" eaLnBrk="1" latinLnBrk="0" hangingPunct="1">
+        <a:defRPr sz="1800" kern="1200">
           <a:solidFill>
             <a:schemeClr val="tx1"/>
           </a:solidFill>
@@ -3622,8 +3061,8 @@
           <a:cs typeface="+mn-cs"/>
         </a:defRPr>
       </a:lvl7pPr>
-      <a:lvl8pPr marL="3200400" algn="l" rtl="0" eaLnBrk="1" latinLnBrk="0" hangingPunct="1">
-        <a:defRPr kumimoji="0" kern="1200">
+      <a:lvl8pPr marL="3200400" algn="l" defTabSz="914400" rtl="0" eaLnBrk="1" latinLnBrk="0" hangingPunct="1">
+        <a:defRPr sz="1800" kern="1200">
           <a:solidFill>
             <a:schemeClr val="tx1"/>
           </a:solidFill>
@@ -3632,8 +3071,8 @@
           <a:cs typeface="+mn-cs"/>
         </a:defRPr>
       </a:lvl8pPr>
-      <a:lvl9pPr marL="3657600" algn="l" rtl="0" eaLnBrk="1" latinLnBrk="0" hangingPunct="1">
-        <a:defRPr kumimoji="0" kern="1200">
+      <a:lvl9pPr marL="3657600" algn="l" defTabSz="914400" rtl="0" eaLnBrk="1" latinLnBrk="0" hangingPunct="1">
+        <a:defRPr sz="1800" kern="1200">
           <a:solidFill>
             <a:schemeClr val="tx1"/>
           </a:solidFill>
@@ -3769,7 +3208,7 @@
           <p:nvPr/>
         </p:nvPicPr>
         <p:blipFill>
-          <a:blip r:embed="rId2"/>
+          <a:blip r:embed="rId2" cstate="print"/>
           <a:srcRect/>
           <a:stretch>
             <a:fillRect/>
@@ -4075,7 +3514,7 @@
           <p:nvPr/>
         </p:nvPicPr>
         <p:blipFill>
-          <a:blip r:embed="rId2"/>
+          <a:blip r:embed="rId2" cstate="print"/>
           <a:srcRect/>
           <a:stretch>
             <a:fillRect/>
@@ -4225,7 +3664,7 @@
           <p:nvPr/>
         </p:nvPicPr>
         <p:blipFill>
-          <a:blip r:embed="rId2"/>
+          <a:blip r:embed="rId2" cstate="print"/>
           <a:srcRect/>
           <a:stretch>
             <a:fillRect/>
@@ -4266,15 +3705,15 @@
         </p:spPr>
         <p:style>
           <a:lnRef idx="2">
-            <a:schemeClr val="accent1">
+            <a:schemeClr val="accent2">
               <a:shade val="50000"/>
             </a:schemeClr>
           </a:lnRef>
           <a:fillRef idx="1">
-            <a:schemeClr val="accent1"/>
+            <a:schemeClr val="accent2"/>
           </a:fillRef>
           <a:effectRef idx="0">
-            <a:schemeClr val="accent1"/>
+            <a:schemeClr val="accent2"/>
           </a:effectRef>
           <a:fontRef idx="minor">
             <a:schemeClr val="lt1"/>
@@ -4366,15 +3805,15 @@
         </p:spPr>
         <p:style>
           <a:lnRef idx="2">
-            <a:schemeClr val="accent1">
+            <a:schemeClr val="accent2">
               <a:shade val="50000"/>
             </a:schemeClr>
           </a:lnRef>
           <a:fillRef idx="1">
-            <a:schemeClr val="accent1"/>
+            <a:schemeClr val="accent2"/>
           </a:fillRef>
           <a:effectRef idx="0">
-            <a:schemeClr val="accent1"/>
+            <a:schemeClr val="accent2"/>
           </a:effectRef>
           <a:fontRef idx="minor">
             <a:schemeClr val="lt1"/>
@@ -4482,7 +3921,7 @@
           <p:nvPr/>
         </p:nvPicPr>
         <p:blipFill>
-          <a:blip r:embed="rId2"/>
+          <a:blip r:embed="rId2" cstate="print"/>
           <a:srcRect/>
           <a:stretch>
             <a:fillRect/>
@@ -4674,7 +4113,7 @@
           <p:nvPr/>
         </p:nvPicPr>
         <p:blipFill>
-          <a:blip r:embed="rId2"/>
+          <a:blip r:embed="rId2" cstate="print"/>
           <a:srcRect/>
           <a:stretch>
             <a:fillRect/>
@@ -4707,7 +4146,7 @@
           <p:nvPr/>
         </p:nvPicPr>
         <p:blipFill>
-          <a:blip r:embed="rId3"/>
+          <a:blip r:embed="rId3" cstate="print"/>
           <a:srcRect/>
           <a:stretch>
             <a:fillRect/>
@@ -4809,13 +4248,13 @@
         <p:spPr/>
         <p:txBody>
           <a:bodyPr>
-            <a:normAutofit fontScale="90000"/>
+            <a:normAutofit/>
           </a:bodyPr>
           <a:lstStyle/>
           <a:p>
             <a:r>
               <a:rPr lang="en-US" dirty="0" smtClean="0"/>
-              <a:t>In my example on </a:t>
+              <a:t>On base </a:t>
             </a:r>
             <a:r>
               <a:rPr lang="en-US" dirty="0" err="1" smtClean="0"/>
@@ -4834,7 +4273,7 @@
           <p:nvPr/>
         </p:nvPicPr>
         <p:blipFill>
-          <a:blip r:embed="rId2"/>
+          <a:blip r:embed="rId2" cstate="print"/>
           <a:srcRect/>
           <a:stretch>
             <a:fillRect/>
@@ -4915,7 +4354,7 @@
           <p:nvPr/>
         </p:nvPicPr>
         <p:blipFill>
-          <a:blip r:embed="rId2"/>
+          <a:blip r:embed="rId2" cstate="print"/>
           <a:srcRect/>
           <a:stretch>
             <a:fillRect/>
@@ -5101,7 +4540,7 @@
           <p:nvPr/>
         </p:nvPicPr>
         <p:blipFill>
-          <a:blip r:embed="rId2"/>
+          <a:blip r:embed="rId2" cstate="print"/>
           <a:srcRect/>
           <a:stretch>
             <a:fillRect/>
@@ -5327,11 +4766,7 @@
           <a:p>
             <a:r>
               <a:rPr lang="en-US" dirty="0" smtClean="0"/>
-              <a:t>The Microsoft Enterprise Library is a collection of application blocks designed to assist developers with common enterprise development </a:t>
-            </a:r>
-            <a:r>
-              <a:rPr lang="en-US" dirty="0" smtClean="0"/>
-              <a:t>challenges</a:t>
+              <a:t>The Microsoft Enterprise Library is a collection of application blocks designed to assist developers with common enterprise development challenges</a:t>
             </a:r>
           </a:p>
           <a:p>
@@ -5438,7 +4873,7 @@
           <p:nvPr/>
         </p:nvPicPr>
         <p:blipFill>
-          <a:blip r:embed="rId2"/>
+          <a:blip r:embed="rId2" cstate="print"/>
           <a:srcRect/>
           <a:stretch>
             <a:fillRect/>
@@ -5571,7 +5006,13 @@
           <a:bodyPr/>
           <a:lstStyle/>
           <a:p>
-            <a:endParaRPr lang="en-US"/>
+            <a:r>
+              <a:rPr lang="en-US" dirty="0" smtClean="0"/>
+              <a:t>http://msdn.microsoft.com/en-us/library/dd203099.aspx</a:t>
+            </a:r>
+          </a:p>
+          <a:p>
+            <a:endParaRPr lang="en-US" dirty="0"/>
           </a:p>
         </p:txBody>
       </p:sp>
@@ -5932,7 +5373,7 @@
           <p:nvPr/>
         </p:nvPicPr>
         <p:blipFill>
-          <a:blip r:embed="rId2"/>
+          <a:blip r:embed="rId2" cstate="print"/>
           <a:srcRect/>
           <a:stretch>
             <a:fillRect/>
@@ -5965,7 +5406,7 @@
           <p:nvPr/>
         </p:nvPicPr>
         <p:blipFill>
-          <a:blip r:embed="rId3"/>
+          <a:blip r:embed="rId3" cstate="print"/>
           <a:srcRect/>
           <a:stretch>
             <a:fillRect/>
@@ -6087,7 +5528,7 @@
         <p:spPr/>
         <p:txBody>
           <a:bodyPr>
-            <a:normAutofit fontScale="90000"/>
+            <a:normAutofit/>
           </a:bodyPr>
           <a:lstStyle/>
           <a:p>
@@ -6108,7 +5549,7 @@
           <p:nvPr/>
         </p:nvPicPr>
         <p:blipFill>
-          <a:blip r:embed="rId2"/>
+          <a:blip r:embed="rId2" cstate="print"/>
           <a:srcRect/>
           <a:stretch>
             <a:fillRect/>
@@ -6140,8 +5581,8 @@
         </p:nvSpPr>
         <p:spPr>
           <a:xfrm>
-            <a:off x="6248400" y="1600200"/>
-            <a:ext cx="609600" cy="1219200"/>
+            <a:off x="6248400" y="1905000"/>
+            <a:ext cx="609600" cy="1066800"/>
           </a:xfrm>
           <a:prstGeom prst="downArrow">
             <a:avLst/>
@@ -6149,15 +5590,15 @@
         </p:spPr>
         <p:style>
           <a:lnRef idx="2">
-            <a:schemeClr val="accent1">
+            <a:schemeClr val="accent2">
               <a:shade val="50000"/>
             </a:schemeClr>
           </a:lnRef>
           <a:fillRef idx="1">
-            <a:schemeClr val="accent1"/>
+            <a:schemeClr val="accent2"/>
           </a:fillRef>
           <a:effectRef idx="0">
-            <a:schemeClr val="accent1"/>
+            <a:schemeClr val="accent2"/>
           </a:effectRef>
           <a:fontRef idx="minor">
             <a:schemeClr val="lt1"/>
@@ -6189,15 +5630,15 @@
         </p:spPr>
         <p:style>
           <a:lnRef idx="2">
-            <a:schemeClr val="accent1">
+            <a:schemeClr val="accent2">
               <a:shade val="50000"/>
             </a:schemeClr>
           </a:lnRef>
           <a:fillRef idx="1">
-            <a:schemeClr val="accent1"/>
+            <a:schemeClr val="accent2"/>
           </a:fillRef>
           <a:effectRef idx="0">
-            <a:schemeClr val="accent1"/>
+            <a:schemeClr val="accent2"/>
           </a:effectRef>
           <a:fontRef idx="minor">
             <a:schemeClr val="lt1"/>
@@ -6220,7 +5661,7 @@
         </p:nvSpPr>
         <p:spPr>
           <a:xfrm>
-            <a:off x="2819400" y="1143000"/>
+            <a:off x="2819400" y="1524000"/>
             <a:ext cx="4232762" cy="369332"/>
           </a:xfrm>
           <a:prstGeom prst="rect">
@@ -6426,7 +5867,7 @@
           <p:nvPr/>
         </p:nvPicPr>
         <p:blipFill>
-          <a:blip r:embed="rId2"/>
+          <a:blip r:embed="rId2" cstate="print"/>
           <a:srcRect/>
           <a:stretch>
             <a:fillRect/>
@@ -6565,7 +6006,7 @@
           <p:nvPr/>
         </p:nvPicPr>
         <p:blipFill>
-          <a:blip r:embed="rId3"/>
+          <a:blip r:embed="rId3" cstate="print"/>
           <a:srcRect/>
           <a:stretch>
             <a:fillRect/>
@@ -6598,9 +6039,9 @@
 </file>
 
 <file path=ppt/theme/theme1.xml><?xml version="1.0" encoding="utf-8"?>
-<a:theme xmlns:a="http://schemas.openxmlformats.org/drawingml/2006/main" name="Technic">
+<a:theme xmlns:a="http://schemas.openxmlformats.org/drawingml/2006/main" name="TechFest">
   <a:themeElements>
-    <a:clrScheme name="Technic">
+    <a:clrScheme name="Office">
       <a:dk1>
         <a:sysClr val="windowText" lastClr="000000"/>
       </a:dk1>
@@ -6608,107 +6049,49 @@
         <a:sysClr val="window" lastClr="FFFFFF"/>
       </a:lt1>
       <a:dk2>
-        <a:srgbClr val="3B3B3B"/>
+        <a:srgbClr val="1F497D"/>
       </a:dk2>
       <a:lt2>
-        <a:srgbClr val="D4D2D0"/>
+        <a:srgbClr val="EEECE1"/>
       </a:lt2>
       <a:accent1>
-        <a:srgbClr val="6EA0B0"/>
+        <a:srgbClr val="4F81BD"/>
       </a:accent1>
       <a:accent2>
-        <a:srgbClr val="CCAF0A"/>
+        <a:srgbClr val="C0504D"/>
       </a:accent2>
       <a:accent3>
-        <a:srgbClr val="8D89A4"/>
+        <a:srgbClr val="9BBB59"/>
       </a:accent3>
       <a:accent4>
-        <a:srgbClr val="748560"/>
+        <a:srgbClr val="8064A2"/>
       </a:accent4>
       <a:accent5>
-        <a:srgbClr val="9E9273"/>
+        <a:srgbClr val="4BACC6"/>
       </a:accent5>
       <a:accent6>
-        <a:srgbClr val="7E848D"/>
+        <a:srgbClr val="F79646"/>
       </a:accent6>
       <a:hlink>
-        <a:srgbClr val="00C8C3"/>
+        <a:srgbClr val="0000FF"/>
       </a:hlink>
       <a:folHlink>
-        <a:srgbClr val="A116E0"/>
+        <a:srgbClr val="800080"/>
       </a:folHlink>
     </a:clrScheme>
-    <a:fontScheme name="Technic">
+    <a:fontScheme name="TechFest">
       <a:majorFont>
-        <a:latin typeface="Franklin Gothic Book"/>
+        <a:latin typeface="FuturaTCEMed"/>
         <a:ea typeface=""/>
         <a:cs typeface=""/>
-        <a:font script="Jpan" typeface="ＭＳ Ｐゴシック"/>
-        <a:font script="Hang" typeface="HY견고딕"/>
-        <a:font script="Hans" typeface="宋体"/>
-        <a:font script="Hant" typeface="微軟正黑體"/>
-        <a:font script="Arab" typeface="Tahoma"/>
-        <a:font script="Hebr" typeface="Arial"/>
-        <a:font script="Thai" typeface="Cordia New"/>
-        <a:font script="Ethi" typeface="Nyala"/>
-        <a:font script="Beng" typeface="Vrinda"/>
-        <a:font script="Gujr" typeface="Shruti"/>
-        <a:font script="Khmr" typeface="DaunPenh"/>
-        <a:font script="Knda" typeface="Tunga"/>
-        <a:font script="Guru" typeface="Raavi"/>
-        <a:font script="Cans" typeface="Euphemia"/>
-        <a:font script="Cher" typeface="Plantagenet Cherokee"/>
-        <a:font script="Yiii" typeface="Microsoft Yi Baiti"/>
-        <a:font script="Tibt" typeface="Microsoft Himalaya"/>
-        <a:font script="Thaa" typeface="MV Boli"/>
-        <a:font script="Deva" typeface="Mangal"/>
-        <a:font script="Telu" typeface="Gautami"/>
-        <a:font script="Taml" typeface="Latha"/>
-        <a:font script="Syrc" typeface="Estrangelo Edessa"/>
-        <a:font script="Orya" typeface="Kalinga"/>
-        <a:font script="Mlym" typeface="Kartika"/>
-        <a:font script="Laoo" typeface="DokChampa"/>
-        <a:font script="Sinh" typeface="Iskoola Pota"/>
-        <a:font script="Mong" typeface="Mongolian Baiti"/>
-        <a:font script="Viet" typeface="Arial"/>
-        <a:font script="Uigh" typeface="Microsoft Uighur"/>
       </a:majorFont>
       <a:minorFont>
-        <a:latin typeface="Arial"/>
+        <a:latin typeface="FuturaTCEMed"/>
         <a:ea typeface=""/>
         <a:cs typeface=""/>
-        <a:font script="Jpan" typeface="HGｺﾞｼｯｸM"/>
-        <a:font script="Hang" typeface="HY중고딕"/>
-        <a:font script="Hans" typeface="黑体"/>
-        <a:font script="Hant" typeface="微軟正黑體"/>
-        <a:font script="Arab" typeface="Tahoma"/>
-        <a:font script="Hebr" typeface="Levenim MT"/>
-        <a:font script="Thai" typeface="LilyUPC"/>
-        <a:font script="Ethi" typeface="Nyala"/>
-        <a:font script="Beng" typeface="Vrinda"/>
-        <a:font script="Gujr" typeface="Shruti"/>
-        <a:font script="Khmr" typeface="DaunPenh"/>
-        <a:font script="Knda" typeface="Tunga"/>
-        <a:font script="Guru" typeface="Raavi"/>
-        <a:font script="Cans" typeface="Euphemia"/>
-        <a:font script="Cher" typeface="Plantagenet Cherokee"/>
-        <a:font script="Yiii" typeface="Microsoft Yi Baiti"/>
-        <a:font script="Tibt" typeface="Microsoft Himalaya"/>
-        <a:font script="Thaa" typeface="MV Boli"/>
-        <a:font script="Deva" typeface="Mangal"/>
-        <a:font script="Telu" typeface="Gautami"/>
-        <a:font script="Taml" typeface="Latha"/>
-        <a:font script="Syrc" typeface="Estrangelo Edessa"/>
-        <a:font script="Orya" typeface="Kalinga"/>
-        <a:font script="Mlym" typeface="Kartika"/>
-        <a:font script="Laoo" typeface="DokChampa"/>
-        <a:font script="Sinh" typeface="Iskoola Pota"/>
-        <a:font script="Mong" typeface="Mongolian Baiti"/>
-        <a:font script="Viet" typeface="Arial"/>
-        <a:font script="Uigh" typeface="Microsoft Uighur"/>
       </a:minorFont>
     </a:fontScheme>
-    <a:fmtScheme name="Technic">
+    <a:fmtScheme name="Office">
       <a:fillStyleLst>
         <a:solidFill>
           <a:schemeClr val="phClr"/>
@@ -6717,99 +6100,66 @@
           <a:gsLst>
             <a:gs pos="0">
               <a:schemeClr val="phClr">
-                <a:tint val="1000"/>
+                <a:tint val="50000"/>
+                <a:satMod val="300000"/>
               </a:schemeClr>
             </a:gs>
-            <a:gs pos="68000">
+            <a:gs pos="35000">
               <a:schemeClr val="phClr">
-                <a:tint val="77000"/>
-              </a:schemeClr>
-            </a:gs>
-            <a:gs pos="81000">
-              <a:schemeClr val="phClr">
-                <a:tint val="79000"/>
-              </a:schemeClr>
-            </a:gs>
-            <a:gs pos="86000">
-              <a:schemeClr val="phClr">
-                <a:tint val="73000"/>
+                <a:tint val="37000"/>
+                <a:satMod val="300000"/>
               </a:schemeClr>
             </a:gs>
             <a:gs pos="100000">
               <a:schemeClr val="phClr">
-                <a:tint val="35000"/>
+                <a:tint val="15000"/>
+                <a:satMod val="350000"/>
               </a:schemeClr>
             </a:gs>
           </a:gsLst>
-          <a:lin ang="5400000" scaled="1"/>
+          <a:lin ang="16200000" scaled="1"/>
         </a:gradFill>
         <a:gradFill rotWithShape="1">
           <a:gsLst>
             <a:gs pos="0">
               <a:schemeClr val="phClr">
-                <a:tint val="73000"/>
-                <a:satMod val="150000"/>
-              </a:schemeClr>
-            </a:gs>
-            <a:gs pos="25000">
-              <a:schemeClr val="phClr">
-                <a:tint val="96000"/>
-                <a:shade val="80000"/>
-                <a:satMod val="105000"/>
-              </a:schemeClr>
-            </a:gs>
-            <a:gs pos="38000">
-              <a:schemeClr val="phClr">
-                <a:tint val="96000"/>
-                <a:shade val="59000"/>
-                <a:satMod val="120000"/>
-              </a:schemeClr>
-            </a:gs>
-            <a:gs pos="55000">
-              <a:schemeClr val="phClr">
-                <a:shade val="57000"/>
-                <a:satMod val="120000"/>
+                <a:shade val="51000"/>
+                <a:satMod val="130000"/>
               </a:schemeClr>
             </a:gs>
             <a:gs pos="80000">
               <a:schemeClr val="phClr">
-                <a:shade val="56000"/>
-                <a:satMod val="145000"/>
-              </a:schemeClr>
-            </a:gs>
-            <a:gs pos="88000">
-              <a:schemeClr val="phClr">
-                <a:shade val="63000"/>
-                <a:satMod val="160000"/>
+                <a:shade val="93000"/>
+                <a:satMod val="130000"/>
               </a:schemeClr>
             </a:gs>
             <a:gs pos="100000">
               <a:schemeClr val="phClr">
-                <a:tint val="99555"/>
-                <a:satMod val="155000"/>
+                <a:shade val="94000"/>
+                <a:satMod val="135000"/>
               </a:schemeClr>
             </a:gs>
           </a:gsLst>
-          <a:lin ang="5400000" scaled="1"/>
+          <a:lin ang="16200000" scaled="0"/>
         </a:gradFill>
       </a:fillStyleLst>
       <a:lnStyleLst>
         <a:ln w="9525" cap="flat" cmpd="sng" algn="ctr">
           <a:solidFill>
             <a:schemeClr val="phClr">
-              <a:shade val="60000"/>
-              <a:satMod val="300000"/>
+              <a:shade val="95000"/>
+              <a:satMod val="105000"/>
             </a:schemeClr>
           </a:solidFill>
           <a:prstDash val="solid"/>
         </a:ln>
-        <a:ln w="19050" cap="flat" cmpd="sng" algn="ctr">
+        <a:ln w="25400" cap="flat" cmpd="sng" algn="ctr">
           <a:solidFill>
             <a:schemeClr val="phClr"/>
           </a:solidFill>
           <a:prstDash val="solid"/>
         </a:ln>
-        <a:ln w="19050" cap="flat" cmpd="sng" algn="ctr">
+        <a:ln w="38100" cap="flat" cmpd="sng" algn="ctr">
           <a:solidFill>
             <a:schemeClr val="phClr"/>
           </a:solidFill>
@@ -6819,55 +6169,40 @@
       <a:effectStyleLst>
         <a:effectStyle>
           <a:effectLst>
-            <a:glow rad="63500">
-              <a:schemeClr val="phClr">
-                <a:tint val="30000"/>
-                <a:shade val="95000"/>
-                <a:satMod val="300000"/>
-                <a:alpha val="50000"/>
-              </a:schemeClr>
-            </a:glow>
+            <a:outerShdw blurRad="40000" dist="20000" dir="5400000" rotWithShape="0">
+              <a:srgbClr val="000000">
+                <a:alpha val="38000"/>
+              </a:srgbClr>
+            </a:outerShdw>
           </a:effectLst>
         </a:effectStyle>
         <a:effectStyle>
           <a:effectLst>
-            <a:glow rad="70000">
-              <a:schemeClr val="phClr">
-                <a:tint val="30000"/>
-                <a:shade val="95000"/>
-                <a:satMod val="300000"/>
-                <a:alpha val="50000"/>
-              </a:schemeClr>
-            </a:glow>
+            <a:outerShdw blurRad="40000" dist="23000" dir="5400000" rotWithShape="0">
+              <a:srgbClr val="000000">
+                <a:alpha val="35000"/>
+              </a:srgbClr>
+            </a:outerShdw>
           </a:effectLst>
         </a:effectStyle>
         <a:effectStyle>
           <a:effectLst>
-            <a:glow rad="76200">
-              <a:schemeClr val="phClr">
-                <a:tint val="30000"/>
-                <a:shade val="95000"/>
-                <a:satMod val="300000"/>
-                <a:alpha val="50000"/>
-              </a:schemeClr>
-            </a:glow>
+            <a:outerShdw blurRad="40000" dist="23000" dir="5400000" rotWithShape="0">
+              <a:srgbClr val="000000">
+                <a:alpha val="35000"/>
+              </a:srgbClr>
+            </a:outerShdw>
           </a:effectLst>
           <a:scene3d>
-            <a:camera prst="orthographicFront" fov="0">
+            <a:camera prst="orthographicFront">
               <a:rot lat="0" lon="0" rev="0"/>
             </a:camera>
-            <a:lightRig rig="harsh" dir="t">
-              <a:rot lat="6000000" lon="6000000" rev="0"/>
+            <a:lightRig rig="threePt" dir="t">
+              <a:rot lat="0" lon="0" rev="1200000"/>
             </a:lightRig>
           </a:scene3d>
-          <a:sp3d contourW="10000" prstMaterial="metal">
-            <a:bevelT w="20000" h="9000" prst="softRound"/>
-            <a:contourClr>
-              <a:schemeClr val="phClr">
-                <a:shade val="30000"/>
-                <a:satMod val="200000"/>
-              </a:schemeClr>
-            </a:contourClr>
+          <a:sp3d>
+            <a:bevelT w="63500" h="25400"/>
           </a:sp3d>
         </a:effectStyle>
       </a:effectStyleLst>
@@ -6879,42 +6214,45 @@
           <a:gsLst>
             <a:gs pos="0">
               <a:schemeClr val="phClr">
-                <a:shade val="40000"/>
-                <a:satMod val="150000"/>
+                <a:tint val="40000"/>
+                <a:satMod val="350000"/>
               </a:schemeClr>
             </a:gs>
-            <a:gs pos="30000">
+            <a:gs pos="40000">
               <a:schemeClr val="phClr">
-                <a:shade val="60000"/>
-                <a:satMod val="150000"/>
+                <a:tint val="45000"/>
+                <a:shade val="99000"/>
+                <a:satMod val="350000"/>
               </a:schemeClr>
             </a:gs>
             <a:gs pos="100000">
               <a:schemeClr val="phClr">
-                <a:tint val="83000"/>
-                <a:satMod val="200000"/>
+                <a:shade val="20000"/>
+                <a:satMod val="255000"/>
               </a:schemeClr>
             </a:gs>
           </a:gsLst>
-          <a:lin ang="13000000" scaled="0"/>
+          <a:path path="circle">
+            <a:fillToRect l="50000" t="-80000" r="50000" b="180000"/>
+          </a:path>
         </a:gradFill>
         <a:gradFill rotWithShape="1">
           <a:gsLst>
             <a:gs pos="0">
               <a:schemeClr val="phClr">
-                <a:tint val="78000"/>
-                <a:satMod val="220000"/>
+                <a:tint val="80000"/>
+                <a:satMod val="300000"/>
               </a:schemeClr>
             </a:gs>
             <a:gs pos="100000">
               <a:schemeClr val="phClr">
-                <a:shade val="35000"/>
-                <a:satMod val="155000"/>
+                <a:shade val="30000"/>
+                <a:satMod val="200000"/>
               </a:schemeClr>
             </a:gs>
           </a:gsLst>
           <a:path path="circle">
-            <a:fillToRect l="60000" t="50000" r="40000" b="50000"/>
+            <a:fillToRect l="50000" t="50000" r="50000" b="50000"/>
           </a:path>
         </a:gradFill>
       </a:bgFillStyleLst>

</xml_diff>

<commit_message>
Commit before doing custom markup extension
</commit_message>
<xml_diff>
--- a/WPF Validation.pptx
+++ b/WPF Validation.pptx
@@ -29,6 +29,10 @@
     <p:sldId id="277" r:id="rId23"/>
     <p:sldId id="278" r:id="rId24"/>
     <p:sldId id="279" r:id="rId25"/>
+    <p:sldId id="281" r:id="rId26"/>
+    <p:sldId id="283" r:id="rId27"/>
+    <p:sldId id="282" r:id="rId28"/>
+    <p:sldId id="280" r:id="rId29"/>
   </p:sldIdLst>
   <p:sldSz cx="9144000" cy="6858000" type="screen4x3"/>
   <p:notesSz cx="6858000" cy="9144000"/>
@@ -4991,6 +4995,473 @@
           </a:p>
         </p:txBody>
       </p:sp>
+      <p:pic>
+        <p:nvPicPr>
+          <p:cNvPr id="1026" name="Picture 2"/>
+          <p:cNvPicPr>
+            <a:picLocks noChangeAspect="1" noChangeArrowheads="1"/>
+          </p:cNvPicPr>
+          <p:nvPr/>
+        </p:nvPicPr>
+        <p:blipFill>
+          <a:blip r:embed="rId2" cstate="print"/>
+          <a:srcRect/>
+          <a:stretch>
+            <a:fillRect/>
+          </a:stretch>
+        </p:blipFill>
+        <p:spPr bwMode="auto">
+          <a:xfrm>
+            <a:off x="2209800" y="1423988"/>
+            <a:ext cx="4724400" cy="4010025"/>
+          </a:xfrm>
+          <a:prstGeom prst="rect">
+            <a:avLst/>
+          </a:prstGeom>
+          <a:noFill/>
+          <a:ln w="9525">
+            <a:noFill/>
+            <a:miter lim="800000"/>
+            <a:headEnd/>
+            <a:tailEnd/>
+          </a:ln>
+        </p:spPr>
+      </p:pic>
+    </p:spTree>
+  </p:cSld>
+  <p:clrMapOvr>
+    <a:masterClrMapping/>
+  </p:clrMapOvr>
+</p:sld>
+</file>
+
+<file path=ppt/slides/slide25.xml><?xml version="1.0" encoding="utf-8"?>
+<p:sld xmlns:a="http://schemas.openxmlformats.org/drawingml/2006/main" xmlns:r="http://schemas.openxmlformats.org/officeDocument/2006/relationships" xmlns:p="http://schemas.openxmlformats.org/presentationml/2006/main">
+  <p:cSld>
+    <p:spTree>
+      <p:nvGrpSpPr>
+        <p:cNvPr id="1" name=""/>
+        <p:cNvGrpSpPr/>
+        <p:nvPr/>
+      </p:nvGrpSpPr>
+      <p:grpSpPr>
+        <a:xfrm>
+          <a:off x="0" y="0"/>
+          <a:ext cx="0" cy="0"/>
+          <a:chOff x="0" y="0"/>
+          <a:chExt cx="0" cy="0"/>
+        </a:xfrm>
+      </p:grpSpPr>
+      <p:sp>
+        <p:nvSpPr>
+          <p:cNvPr id="2" name="Title 1"/>
+          <p:cNvSpPr>
+            <a:spLocks noGrp="1"/>
+          </p:cNvSpPr>
+          <p:nvPr>
+            <p:ph type="title"/>
+          </p:nvPr>
+        </p:nvSpPr>
+        <p:spPr/>
+        <p:txBody>
+          <a:bodyPr/>
+          <a:lstStyle/>
+          <a:p>
+            <a:r>
+              <a:rPr lang="en-US" dirty="0" smtClean="0"/>
+              <a:t>Use Validation Attributes</a:t>
+            </a:r>
+            <a:endParaRPr lang="en-US" dirty="0"/>
+          </a:p>
+        </p:txBody>
+      </p:sp>
+      <p:pic>
+        <p:nvPicPr>
+          <p:cNvPr id="2050" name="Picture 2"/>
+          <p:cNvPicPr>
+            <a:picLocks noChangeAspect="1" noChangeArrowheads="1"/>
+          </p:cNvPicPr>
+          <p:nvPr/>
+        </p:nvPicPr>
+        <p:blipFill>
+          <a:blip r:embed="rId2" cstate="print"/>
+          <a:srcRect/>
+          <a:stretch>
+            <a:fillRect/>
+          </a:stretch>
+        </p:blipFill>
+        <p:spPr bwMode="auto">
+          <a:xfrm>
+            <a:off x="304800" y="1295400"/>
+            <a:ext cx="4362450" cy="2238375"/>
+          </a:xfrm>
+          <a:prstGeom prst="rect">
+            <a:avLst/>
+          </a:prstGeom>
+          <a:noFill/>
+          <a:ln w="9525">
+            <a:noFill/>
+            <a:miter lim="800000"/>
+            <a:headEnd/>
+            <a:tailEnd/>
+          </a:ln>
+          <a:effectLst>
+            <a:outerShdw blurRad="63500" sx="102000" sy="102000" algn="ctr" rotWithShape="0">
+              <a:prstClr val="black">
+                <a:alpha val="40000"/>
+              </a:prstClr>
+            </a:outerShdw>
+          </a:effectLst>
+        </p:spPr>
+      </p:pic>
+      <p:pic>
+        <p:nvPicPr>
+          <p:cNvPr id="2051" name="Picture 3"/>
+          <p:cNvPicPr>
+            <a:picLocks noChangeAspect="1" noChangeArrowheads="1"/>
+          </p:cNvPicPr>
+          <p:nvPr/>
+        </p:nvPicPr>
+        <p:blipFill>
+          <a:blip r:embed="rId3" cstate="print"/>
+          <a:srcRect/>
+          <a:stretch>
+            <a:fillRect/>
+          </a:stretch>
+        </p:blipFill>
+        <p:spPr bwMode="auto">
+          <a:xfrm>
+            <a:off x="4114800" y="2057400"/>
+            <a:ext cx="4438650" cy="2247900"/>
+          </a:xfrm>
+          <a:prstGeom prst="rect">
+            <a:avLst/>
+          </a:prstGeom>
+          <a:noFill/>
+          <a:ln w="9525">
+            <a:noFill/>
+            <a:miter lim="800000"/>
+            <a:headEnd/>
+            <a:tailEnd/>
+          </a:ln>
+          <a:effectLst>
+            <a:outerShdw blurRad="63500" sx="102000" sy="102000" algn="ctr" rotWithShape="0">
+              <a:prstClr val="black">
+                <a:alpha val="40000"/>
+              </a:prstClr>
+            </a:outerShdw>
+          </a:effectLst>
+        </p:spPr>
+      </p:pic>
+      <p:pic>
+        <p:nvPicPr>
+          <p:cNvPr id="2052" name="Picture 4"/>
+          <p:cNvPicPr>
+            <a:picLocks noChangeAspect="1" noChangeArrowheads="1"/>
+          </p:cNvPicPr>
+          <p:nvPr/>
+        </p:nvPicPr>
+        <p:blipFill>
+          <a:blip r:embed="rId4" cstate="print"/>
+          <a:srcRect/>
+          <a:stretch>
+            <a:fillRect/>
+          </a:stretch>
+        </p:blipFill>
+        <p:spPr bwMode="auto">
+          <a:xfrm>
+            <a:off x="304800" y="3962400"/>
+            <a:ext cx="7696200" cy="1903711"/>
+          </a:xfrm>
+          <a:prstGeom prst="rect">
+            <a:avLst/>
+          </a:prstGeom>
+          <a:noFill/>
+          <a:ln w="9525">
+            <a:noFill/>
+            <a:miter lim="800000"/>
+            <a:headEnd/>
+            <a:tailEnd/>
+          </a:ln>
+          <a:effectLst>
+            <a:outerShdw blurRad="63500" sx="102000" sy="102000" algn="ctr" rotWithShape="0">
+              <a:prstClr val="black">
+                <a:alpha val="40000"/>
+              </a:prstClr>
+            </a:outerShdw>
+          </a:effectLst>
+        </p:spPr>
+      </p:pic>
+    </p:spTree>
+  </p:cSld>
+  <p:clrMapOvr>
+    <a:masterClrMapping/>
+  </p:clrMapOvr>
+</p:sld>
+</file>
+
+<file path=ppt/slides/slide26.xml><?xml version="1.0" encoding="utf-8"?>
+<p:sld xmlns:a="http://schemas.openxmlformats.org/drawingml/2006/main" xmlns:r="http://schemas.openxmlformats.org/officeDocument/2006/relationships" xmlns:p="http://schemas.openxmlformats.org/presentationml/2006/main">
+  <p:cSld>
+    <p:spTree>
+      <p:nvGrpSpPr>
+        <p:cNvPr id="1" name=""/>
+        <p:cNvGrpSpPr/>
+        <p:nvPr/>
+      </p:nvGrpSpPr>
+      <p:grpSpPr>
+        <a:xfrm>
+          <a:off x="0" y="0"/>
+          <a:ext cx="0" cy="0"/>
+          <a:chOff x="0" y="0"/>
+          <a:chExt cx="0" cy="0"/>
+        </a:xfrm>
+      </p:grpSpPr>
+      <p:sp>
+        <p:nvSpPr>
+          <p:cNvPr id="2" name="Title 1"/>
+          <p:cNvSpPr>
+            <a:spLocks noGrp="1"/>
+          </p:cNvSpPr>
+          <p:nvPr>
+            <p:ph type="title"/>
+          </p:nvPr>
+        </p:nvSpPr>
+        <p:spPr/>
+        <p:txBody>
+          <a:bodyPr/>
+          <a:lstStyle/>
+          <a:p>
+            <a:r>
+              <a:rPr lang="en-US" dirty="0" smtClean="0"/>
+              <a:t>On Binding</a:t>
+            </a:r>
+            <a:endParaRPr lang="en-US" dirty="0"/>
+          </a:p>
+        </p:txBody>
+      </p:sp>
+      <p:pic>
+        <p:nvPicPr>
+          <p:cNvPr id="10242" name="Picture 2"/>
+          <p:cNvPicPr>
+            <a:picLocks noChangeAspect="1" noChangeArrowheads="1"/>
+          </p:cNvPicPr>
+          <p:nvPr/>
+        </p:nvPicPr>
+        <p:blipFill>
+          <a:blip r:embed="rId2" cstate="print"/>
+          <a:srcRect/>
+          <a:stretch>
+            <a:fillRect/>
+          </a:stretch>
+        </p:blipFill>
+        <p:spPr bwMode="auto">
+          <a:xfrm>
+            <a:off x="838200" y="1905000"/>
+            <a:ext cx="6977743" cy="381000"/>
+          </a:xfrm>
+          <a:prstGeom prst="rect">
+            <a:avLst/>
+          </a:prstGeom>
+          <a:noFill/>
+          <a:ln w="9525">
+            <a:noFill/>
+            <a:miter lim="800000"/>
+            <a:headEnd/>
+            <a:tailEnd/>
+          </a:ln>
+          <a:effectLst/>
+        </p:spPr>
+      </p:pic>
+      <p:sp>
+        <p:nvSpPr>
+          <p:cNvPr id="5" name="Down Arrow 4"/>
+          <p:cNvSpPr/>
+          <p:nvPr/>
+        </p:nvSpPr>
+        <p:spPr>
+          <a:xfrm rot="10800000">
+            <a:off x="5029200" y="2362200"/>
+            <a:ext cx="609600" cy="1230702"/>
+          </a:xfrm>
+          <a:prstGeom prst="downArrow">
+            <a:avLst/>
+          </a:prstGeom>
+        </p:spPr>
+        <p:style>
+          <a:lnRef idx="2">
+            <a:schemeClr val="accent1">
+              <a:shade val="50000"/>
+            </a:schemeClr>
+          </a:lnRef>
+          <a:fillRef idx="1">
+            <a:schemeClr val="accent1"/>
+          </a:fillRef>
+          <a:effectRef idx="0">
+            <a:schemeClr val="accent1"/>
+          </a:effectRef>
+          <a:fontRef idx="minor">
+            <a:schemeClr val="lt1"/>
+          </a:fontRef>
+        </p:style>
+        <p:txBody>
+          <a:bodyPr rtlCol="0" anchor="ctr"/>
+          <a:lstStyle/>
+          <a:p>
+            <a:pPr algn="ctr"/>
+            <a:endParaRPr lang="en-US"/>
+          </a:p>
+        </p:txBody>
+      </p:sp>
+      <p:sp>
+        <p:nvSpPr>
+          <p:cNvPr id="6" name="TextBox 5"/>
+          <p:cNvSpPr txBox="1"/>
+          <p:nvPr/>
+        </p:nvSpPr>
+        <p:spPr>
+          <a:xfrm>
+            <a:off x="3657600" y="3657600"/>
+            <a:ext cx="2732351" cy="369332"/>
+          </a:xfrm>
+          <a:prstGeom prst="rect">
+            <a:avLst/>
+          </a:prstGeom>
+          <a:noFill/>
+        </p:spPr>
+        <p:txBody>
+          <a:bodyPr wrap="none" rtlCol="0">
+            <a:spAutoFit/>
+          </a:bodyPr>
+          <a:lstStyle/>
+          <a:p>
+            <a:r>
+              <a:rPr lang="en-US" dirty="0" smtClean="0"/>
+              <a:t>Validates On Data Errors</a:t>
+            </a:r>
+            <a:endParaRPr lang="en-US" dirty="0"/>
+          </a:p>
+        </p:txBody>
+      </p:sp>
+    </p:spTree>
+  </p:cSld>
+  <p:clrMapOvr>
+    <a:masterClrMapping/>
+  </p:clrMapOvr>
+</p:sld>
+</file>
+
+<file path=ppt/slides/slide27.xml><?xml version="1.0" encoding="utf-8"?>
+<p:sld xmlns:a="http://schemas.openxmlformats.org/drawingml/2006/main" xmlns:r="http://schemas.openxmlformats.org/officeDocument/2006/relationships" xmlns:p="http://schemas.openxmlformats.org/presentationml/2006/main">
+  <p:cSld>
+    <p:spTree>
+      <p:nvGrpSpPr>
+        <p:cNvPr id="1" name=""/>
+        <p:cNvGrpSpPr/>
+        <p:nvPr/>
+      </p:nvGrpSpPr>
+      <p:grpSpPr>
+        <a:xfrm>
+          <a:off x="0" y="0"/>
+          <a:ext cx="0" cy="0"/>
+          <a:chOff x="0" y="0"/>
+          <a:chExt cx="0" cy="0"/>
+        </a:xfrm>
+      </p:grpSpPr>
+      <p:sp>
+        <p:nvSpPr>
+          <p:cNvPr id="2" name="Title 1"/>
+          <p:cNvSpPr>
+            <a:spLocks noGrp="1"/>
+          </p:cNvSpPr>
+          <p:nvPr>
+            <p:ph type="title"/>
+          </p:nvPr>
+        </p:nvSpPr>
+        <p:spPr/>
+        <p:txBody>
+          <a:bodyPr/>
+          <a:lstStyle/>
+          <a:p>
+            <a:r>
+              <a:rPr lang="en-US" dirty="0" smtClean="0"/>
+              <a:t>Custom </a:t>
+            </a:r>
+            <a:r>
+              <a:rPr lang="en-US" smtClean="0"/>
+              <a:t>Markup Extensions</a:t>
+            </a:r>
+            <a:endParaRPr lang="en-US" dirty="0"/>
+          </a:p>
+        </p:txBody>
+      </p:sp>
+      <p:sp>
+        <p:nvSpPr>
+          <p:cNvPr id="3" name="Content Placeholder 2"/>
+          <p:cNvSpPr>
+            <a:spLocks noGrp="1"/>
+          </p:cNvSpPr>
+          <p:nvPr>
+            <p:ph idx="1"/>
+          </p:nvPr>
+        </p:nvSpPr>
+        <p:spPr/>
+        <p:txBody>
+          <a:bodyPr/>
+          <a:lstStyle/>
+          <a:p>
+            <a:endParaRPr lang="en-US"/>
+          </a:p>
+        </p:txBody>
+      </p:sp>
+    </p:spTree>
+  </p:cSld>
+  <p:clrMapOvr>
+    <a:masterClrMapping/>
+  </p:clrMapOvr>
+</p:sld>
+</file>
+
+<file path=ppt/slides/slide28.xml><?xml version="1.0" encoding="utf-8"?>
+<p:sld xmlns:a="http://schemas.openxmlformats.org/drawingml/2006/main" xmlns:r="http://schemas.openxmlformats.org/officeDocument/2006/relationships" xmlns:p="http://schemas.openxmlformats.org/presentationml/2006/main">
+  <p:cSld>
+    <p:spTree>
+      <p:nvGrpSpPr>
+        <p:cNvPr id="1" name=""/>
+        <p:cNvGrpSpPr/>
+        <p:nvPr/>
+      </p:nvGrpSpPr>
+      <p:grpSpPr>
+        <a:xfrm>
+          <a:off x="0" y="0"/>
+          <a:ext cx="0" cy="0"/>
+          <a:chOff x="0" y="0"/>
+          <a:chExt cx="0" cy="0"/>
+        </a:xfrm>
+      </p:grpSpPr>
+      <p:sp>
+        <p:nvSpPr>
+          <p:cNvPr id="2" name="Title 1"/>
+          <p:cNvSpPr>
+            <a:spLocks noGrp="1"/>
+          </p:cNvSpPr>
+          <p:nvPr>
+            <p:ph type="title"/>
+          </p:nvPr>
+        </p:nvSpPr>
+        <p:spPr/>
+        <p:txBody>
+          <a:bodyPr/>
+          <a:lstStyle/>
+          <a:p>
+            <a:r>
+              <a:rPr lang="en-US" dirty="0" smtClean="0"/>
+              <a:t>References</a:t>
+            </a:r>
+            <a:endParaRPr lang="en-US" dirty="0"/>
+          </a:p>
+        </p:txBody>
+      </p:sp>
       <p:sp>
         <p:nvSpPr>
           <p:cNvPr id="3" name="Content Placeholder 2"/>

</xml_diff>

<commit_message>
Final work for presentation
</commit_message>
<xml_diff>
--- a/WPF Validation.pptx
+++ b/WPF Validation.pptx
@@ -56,7 +56,11 @@
     <p:sldId id="289" r:id="rId50"/>
     <p:sldId id="290" r:id="rId51"/>
     <p:sldId id="291" r:id="rId52"/>
-    <p:sldId id="280" r:id="rId53"/>
+    <p:sldId id="315" r:id="rId53"/>
+    <p:sldId id="312" r:id="rId54"/>
+    <p:sldId id="313" r:id="rId55"/>
+    <p:sldId id="314" r:id="rId56"/>
+    <p:sldId id="280" r:id="rId57"/>
   </p:sldIdLst>
   <p:sldSz cx="9144000" cy="6858000" type="screen4x3"/>
   <p:notesSz cx="6858000" cy="9144000"/>
@@ -340,7 +344,7 @@
             <a:fld id="{60029C98-5D54-43BD-B436-29F4C541DD0B}" type="datetimeFigureOut">
               <a:rPr lang="en-US" smtClean="0"/>
               <a:pPr/>
-              <a:t>9/25/2009</a:t>
+              <a:t>9/26/2009</a:t>
             </a:fld>
             <a:endParaRPr lang="en-US"/>
           </a:p>
@@ -507,7 +511,7 @@
             <a:fld id="{60029C98-5D54-43BD-B436-29F4C541DD0B}" type="datetimeFigureOut">
               <a:rPr lang="en-US" smtClean="0"/>
               <a:pPr/>
-              <a:t>9/25/2009</a:t>
+              <a:t>9/26/2009</a:t>
             </a:fld>
             <a:endParaRPr lang="en-US"/>
           </a:p>
@@ -684,7 +688,7 @@
             <a:fld id="{60029C98-5D54-43BD-B436-29F4C541DD0B}" type="datetimeFigureOut">
               <a:rPr lang="en-US" smtClean="0"/>
               <a:pPr/>
-              <a:t>9/25/2009</a:t>
+              <a:t>9/26/2009</a:t>
             </a:fld>
             <a:endParaRPr lang="en-US"/>
           </a:p>
@@ -851,7 +855,7 @@
             <a:fld id="{60029C98-5D54-43BD-B436-29F4C541DD0B}" type="datetimeFigureOut">
               <a:rPr lang="en-US" smtClean="0"/>
               <a:pPr/>
-              <a:t>9/25/2009</a:t>
+              <a:t>9/26/2009</a:t>
             </a:fld>
             <a:endParaRPr lang="en-US"/>
           </a:p>
@@ -1094,7 +1098,7 @@
             <a:fld id="{60029C98-5D54-43BD-B436-29F4C541DD0B}" type="datetimeFigureOut">
               <a:rPr lang="en-US" smtClean="0"/>
               <a:pPr/>
-              <a:t>9/25/2009</a:t>
+              <a:t>9/26/2009</a:t>
             </a:fld>
             <a:endParaRPr lang="en-US"/>
           </a:p>
@@ -1379,7 +1383,7 @@
             <a:fld id="{60029C98-5D54-43BD-B436-29F4C541DD0B}" type="datetimeFigureOut">
               <a:rPr lang="en-US" smtClean="0"/>
               <a:pPr/>
-              <a:t>9/25/2009</a:t>
+              <a:t>9/26/2009</a:t>
             </a:fld>
             <a:endParaRPr lang="en-US"/>
           </a:p>
@@ -1798,7 +1802,7 @@
             <a:fld id="{60029C98-5D54-43BD-B436-29F4C541DD0B}" type="datetimeFigureOut">
               <a:rPr lang="en-US" smtClean="0"/>
               <a:pPr/>
-              <a:t>9/25/2009</a:t>
+              <a:t>9/26/2009</a:t>
             </a:fld>
             <a:endParaRPr lang="en-US"/>
           </a:p>
@@ -1913,7 +1917,7 @@
             <a:fld id="{60029C98-5D54-43BD-B436-29F4C541DD0B}" type="datetimeFigureOut">
               <a:rPr lang="en-US" smtClean="0"/>
               <a:pPr/>
-              <a:t>9/25/2009</a:t>
+              <a:t>9/26/2009</a:t>
             </a:fld>
             <a:endParaRPr lang="en-US"/>
           </a:p>
@@ -2005,7 +2009,7 @@
             <a:fld id="{60029C98-5D54-43BD-B436-29F4C541DD0B}" type="datetimeFigureOut">
               <a:rPr lang="en-US" smtClean="0"/>
               <a:pPr/>
-              <a:t>9/25/2009</a:t>
+              <a:t>9/26/2009</a:t>
             </a:fld>
             <a:endParaRPr lang="en-US"/>
           </a:p>
@@ -2279,7 +2283,7 @@
             <a:fld id="{60029C98-5D54-43BD-B436-29F4C541DD0B}" type="datetimeFigureOut">
               <a:rPr lang="en-US" smtClean="0"/>
               <a:pPr/>
-              <a:t>9/25/2009</a:t>
+              <a:t>9/26/2009</a:t>
             </a:fld>
             <a:endParaRPr lang="en-US"/>
           </a:p>
@@ -2533,7 +2537,7 @@
             <a:fld id="{60029C98-5D54-43BD-B436-29F4C541DD0B}" type="datetimeFigureOut">
               <a:rPr lang="en-US" smtClean="0"/>
               <a:pPr/>
-              <a:t>9/25/2009</a:t>
+              <a:t>9/26/2009</a:t>
             </a:fld>
             <a:endParaRPr lang="en-US"/>
           </a:p>
@@ -2760,7 +2764,7 @@
             <a:fld id="{60029C98-5D54-43BD-B436-29F4C541DD0B}" type="datetimeFigureOut">
               <a:rPr lang="en-US" smtClean="0"/>
               <a:pPr/>
-              <a:t>9/25/2009</a:t>
+              <a:t>9/26/2009</a:t>
             </a:fld>
             <a:endParaRPr lang="en-US"/>
           </a:p>
@@ -3148,11 +3152,7 @@
           <a:p>
             <a:r>
               <a:rPr lang="en-US" dirty="0" smtClean="0"/>
-              <a:t>WPF </a:t>
-            </a:r>
-            <a:r>
-              <a:rPr lang="en-US" dirty="0" smtClean="0"/>
-              <a:t>Input Validation</a:t>
+              <a:t>WPF Input Validation</a:t>
             </a:r>
             <a:endParaRPr lang="en-US" dirty="0"/>
           </a:p>
@@ -3811,26 +3811,20 @@
             <a:avLst/>
           </a:prstGeom>
           <a:noFill/>
-          <a:ln w="28575">
-            <a:solidFill>
-              <a:srgbClr val="FF0000"/>
-            </a:solidFill>
-          </a:ln>
+          <a:ln/>
         </p:spPr>
         <p:style>
           <a:lnRef idx="2">
-            <a:schemeClr val="accent1">
-              <a:shade val="50000"/>
-            </a:schemeClr>
+            <a:schemeClr val="accent2"/>
           </a:lnRef>
           <a:fillRef idx="1">
-            <a:schemeClr val="accent1"/>
+            <a:schemeClr val="lt1"/>
           </a:fillRef>
           <a:effectRef idx="0">
-            <a:schemeClr val="accent1"/>
+            <a:schemeClr val="accent2"/>
           </a:effectRef>
           <a:fontRef idx="minor">
-            <a:schemeClr val="lt1"/>
+            <a:schemeClr val="dk1"/>
           </a:fontRef>
         </p:style>
         <p:txBody>
@@ -3850,8 +3844,8 @@
         </p:nvSpPr>
         <p:spPr>
           <a:xfrm>
-            <a:off x="685800" y="2590800"/>
-            <a:ext cx="3424848" cy="369332"/>
+            <a:off x="1219200" y="1447800"/>
+            <a:ext cx="4033476" cy="461665"/>
           </a:xfrm>
           <a:prstGeom prst="rect">
             <a:avLst/>
@@ -3865,10 +3859,10 @@
           <a:lstStyle/>
           <a:p>
             <a:r>
-              <a:rPr lang="en-US" dirty="0" smtClean="0"/>
+              <a:rPr lang="en-US" sz="2400" dirty="0" smtClean="0"/>
               <a:t>Just inherit from Validation Rule</a:t>
             </a:r>
-            <a:endParaRPr lang="en-US" dirty="0"/>
+            <a:endParaRPr lang="en-US" sz="2400" dirty="0"/>
           </a:p>
         </p:txBody>
       </p:sp>
@@ -3880,8 +3874,8 @@
         </p:nvSpPr>
         <p:spPr>
           <a:xfrm>
-            <a:off x="1752600" y="3048000"/>
-            <a:ext cx="3218382" cy="369332"/>
+            <a:off x="1447800" y="2895600"/>
+            <a:ext cx="4231928" cy="461665"/>
           </a:xfrm>
           <a:prstGeom prst="rect">
             <a:avLst/>
@@ -3895,10 +3889,10 @@
           <a:lstStyle/>
           <a:p>
             <a:r>
-              <a:rPr lang="en-US" dirty="0" smtClean="0"/>
+              <a:rPr lang="en-US" sz="2400" dirty="0" smtClean="0"/>
               <a:t>And override Validate method …</a:t>
             </a:r>
-            <a:endParaRPr lang="en-US" dirty="0"/>
+            <a:endParaRPr lang="en-US" sz="2400" dirty="0"/>
           </a:p>
         </p:txBody>
       </p:sp>
@@ -4944,13 +4938,42 @@
           <a:p>
             <a:r>
               <a:rPr lang="en-US" dirty="0" smtClean="0"/>
-              <a:t>Blog : theabsentmindedcoder.com</a:t>
+              <a:t>Blogs : </a:t>
+            </a:r>
+          </a:p>
+          <a:p>
+            <a:pPr lvl="1"/>
+            <a:r>
+              <a:rPr lang="en-US" dirty="0" smtClean="0"/>
+              <a:t>theabsentmindedcoder.com</a:t>
+            </a:r>
+          </a:p>
+          <a:p>
+            <a:pPr lvl="1"/>
+            <a:r>
+              <a:rPr lang="en-US" dirty="0" smtClean="0"/>
+              <a:t>wizardsofsmart.net</a:t>
             </a:r>
           </a:p>
           <a:p>
             <a:r>
               <a:rPr lang="en-US" dirty="0" smtClean="0"/>
               <a:t>Twitter : </a:t>
+            </a:r>
+            <a:r>
+              <a:rPr lang="en-US" dirty="0" err="1" smtClean="0"/>
+              <a:t>RookieOne</a:t>
+            </a:r>
+            <a:endParaRPr lang="en-US" dirty="0" smtClean="0"/>
+          </a:p>
+          <a:p>
+            <a:r>
+              <a:rPr lang="en-US" dirty="0" err="1" smtClean="0"/>
+              <a:t>GitHub</a:t>
+            </a:r>
+            <a:r>
+              <a:rPr lang="en-US" dirty="0" smtClean="0"/>
+              <a:t> : github.com/</a:t>
             </a:r>
             <a:r>
               <a:rPr lang="en-US" dirty="0" err="1" smtClean="0"/>
@@ -5454,7 +5477,7 @@
         <p:spPr>
           <a:xfrm>
             <a:off x="304800" y="4191000"/>
-            <a:ext cx="4572000" cy="461665"/>
+            <a:ext cx="4648200" cy="461665"/>
           </a:xfrm>
           <a:prstGeom prst="rect">
             <a:avLst/>
@@ -5469,7 +5492,15 @@
           <a:p>
             <a:r>
               <a:rPr lang="en-US" sz="2400" dirty="0" smtClean="0"/>
-              <a:t>But I lost my Error Message tooltip</a:t>
+              <a:t>Now </a:t>
+            </a:r>
+            <a:r>
+              <a:rPr lang="en-US" sz="2400" dirty="0" smtClean="0"/>
+              <a:t>I loss </a:t>
+            </a:r>
+            <a:r>
+              <a:rPr lang="en-US" sz="2400" dirty="0" smtClean="0"/>
+              <a:t>my Error Message tooltip</a:t>
             </a:r>
             <a:endParaRPr lang="en-US" sz="2400" dirty="0"/>
           </a:p>
@@ -5702,8 +5733,8 @@
         </p:nvSpPr>
         <p:spPr>
           <a:xfrm>
-            <a:off x="3124200" y="1600200"/>
-            <a:ext cx="1877437" cy="369332"/>
+            <a:off x="2209800" y="1371600"/>
+            <a:ext cx="2872709" cy="584775"/>
           </a:xfrm>
           <a:prstGeom prst="rect">
             <a:avLst/>
@@ -5717,10 +5748,10 @@
           <a:lstStyle/>
           <a:p>
             <a:r>
-              <a:rPr lang="en-US" dirty="0" smtClean="0"/>
+              <a:rPr lang="en-US" sz="3200" dirty="0" smtClean="0"/>
               <a:t>Throw exception</a:t>
             </a:r>
-            <a:endParaRPr lang="en-US" dirty="0"/>
+            <a:endParaRPr lang="en-US" sz="3200" dirty="0"/>
           </a:p>
         </p:txBody>
       </p:sp>
@@ -5822,8 +5853,8 @@
         </p:nvSpPr>
         <p:spPr>
           <a:xfrm>
-            <a:off x="3124200" y="1524000"/>
-            <a:ext cx="2963183" cy="369332"/>
+            <a:off x="2133600" y="1524000"/>
+            <a:ext cx="5105950" cy="523220"/>
           </a:xfrm>
           <a:prstGeom prst="rect">
             <a:avLst/>
@@ -5837,14 +5868,18 @@
           <a:lstStyle/>
           <a:p>
             <a:r>
-              <a:rPr lang="en-US" dirty="0" smtClean="0"/>
+              <a:rPr lang="en-US" sz="2800" dirty="0" smtClean="0"/>
               <a:t>Set </a:t>
             </a:r>
             <a:r>
-              <a:rPr lang="en-US" dirty="0" err="1" smtClean="0"/>
+              <a:rPr lang="en-US" sz="2800" dirty="0" err="1" smtClean="0"/>
               <a:t>ValidatesOnExceptions</a:t>
             </a:r>
-            <a:endParaRPr lang="en-US" dirty="0"/>
+            <a:r>
+              <a:rPr lang="en-US" sz="2800" dirty="0" smtClean="0"/>
+              <a:t> to True</a:t>
+            </a:r>
+            <a:endParaRPr lang="en-US" sz="2800" dirty="0"/>
           </a:p>
         </p:txBody>
       </p:sp>
@@ -5889,7 +5924,7 @@
         </p:nvSpPr>
         <p:spPr>
           <a:xfrm>
-            <a:off x="5029200" y="2057400"/>
+            <a:off x="4724400" y="2057400"/>
             <a:ext cx="533400" cy="1143000"/>
           </a:xfrm>
           <a:prstGeom prst="downArrow">
@@ -5988,7 +6023,7 @@
         </p:blipFill>
         <p:spPr bwMode="auto">
           <a:xfrm>
-            <a:off x="1295400" y="1447800"/>
+            <a:off x="1409875" y="1447800"/>
             <a:ext cx="5819775" cy="971550"/>
           </a:xfrm>
           <a:prstGeom prst="rect">
@@ -6020,7 +6055,7 @@
         </p:blipFill>
         <p:spPr bwMode="auto">
           <a:xfrm>
-            <a:off x="1295400" y="4876800"/>
+            <a:off x="1409875" y="4876800"/>
             <a:ext cx="5819775" cy="942975"/>
           </a:xfrm>
           <a:prstGeom prst="rect">
@@ -6052,7 +6087,7 @@
         </p:blipFill>
         <p:spPr bwMode="auto">
           <a:xfrm>
-            <a:off x="1295400" y="3124200"/>
+            <a:off x="1405112" y="3124200"/>
             <a:ext cx="5829300" cy="923925"/>
           </a:xfrm>
           <a:prstGeom prst="rect">
@@ -6075,8 +6110,8 @@
         </p:nvSpPr>
         <p:spPr>
           <a:xfrm>
-            <a:off x="1371600" y="2667000"/>
-            <a:ext cx="5253361" cy="369332"/>
+            <a:off x="838200" y="2590800"/>
+            <a:ext cx="6963125" cy="461665"/>
           </a:xfrm>
           <a:prstGeom prst="rect">
             <a:avLst/>
@@ -6090,10 +6125,10 @@
           <a:lstStyle/>
           <a:p>
             <a:r>
-              <a:rPr lang="en-US" dirty="0" smtClean="0"/>
+              <a:rPr lang="en-US" sz="2400" dirty="0" smtClean="0"/>
               <a:t>Hmm… not exactly the error message we would want…</a:t>
             </a:r>
-            <a:endParaRPr lang="en-US" dirty="0"/>
+            <a:endParaRPr lang="en-US" sz="2400" dirty="0"/>
           </a:p>
         </p:txBody>
       </p:sp>
@@ -6105,8 +6140,8 @@
         </p:nvSpPr>
         <p:spPr>
           <a:xfrm>
-            <a:off x="1447800" y="4267200"/>
-            <a:ext cx="2654894" cy="369332"/>
+            <a:off x="2568321" y="4191000"/>
+            <a:ext cx="3502882" cy="461665"/>
           </a:xfrm>
           <a:prstGeom prst="rect">
             <a:avLst/>
@@ -6120,18 +6155,10 @@
           <a:lstStyle/>
           <a:p>
             <a:r>
-              <a:rPr lang="en-US" dirty="0" smtClean="0"/>
-              <a:t>And this message </a:t>
-            </a:r>
-            <a:r>
-              <a:rPr lang="en-US" dirty="0" smtClean="0"/>
-              <a:t>is </a:t>
-            </a:r>
-            <a:r>
-              <a:rPr lang="en-US" dirty="0" smtClean="0"/>
-              <a:t>lame…</a:t>
-            </a:r>
-            <a:endParaRPr lang="en-US" dirty="0"/>
+              <a:rPr lang="en-US" sz="2400" dirty="0" smtClean="0"/>
+              <a:t>And this message is lame…</a:t>
+            </a:r>
+            <a:endParaRPr lang="en-US" sz="2400" dirty="0"/>
           </a:p>
         </p:txBody>
       </p:sp>
@@ -6587,10 +6614,85 @@
         </p:nvSpPr>
         <p:spPr/>
         <p:txBody>
-          <a:bodyPr/>
-          <a:lstStyle/>
-          <a:p>
-            <a:endParaRPr lang="en-US"/>
+          <a:bodyPr>
+            <a:normAutofit fontScale="92500" lnSpcReduction="20000"/>
+          </a:bodyPr>
+          <a:lstStyle/>
+          <a:p>
+            <a:r>
+              <a:rPr lang="en-US" dirty="0" smtClean="0"/>
+              <a:t>What : Virtual Brown Bags</a:t>
+            </a:r>
+          </a:p>
+          <a:p>
+            <a:pPr lvl="1"/>
+            <a:r>
+              <a:rPr lang="en-US" sz="2600" dirty="0" smtClean="0"/>
+              <a:t>An online meeting where the attendees share:</a:t>
+            </a:r>
+          </a:p>
+          <a:p>
+            <a:pPr lvl="2"/>
+            <a:r>
+              <a:rPr lang="en-US" dirty="0" smtClean="0"/>
+              <a:t>Tips and tricks</a:t>
+            </a:r>
+          </a:p>
+          <a:p>
+            <a:pPr lvl="3"/>
+            <a:r>
+              <a:rPr lang="en-US" dirty="0" smtClean="0"/>
+              <a:t>Tools, shortcuts, articles, books, patterns, languages, you name it</a:t>
+            </a:r>
+          </a:p>
+          <a:p>
+            <a:pPr lvl="2"/>
+            <a:r>
+              <a:rPr lang="en-US" dirty="0" smtClean="0"/>
+              <a:t>Experiences</a:t>
+            </a:r>
+          </a:p>
+          <a:p>
+            <a:pPr lvl="3"/>
+            <a:r>
+              <a:rPr lang="en-US" dirty="0" smtClean="0"/>
+              <a:t>Things they’ve learned the hard way</a:t>
+            </a:r>
+          </a:p>
+          <a:p>
+            <a:pPr lvl="2"/>
+            <a:r>
+              <a:rPr lang="en-US" dirty="0" smtClean="0"/>
+              <a:t>Frustrations or difficulties</a:t>
+            </a:r>
+          </a:p>
+          <a:p>
+            <a:pPr lvl="3"/>
+            <a:r>
+              <a:rPr lang="en-US" dirty="0" smtClean="0"/>
+              <a:t>Frustrating issues or difficulties they’re facing that somebody else may be able to help them with</a:t>
+            </a:r>
+          </a:p>
+          <a:p>
+            <a:r>
+              <a:rPr lang="en-US" dirty="0" smtClean="0"/>
+              <a:t>When : Every Thursday @ 12pm – 1pm</a:t>
+            </a:r>
+          </a:p>
+          <a:p>
+            <a:r>
+              <a:rPr lang="en-US" dirty="0" smtClean="0"/>
+              <a:t>Where : http://snipr.com/virtualaltnet </a:t>
+            </a:r>
+          </a:p>
+          <a:p>
+            <a:r>
+              <a:rPr lang="en-US" dirty="0" smtClean="0"/>
+              <a:t>Who : Anyone and Everyone</a:t>
+            </a:r>
+          </a:p>
+          <a:p>
+            <a:endParaRPr lang="en-US" dirty="0"/>
           </a:p>
         </p:txBody>
       </p:sp>
@@ -6724,7 +6826,7 @@
         <p:spPr>
           <a:xfrm>
             <a:off x="3657600" y="3657600"/>
-            <a:ext cx="2732351" cy="369332"/>
+            <a:ext cx="3789627" cy="523220"/>
           </a:xfrm>
           <a:prstGeom prst="rect">
             <a:avLst/>
@@ -6738,10 +6840,10 @@
           <a:lstStyle/>
           <a:p>
             <a:r>
-              <a:rPr lang="en-US" dirty="0" smtClean="0"/>
+              <a:rPr lang="en-US" sz="2800" dirty="0" smtClean="0"/>
               <a:t>Validates On Data Errors</a:t>
             </a:r>
-            <a:endParaRPr lang="en-US" dirty="0"/>
+            <a:endParaRPr lang="en-US" sz="2800" dirty="0"/>
           </a:p>
         </p:txBody>
       </p:sp>
@@ -7502,26 +7604,20 @@
             <a:avLst/>
           </a:prstGeom>
           <a:noFill/>
-          <a:ln w="28575">
-            <a:solidFill>
-              <a:srgbClr val="FF0000"/>
-            </a:solidFill>
-          </a:ln>
+          <a:ln/>
         </p:spPr>
         <p:style>
           <a:lnRef idx="2">
-            <a:schemeClr val="accent1">
-              <a:shade val="50000"/>
-            </a:schemeClr>
+            <a:schemeClr val="accent2"/>
           </a:lnRef>
           <a:fillRef idx="1">
-            <a:schemeClr val="accent1"/>
+            <a:schemeClr val="lt1"/>
           </a:fillRef>
           <a:effectRef idx="0">
-            <a:schemeClr val="accent1"/>
+            <a:schemeClr val="accent2"/>
           </a:effectRef>
           <a:fontRef idx="minor">
-            <a:schemeClr val="lt1"/>
+            <a:schemeClr val="dk1"/>
           </a:fontRef>
         </p:style>
         <p:txBody>
@@ -7853,21 +7949,12 @@
               <a:rPr lang="en-US" dirty="0" smtClean="0"/>
               <a:t> @</a:t>
             </a:r>
-            <a:endParaRPr lang="en-US" dirty="0" smtClean="0"/>
           </a:p>
           <a:p>
             <a:pPr lvl="1"/>
             <a:r>
               <a:rPr lang="en-US" sz="1800" dirty="0" smtClean="0"/>
-              <a:t>http</a:t>
-            </a:r>
-            <a:r>
-              <a:rPr lang="en-US" sz="1800" dirty="0" smtClean="0"/>
-              <a:t>://</a:t>
-            </a:r>
-            <a:r>
-              <a:rPr lang="en-US" sz="1800" dirty="0" smtClean="0"/>
-              <a:t>www.bennedik.de/2007/04/wpf-integration-for-validation.html</a:t>
+              <a:t>http://www.bennedik.de/2007/04/wpf-integration-for-validation.html</a:t>
             </a:r>
           </a:p>
           <a:p>
@@ -7944,7 +8031,11 @@
           <a:p>
             <a:r>
               <a:rPr lang="en-US" dirty="0" smtClean="0"/>
-              <a:t>EPS / CODE Consulting</a:t>
+              <a:t>EPS </a:t>
+            </a:r>
+            <a:r>
+              <a:rPr lang="en-US" dirty="0" smtClean="0"/>
+              <a:t>Consulting</a:t>
             </a:r>
             <a:endParaRPr lang="en-US" dirty="0"/>
           </a:p>
@@ -7965,7 +8056,51 @@
           <a:bodyPr/>
           <a:lstStyle/>
           <a:p>
-            <a:endParaRPr lang="en-US"/>
+            <a:r>
+              <a:rPr lang="en-US" dirty="0" smtClean="0"/>
+              <a:t>Custom Software Development</a:t>
+            </a:r>
+          </a:p>
+          <a:p>
+            <a:r>
+              <a:rPr lang="en-US" dirty="0" smtClean="0"/>
+              <a:t>Consulting / Mentoring</a:t>
+            </a:r>
+          </a:p>
+          <a:p>
+            <a:r>
+              <a:rPr lang="en-US" dirty="0" smtClean="0"/>
+              <a:t>Training</a:t>
+            </a:r>
+          </a:p>
+          <a:p>
+            <a:pPr lvl="1"/>
+            <a:r>
+              <a:rPr lang="en-US" dirty="0" smtClean="0"/>
+              <a:t>WPF</a:t>
+            </a:r>
+          </a:p>
+          <a:p>
+            <a:pPr lvl="1"/>
+            <a:r>
+              <a:rPr lang="en-US" dirty="0" smtClean="0"/>
+              <a:t>.NET</a:t>
+            </a:r>
+          </a:p>
+          <a:p>
+            <a:r>
+              <a:rPr lang="en-US" dirty="0" smtClean="0"/>
+              <a:t>CODE Magazine</a:t>
+            </a:r>
+          </a:p>
+          <a:p>
+            <a:r>
+              <a:rPr lang="en-US" dirty="0" smtClean="0"/>
+              <a:t>Hiring Developers, PM’s</a:t>
+            </a:r>
+          </a:p>
+          <a:p>
+            <a:endParaRPr lang="en-US" dirty="0"/>
           </a:p>
         </p:txBody>
       </p:sp>
@@ -8128,7 +8263,7 @@
         </p:blipFill>
         <p:spPr bwMode="auto">
           <a:xfrm>
-            <a:off x="685800" y="4038600"/>
+            <a:off x="1295400" y="4038600"/>
             <a:ext cx="6829425" cy="381000"/>
           </a:xfrm>
           <a:prstGeom prst="rect">
@@ -8173,6 +8308,38 @@
           </a:p>
         </p:txBody>
       </p:sp>
+      <p:pic>
+        <p:nvPicPr>
+          <p:cNvPr id="3" name="Picture 2"/>
+          <p:cNvPicPr>
+            <a:picLocks noChangeAspect="1" noChangeArrowheads="1"/>
+          </p:cNvPicPr>
+          <p:nvPr/>
+        </p:nvPicPr>
+        <p:blipFill>
+          <a:blip r:embed="rId5" cstate="print"/>
+          <a:srcRect/>
+          <a:stretch>
+            <a:fillRect/>
+          </a:stretch>
+        </p:blipFill>
+        <p:spPr bwMode="auto">
+          <a:xfrm>
+            <a:off x="762000" y="5029200"/>
+            <a:ext cx="3150577" cy="381000"/>
+          </a:xfrm>
+          <a:prstGeom prst="rect">
+            <a:avLst/>
+          </a:prstGeom>
+          <a:noFill/>
+          <a:ln w="9525">
+            <a:noFill/>
+            <a:miter lim="800000"/>
+            <a:headEnd/>
+            <a:tailEnd/>
+          </a:ln>
+        </p:spPr>
+      </p:pic>
     </p:spTree>
   </p:cSld>
   <p:clrMapOvr>
@@ -9668,11 +9835,7 @@
           <a:p>
             <a:r>
               <a:rPr lang="en-US" dirty="0" smtClean="0"/>
-              <a:t>How to do binding validation </a:t>
-            </a:r>
-            <a:r>
-              <a:rPr lang="en-US" dirty="0" smtClean="0"/>
-              <a:t>with:</a:t>
+              <a:t>How to do binding validation with:</a:t>
             </a:r>
           </a:p>
           <a:p>
@@ -9701,26 +9864,14 @@
             <a:pPr lvl="1"/>
             <a:r>
               <a:rPr lang="en-US" dirty="0" smtClean="0"/>
-              <a:t>Enterprise Library - Validation </a:t>
-            </a:r>
-            <a:r>
-              <a:rPr lang="en-US" dirty="0" smtClean="0"/>
-              <a:t>Application </a:t>
-            </a:r>
-            <a:r>
-              <a:rPr lang="en-US" dirty="0" smtClean="0"/>
-              <a:t>Block</a:t>
+              <a:t>Enterprise Library - Validation Application Block</a:t>
             </a:r>
           </a:p>
           <a:p>
             <a:pPr lvl="1"/>
             <a:r>
               <a:rPr lang="en-US" dirty="0" smtClean="0"/>
-              <a:t>Markup </a:t>
-            </a:r>
-            <a:r>
-              <a:rPr lang="en-US" dirty="0" smtClean="0"/>
-              <a:t>Extensions</a:t>
+              <a:t>Markup Extensions</a:t>
             </a:r>
             <a:endParaRPr lang="en-US" dirty="0"/>
           </a:p>
@@ -10068,6 +10219,468 @@
           <a:p>
             <a:r>
               <a:rPr lang="en-US" dirty="0" smtClean="0"/>
+              <a:t>With Custom Markup Extensions</a:t>
+            </a:r>
+            <a:endParaRPr lang="en-US" dirty="0"/>
+          </a:p>
+        </p:txBody>
+      </p:sp>
+      <p:pic>
+        <p:nvPicPr>
+          <p:cNvPr id="3074" name="Picture 2"/>
+          <p:cNvPicPr>
+            <a:picLocks noChangeAspect="1" noChangeArrowheads="1"/>
+          </p:cNvPicPr>
+          <p:nvPr/>
+        </p:nvPicPr>
+        <p:blipFill>
+          <a:blip r:embed="rId2" cstate="print"/>
+          <a:srcRect/>
+          <a:stretch>
+            <a:fillRect/>
+          </a:stretch>
+        </p:blipFill>
+        <p:spPr bwMode="auto">
+          <a:xfrm>
+            <a:off x="1676400" y="1676400"/>
+            <a:ext cx="5819775" cy="962025"/>
+          </a:xfrm>
+          <a:prstGeom prst="rect">
+            <a:avLst/>
+          </a:prstGeom>
+          <a:noFill/>
+          <a:ln w="9525">
+            <a:noFill/>
+            <a:miter lim="800000"/>
+            <a:headEnd/>
+            <a:tailEnd/>
+          </a:ln>
+        </p:spPr>
+      </p:pic>
+      <p:pic>
+        <p:nvPicPr>
+          <p:cNvPr id="3075" name="Picture 3"/>
+          <p:cNvPicPr>
+            <a:picLocks noChangeAspect="1" noChangeArrowheads="1"/>
+          </p:cNvPicPr>
+          <p:nvPr/>
+        </p:nvPicPr>
+        <p:blipFill>
+          <a:blip r:embed="rId3" cstate="print"/>
+          <a:srcRect/>
+          <a:stretch>
+            <a:fillRect/>
+          </a:stretch>
+        </p:blipFill>
+        <p:spPr bwMode="auto">
+          <a:xfrm>
+            <a:off x="1666875" y="3124200"/>
+            <a:ext cx="5838825" cy="962025"/>
+          </a:xfrm>
+          <a:prstGeom prst="rect">
+            <a:avLst/>
+          </a:prstGeom>
+          <a:noFill/>
+          <a:ln w="9525">
+            <a:noFill/>
+            <a:miter lim="800000"/>
+            <a:headEnd/>
+            <a:tailEnd/>
+          </a:ln>
+        </p:spPr>
+      </p:pic>
+      <p:pic>
+        <p:nvPicPr>
+          <p:cNvPr id="3078" name="Picture 6"/>
+          <p:cNvPicPr>
+            <a:picLocks noChangeAspect="1" noChangeArrowheads="1"/>
+          </p:cNvPicPr>
+          <p:nvPr/>
+        </p:nvPicPr>
+        <p:blipFill>
+          <a:blip r:embed="rId4" cstate="print"/>
+          <a:srcRect/>
+          <a:stretch>
+            <a:fillRect/>
+          </a:stretch>
+        </p:blipFill>
+        <p:spPr bwMode="auto">
+          <a:xfrm>
+            <a:off x="1676400" y="4572000"/>
+            <a:ext cx="5819775" cy="942975"/>
+          </a:xfrm>
+          <a:prstGeom prst="rect">
+            <a:avLst/>
+          </a:prstGeom>
+          <a:noFill/>
+          <a:ln w="9525">
+            <a:noFill/>
+            <a:miter lim="800000"/>
+            <a:headEnd/>
+            <a:tailEnd/>
+          </a:ln>
+        </p:spPr>
+      </p:pic>
+    </p:spTree>
+  </p:cSld>
+  <p:clrMapOvr>
+    <a:masterClrMapping/>
+  </p:clrMapOvr>
+</p:sld>
+</file>
+
+<file path=ppt/slides/slide53.xml><?xml version="1.0" encoding="utf-8"?>
+<p:sld xmlns:a="http://schemas.openxmlformats.org/drawingml/2006/main" xmlns:r="http://schemas.openxmlformats.org/officeDocument/2006/relationships" xmlns:p="http://schemas.openxmlformats.org/presentationml/2006/main">
+  <p:cSld>
+    <p:spTree>
+      <p:nvGrpSpPr>
+        <p:cNvPr id="1" name=""/>
+        <p:cNvGrpSpPr/>
+        <p:nvPr/>
+      </p:nvGrpSpPr>
+      <p:grpSpPr>
+        <a:xfrm>
+          <a:off x="0" y="0"/>
+          <a:ext cx="0" cy="0"/>
+          <a:chOff x="0" y="0"/>
+          <a:chExt cx="0" cy="0"/>
+        </a:xfrm>
+      </p:grpSpPr>
+      <p:sp>
+        <p:nvSpPr>
+          <p:cNvPr id="2" name="Title 1"/>
+          <p:cNvSpPr>
+            <a:spLocks noGrp="1"/>
+          </p:cNvSpPr>
+          <p:nvPr>
+            <p:ph type="title"/>
+          </p:nvPr>
+        </p:nvSpPr>
+        <p:spPr/>
+        <p:txBody>
+          <a:bodyPr/>
+          <a:lstStyle/>
+          <a:p>
+            <a:r>
+              <a:rPr lang="en-US" dirty="0" smtClean="0"/>
+              <a:t>Conclusion</a:t>
+            </a:r>
+            <a:endParaRPr lang="en-US" dirty="0"/>
+          </a:p>
+        </p:txBody>
+      </p:sp>
+      <p:sp>
+        <p:nvSpPr>
+          <p:cNvPr id="3" name="Content Placeholder 2"/>
+          <p:cNvSpPr>
+            <a:spLocks noGrp="1"/>
+          </p:cNvSpPr>
+          <p:nvPr>
+            <p:ph idx="1"/>
+          </p:nvPr>
+        </p:nvSpPr>
+        <p:spPr/>
+        <p:txBody>
+          <a:bodyPr>
+            <a:normAutofit/>
+          </a:bodyPr>
+          <a:lstStyle/>
+          <a:p>
+            <a:r>
+              <a:rPr lang="en-US" dirty="0" smtClean="0"/>
+              <a:t>We covered how we can do WPF Input Validation with</a:t>
+            </a:r>
+          </a:p>
+          <a:p>
+            <a:pPr lvl="1"/>
+            <a:r>
+              <a:rPr lang="en-US" dirty="0" smtClean="0"/>
+              <a:t>Validation Rules</a:t>
+            </a:r>
+          </a:p>
+          <a:p>
+            <a:pPr lvl="1"/>
+            <a:r>
+              <a:rPr lang="en-US" dirty="0" smtClean="0"/>
+              <a:t>Exceptions</a:t>
+            </a:r>
+          </a:p>
+          <a:p>
+            <a:pPr lvl="1"/>
+            <a:r>
+              <a:rPr lang="en-US" dirty="0" err="1" smtClean="0"/>
+              <a:t>IDataErrorInfo</a:t>
+            </a:r>
+            <a:endParaRPr lang="en-US" dirty="0" smtClean="0"/>
+          </a:p>
+          <a:p>
+            <a:pPr lvl="1"/>
+            <a:r>
+              <a:rPr lang="en-US" dirty="0" smtClean="0"/>
+              <a:t>Enterprise Library Validation Block</a:t>
+            </a:r>
+          </a:p>
+          <a:p>
+            <a:pPr lvl="1"/>
+            <a:r>
+              <a:rPr lang="en-US" dirty="0" smtClean="0"/>
+              <a:t>Custom Markup Extensions</a:t>
+            </a:r>
+          </a:p>
+          <a:p>
+            <a:endParaRPr lang="en-US" dirty="0" smtClean="0"/>
+          </a:p>
+        </p:txBody>
+      </p:sp>
+    </p:spTree>
+  </p:cSld>
+  <p:clrMapOvr>
+    <a:masterClrMapping/>
+  </p:clrMapOvr>
+</p:sld>
+</file>
+
+<file path=ppt/slides/slide54.xml><?xml version="1.0" encoding="utf-8"?>
+<p:sld xmlns:a="http://schemas.openxmlformats.org/drawingml/2006/main" xmlns:r="http://schemas.openxmlformats.org/officeDocument/2006/relationships" xmlns:p="http://schemas.openxmlformats.org/presentationml/2006/main">
+  <p:cSld>
+    <p:spTree>
+      <p:nvGrpSpPr>
+        <p:cNvPr id="1" name=""/>
+        <p:cNvGrpSpPr/>
+        <p:nvPr/>
+      </p:nvGrpSpPr>
+      <p:grpSpPr>
+        <a:xfrm>
+          <a:off x="0" y="0"/>
+          <a:ext cx="0" cy="0"/>
+          <a:chOff x="0" y="0"/>
+          <a:chExt cx="0" cy="0"/>
+        </a:xfrm>
+      </p:grpSpPr>
+      <p:sp>
+        <p:nvSpPr>
+          <p:cNvPr id="2" name="Title 1"/>
+          <p:cNvSpPr>
+            <a:spLocks noGrp="1"/>
+          </p:cNvSpPr>
+          <p:nvPr>
+            <p:ph type="title"/>
+          </p:nvPr>
+        </p:nvSpPr>
+        <p:spPr/>
+        <p:txBody>
+          <a:bodyPr/>
+          <a:lstStyle/>
+          <a:p>
+            <a:r>
+              <a:rPr lang="en-US" dirty="0" smtClean="0"/>
+              <a:t>Questions</a:t>
+            </a:r>
+            <a:endParaRPr lang="en-US" dirty="0"/>
+          </a:p>
+        </p:txBody>
+      </p:sp>
+      <p:sp>
+        <p:nvSpPr>
+          <p:cNvPr id="4" name="TextBox 3"/>
+          <p:cNvSpPr txBox="1"/>
+          <p:nvPr/>
+        </p:nvSpPr>
+        <p:spPr>
+          <a:xfrm>
+            <a:off x="3276600" y="609600"/>
+            <a:ext cx="2680542" cy="5478423"/>
+          </a:xfrm>
+          <a:prstGeom prst="rect">
+            <a:avLst/>
+          </a:prstGeom>
+          <a:noFill/>
+        </p:spPr>
+        <p:txBody>
+          <a:bodyPr wrap="none" rtlCol="0">
+            <a:spAutoFit/>
+          </a:bodyPr>
+          <a:lstStyle/>
+          <a:p>
+            <a:r>
+              <a:rPr lang="en-US" sz="35000" dirty="0" smtClean="0">
+                <a:latin typeface="Arial" pitchFamily="34" charset="0"/>
+                <a:cs typeface="Arial" pitchFamily="34" charset="0"/>
+              </a:rPr>
+              <a:t>?</a:t>
+            </a:r>
+            <a:endParaRPr lang="en-US" sz="35000" dirty="0">
+              <a:latin typeface="Arial" pitchFamily="34" charset="0"/>
+              <a:cs typeface="Arial" pitchFamily="34" charset="0"/>
+            </a:endParaRPr>
+          </a:p>
+        </p:txBody>
+      </p:sp>
+    </p:spTree>
+  </p:cSld>
+  <p:clrMapOvr>
+    <a:masterClrMapping/>
+  </p:clrMapOvr>
+</p:sld>
+</file>
+
+<file path=ppt/slides/slide55.xml><?xml version="1.0" encoding="utf-8"?>
+<p:sld xmlns:a="http://schemas.openxmlformats.org/drawingml/2006/main" xmlns:r="http://schemas.openxmlformats.org/officeDocument/2006/relationships" xmlns:p="http://schemas.openxmlformats.org/presentationml/2006/main">
+  <p:cSld>
+    <p:spTree>
+      <p:nvGrpSpPr>
+        <p:cNvPr id="1" name=""/>
+        <p:cNvGrpSpPr/>
+        <p:nvPr/>
+      </p:nvGrpSpPr>
+      <p:grpSpPr>
+        <a:xfrm>
+          <a:off x="0" y="0"/>
+          <a:ext cx="0" cy="0"/>
+          <a:chOff x="0" y="0"/>
+          <a:chExt cx="0" cy="0"/>
+        </a:xfrm>
+      </p:grpSpPr>
+      <p:sp>
+        <p:nvSpPr>
+          <p:cNvPr id="2" name="Title 1"/>
+          <p:cNvSpPr>
+            <a:spLocks noGrp="1"/>
+          </p:cNvSpPr>
+          <p:nvPr>
+            <p:ph type="title"/>
+          </p:nvPr>
+        </p:nvSpPr>
+        <p:spPr/>
+        <p:txBody>
+          <a:bodyPr/>
+          <a:lstStyle/>
+          <a:p>
+            <a:r>
+              <a:rPr lang="en-US" dirty="0" err="1" smtClean="0"/>
+              <a:t>Git</a:t>
+            </a:r>
+            <a:r>
+              <a:rPr lang="en-US" dirty="0" smtClean="0"/>
+              <a:t> Hub Repository</a:t>
+            </a:r>
+            <a:endParaRPr lang="en-US" dirty="0"/>
+          </a:p>
+        </p:txBody>
+      </p:sp>
+      <p:sp>
+        <p:nvSpPr>
+          <p:cNvPr id="3" name="Content Placeholder 2"/>
+          <p:cNvSpPr>
+            <a:spLocks noGrp="1"/>
+          </p:cNvSpPr>
+          <p:nvPr>
+            <p:ph idx="1"/>
+          </p:nvPr>
+        </p:nvSpPr>
+        <p:spPr/>
+        <p:txBody>
+          <a:bodyPr/>
+          <a:lstStyle/>
+          <a:p>
+            <a:r>
+              <a:rPr lang="en-US" dirty="0" smtClean="0"/>
+              <a:t>http://</a:t>
+            </a:r>
+            <a:r>
+              <a:rPr lang="en-US" dirty="0" smtClean="0"/>
+              <a:t>github.com/RookieOne/WPF-Input-Validation</a:t>
+            </a:r>
+          </a:p>
+          <a:p>
+            <a:r>
+              <a:rPr lang="en-US" dirty="0" smtClean="0"/>
+              <a:t>Has solution with projects and slide show</a:t>
+            </a:r>
+          </a:p>
+          <a:p>
+            <a:r>
+              <a:rPr lang="en-US" dirty="0" smtClean="0"/>
+              <a:t>Offered as is</a:t>
+            </a:r>
+            <a:endParaRPr lang="en-US" dirty="0"/>
+          </a:p>
+        </p:txBody>
+      </p:sp>
+      <p:pic>
+        <p:nvPicPr>
+          <p:cNvPr id="2050" name="Picture 2"/>
+          <p:cNvPicPr>
+            <a:picLocks noChangeAspect="1" noChangeArrowheads="1"/>
+          </p:cNvPicPr>
+          <p:nvPr/>
+        </p:nvPicPr>
+        <p:blipFill>
+          <a:blip r:embed="rId2" cstate="print"/>
+          <a:srcRect/>
+          <a:stretch>
+            <a:fillRect/>
+          </a:stretch>
+        </p:blipFill>
+        <p:spPr bwMode="auto">
+          <a:xfrm>
+            <a:off x="152400" y="3895725"/>
+            <a:ext cx="8839200" cy="2428875"/>
+          </a:xfrm>
+          <a:prstGeom prst="rect">
+            <a:avLst/>
+          </a:prstGeom>
+          <a:noFill/>
+          <a:ln w="9525">
+            <a:noFill/>
+            <a:miter lim="800000"/>
+            <a:headEnd/>
+            <a:tailEnd/>
+          </a:ln>
+        </p:spPr>
+      </p:pic>
+    </p:spTree>
+  </p:cSld>
+  <p:clrMapOvr>
+    <a:masterClrMapping/>
+  </p:clrMapOvr>
+</p:sld>
+</file>
+
+<file path=ppt/slides/slide56.xml><?xml version="1.0" encoding="utf-8"?>
+<p:sld xmlns:a="http://schemas.openxmlformats.org/drawingml/2006/main" xmlns:r="http://schemas.openxmlformats.org/officeDocument/2006/relationships" xmlns:p="http://schemas.openxmlformats.org/presentationml/2006/main">
+  <p:cSld>
+    <p:spTree>
+      <p:nvGrpSpPr>
+        <p:cNvPr id="1" name=""/>
+        <p:cNvGrpSpPr/>
+        <p:nvPr/>
+      </p:nvGrpSpPr>
+      <p:grpSpPr>
+        <a:xfrm>
+          <a:off x="0" y="0"/>
+          <a:ext cx="0" cy="0"/>
+          <a:chOff x="0" y="0"/>
+          <a:chExt cx="0" cy="0"/>
+        </a:xfrm>
+      </p:grpSpPr>
+      <p:sp>
+        <p:nvSpPr>
+          <p:cNvPr id="2" name="Title 1"/>
+          <p:cNvSpPr>
+            <a:spLocks noGrp="1"/>
+          </p:cNvSpPr>
+          <p:nvPr>
+            <p:ph type="title"/>
+          </p:nvPr>
+        </p:nvSpPr>
+        <p:spPr/>
+        <p:txBody>
+          <a:bodyPr/>
+          <a:lstStyle/>
+          <a:p>
+            <a:r>
+              <a:rPr lang="en-US" dirty="0" smtClean="0"/>
               <a:t>References</a:t>
             </a:r>
             <a:endParaRPr lang="en-US" dirty="0"/>
@@ -10104,10 +10717,26 @@
           <a:p>
             <a:r>
               <a:rPr lang="en-US" dirty="0" smtClean="0"/>
-              <a:t>Josh Smith</a:t>
-            </a:r>
-          </a:p>
-          <a:p>
+              <a:t>Blogs and </a:t>
+            </a:r>
+            <a:r>
+              <a:rPr lang="en-US" dirty="0" smtClean="0"/>
+              <a:t>articles by</a:t>
+            </a:r>
+          </a:p>
+          <a:p>
+            <a:pPr lvl="1"/>
+            <a:r>
+              <a:rPr lang="en-US" dirty="0" smtClean="0"/>
+              <a:t>Josh </a:t>
+            </a:r>
+            <a:r>
+              <a:rPr lang="en-US" dirty="0" smtClean="0"/>
+              <a:t>Smith</a:t>
+            </a:r>
+          </a:p>
+          <a:p>
+            <a:pPr lvl="1"/>
             <a:r>
               <a:rPr lang="en-US" dirty="0" smtClean="0"/>
               <a:t>Karl </a:t>
@@ -10120,9 +10749,9 @@
               <a:rPr lang="en-US" dirty="0" smtClean="0"/>
               <a:t> </a:t>
             </a:r>
-            <a:endParaRPr lang="en-US" dirty="0" smtClean="0"/>
-          </a:p>
-          <a:p>
+          </a:p>
+          <a:p>
+            <a:pPr lvl="1"/>
             <a:r>
               <a:rPr lang="en-US" dirty="0" smtClean="0"/>
               <a:t>Martin </a:t>
@@ -10134,6 +10763,7 @@
             <a:endParaRPr lang="en-US" dirty="0" smtClean="0"/>
           </a:p>
           <a:p>
+            <a:pPr lvl="1"/>
             <a:r>
               <a:rPr lang="en-US" dirty="0" smtClean="0"/>
               <a:t>Philip </a:t>
@@ -10461,23 +11091,7 @@
           <a:p>
             <a:r>
               <a:rPr lang="en-US" dirty="0" smtClean="0"/>
-              <a:t>Validation Rules are </a:t>
-            </a:r>
-            <a:r>
-              <a:rPr lang="en-US" dirty="0" smtClean="0"/>
-              <a:t>the mechanism built </a:t>
-            </a:r>
-            <a:r>
-              <a:rPr lang="en-US" dirty="0" smtClean="0"/>
-              <a:t>into </a:t>
-            </a:r>
-            <a:r>
-              <a:rPr lang="en-US" dirty="0" smtClean="0"/>
-              <a:t>data binding </a:t>
-            </a:r>
-            <a:r>
-              <a:rPr lang="en-US" dirty="0" smtClean="0"/>
-              <a:t>with WPF</a:t>
+              <a:t>Validation Rules are the mechanism built into data binding with WPF</a:t>
             </a:r>
             <a:endParaRPr lang="en-US" dirty="0"/>
           </a:p>

</xml_diff>